<commit_message>
worked on system prompt
</commit_message>
<xml_diff>
--- a/cool.pptx
+++ b/cool.pptx
@@ -6,6 +6,21 @@
   </p:sldMasterIdLst>
   <p:sldIdLst>
     <p:sldId id="256" r:id="rId7"/>
+    <p:sldId id="257" r:id="rId8"/>
+    <p:sldId id="258" r:id="rId9"/>
+    <p:sldId id="259" r:id="rId10"/>
+    <p:sldId id="260" r:id="rId11"/>
+    <p:sldId id="261" r:id="rId12"/>
+    <p:sldId id="262" r:id="rId13"/>
+    <p:sldId id="263" r:id="rId14"/>
+    <p:sldId id="264" r:id="rId15"/>
+    <p:sldId id="265" r:id="rId16"/>
+    <p:sldId id="266" r:id="rId17"/>
+    <p:sldId id="267" r:id="rId18"/>
+    <p:sldId id="268" r:id="rId19"/>
+    <p:sldId id="269" r:id="rId20"/>
+    <p:sldId id="270" r:id="rId21"/>
+    <p:sldId id="271" r:id="rId22"/>
   </p:sldIdLst>
   <p:sldSz cx="9144000" cy="5143500" type="screen4x3"/>
   <p:notesSz cx="6858000" cy="9144000"/>
@@ -3121,7 +3136,7 @@
               <a:buNone/>
             </a:pPr>
             <a:r>
-              <a:t>How to Cook Eggs</a:t>
+              <a:t>How to Cook the Perfect Scrambled Eggs</a:t>
             </a:r>
             <a:endParaRPr/>
           </a:p>
@@ -3160,7 +3175,1507 @@
               <a:buNone/>
             </a:pPr>
             <a:r>
-              <a:t>A Guide to Perfect Eggs Every Time</a:t>
+              <a:t>Mastering the Art of Breakfast</a:t>
+            </a:r>
+            <a:endParaRPr>
+              <a:solidFill>
+                <a:schemeClr val="dk1"/>
+              </a:solidFill>
+            </a:endParaRPr>
+          </a:p>
+        </p:txBody>
+      </p:sp>
+    </p:spTree>
+  </p:cSld>
+  <p:clrMapOvr>
+    <a:masterClrMapping/>
+  </p:clrMapOvr>
+</p:sld>
+</file>
+
+<file path=ppt/slides/slide10.xml><?xml version="1.0" encoding="utf-8"?>
+<p:sld xmlns:a="http://schemas.openxmlformats.org/drawingml/2006/main" xmlns:p="http://schemas.openxmlformats.org/presentationml/2006/main" xmlns:r="http://schemas.openxmlformats.org/officeDocument/2006/relationships">
+  <p:cSld>
+    <p:spTree>
+      <p:nvGrpSpPr>
+        <p:cNvPr id="1" name=""/>
+        <p:cNvGrpSpPr/>
+        <p:nvPr/>
+      </p:nvGrpSpPr>
+      <p:grpSpPr/>
+      <p:sp>
+        <p:nvSpPr>
+          <p:cNvPr id="60" name="Google Shape;60;p14"/>
+          <p:cNvSpPr txBox="1"/>
+          <p:nvPr>
+            <p:ph type="title"/>
+          </p:nvPr>
+        </p:nvSpPr>
+        <p:spPr>
+          <a:xfrm>
+            <a:off x="311700" y="445025"/>
+            <a:ext cx="8520600" cy="572700"/>
+          </a:xfrm>
+          <a:prstGeom prst="rect">
+            <a:avLst/>
+          </a:prstGeom>
+        </p:spPr>
+        <p:txBody>
+          <a:bodyPr anchorCtr="0" anchor="t" bIns="91425" lIns="91425" spcFirstLastPara="1" rIns="91425" wrap="square" tIns="91425">
+            <a:normAutofit fontScale="90000"/>
+          </a:bodyPr>
+          <a:lstStyle/>
+          <a:p>
+            <a:pPr indent="0" lvl="0" marL="0" rtl="0" algn="l">
+              <a:spcBef>
+                <a:spcPts val="0"/>
+              </a:spcBef>
+              <a:spcAft>
+                <a:spcPts val="0"/>
+              </a:spcAft>
+              <a:buNone/>
+            </a:pPr>
+            <a:r>
+              <a:t>Step 5: Finishing Up</a:t>
+            </a:r>
+            <a:endParaRPr/>
+          </a:p>
+        </p:txBody>
+      </p:sp>
+      <p:sp>
+        <p:nvSpPr>
+          <p:cNvPr id="61" name="Google Shape;61;p14"/>
+          <p:cNvSpPr txBox="1"/>
+          <p:nvPr>
+            <p:ph idx="1" type="body"/>
+          </p:nvPr>
+        </p:nvSpPr>
+        <p:spPr>
+          <a:xfrm>
+            <a:off x="311700" y="1152475"/>
+            <a:ext cx="8520600" cy="3416400"/>
+          </a:xfrm>
+          <a:prstGeom prst="rect">
+            <a:avLst/>
+          </a:prstGeom>
+        </p:spPr>
+        <p:txBody>
+          <a:bodyPr anchorCtr="0" anchor="t" bIns="91425" lIns="91425" spcFirstLastPara="1" rIns="91425" wrap="square" tIns="91425">
+            <a:normAutofit/>
+          </a:bodyPr>
+          <a:lstStyle/>
+          <a:p>
+            <a:pPr indent="0" lvl="0" marL="0" rtl="0" algn="l">
+              <a:spcBef>
+                <a:spcPts val="0"/>
+              </a:spcBef>
+              <a:spcAft>
+                <a:spcPts val="1200"/>
+              </a:spcAft>
+              <a:buNone/>
+            </a:pPr>
+            <a:r>
+              <a:t>Remove the pan from heat when eggs are still slightly runny. They will continue to cook from residual heat.</a:t>
+            </a:r>
+            <a:endParaRPr>
+              <a:solidFill>
+                <a:schemeClr val="dk1"/>
+              </a:solidFill>
+            </a:endParaRPr>
+          </a:p>
+        </p:txBody>
+      </p:sp>
+    </p:spTree>
+  </p:cSld>
+  <p:clrMapOvr>
+    <a:masterClrMapping/>
+  </p:clrMapOvr>
+</p:sld>
+</file>
+
+<file path=ppt/slides/slide11.xml><?xml version="1.0" encoding="utf-8"?>
+<p:sld xmlns:a="http://schemas.openxmlformats.org/drawingml/2006/main" xmlns:p="http://schemas.openxmlformats.org/presentationml/2006/main" xmlns:r="http://schemas.openxmlformats.org/officeDocument/2006/relationships">
+  <p:cSld>
+    <p:spTree>
+      <p:nvGrpSpPr>
+        <p:cNvPr id="1" name=""/>
+        <p:cNvGrpSpPr/>
+        <p:nvPr/>
+      </p:nvGrpSpPr>
+      <p:grpSpPr/>
+      <p:sp>
+        <p:nvSpPr>
+          <p:cNvPr id="60" name="Google Shape;60;p14"/>
+          <p:cNvSpPr txBox="1"/>
+          <p:nvPr>
+            <p:ph type="title"/>
+          </p:nvPr>
+        </p:nvSpPr>
+        <p:spPr>
+          <a:xfrm>
+            <a:off x="311700" y="445025"/>
+            <a:ext cx="8520600" cy="572700"/>
+          </a:xfrm>
+          <a:prstGeom prst="rect">
+            <a:avLst/>
+          </a:prstGeom>
+        </p:spPr>
+        <p:txBody>
+          <a:bodyPr anchorCtr="0" anchor="t" bIns="91425" lIns="91425" spcFirstLastPara="1" rIns="91425" wrap="square" tIns="91425">
+            <a:normAutofit fontScale="90000"/>
+          </a:bodyPr>
+          <a:lstStyle/>
+          <a:p>
+            <a:pPr indent="0" lvl="0" marL="0" rtl="0" algn="l">
+              <a:spcBef>
+                <a:spcPts val="0"/>
+              </a:spcBef>
+              <a:spcAft>
+                <a:spcPts val="0"/>
+              </a:spcAft>
+              <a:buNone/>
+            </a:pPr>
+            <a:r>
+              <a:t>Step 6: Serving</a:t>
+            </a:r>
+            <a:endParaRPr/>
+          </a:p>
+        </p:txBody>
+      </p:sp>
+      <p:sp>
+        <p:nvSpPr>
+          <p:cNvPr id="61" name="Google Shape;61;p14"/>
+          <p:cNvSpPr txBox="1"/>
+          <p:nvPr>
+            <p:ph idx="1" type="body"/>
+          </p:nvPr>
+        </p:nvSpPr>
+        <p:spPr>
+          <a:xfrm>
+            <a:off x="311700" y="1152475"/>
+            <a:ext cx="8520600" cy="3416400"/>
+          </a:xfrm>
+          <a:prstGeom prst="rect">
+            <a:avLst/>
+          </a:prstGeom>
+        </p:spPr>
+        <p:txBody>
+          <a:bodyPr anchorCtr="0" anchor="t" bIns="91425" lIns="91425" spcFirstLastPara="1" rIns="91425" wrap="square" tIns="91425">
+            <a:normAutofit/>
+          </a:bodyPr>
+          <a:lstStyle/>
+          <a:p>
+            <a:pPr indent="0" lvl="0" marL="0" rtl="0" algn="l">
+              <a:spcBef>
+                <a:spcPts val="0"/>
+              </a:spcBef>
+              <a:spcAft>
+                <a:spcPts val="1200"/>
+              </a:spcAft>
+              <a:buNone/>
+            </a:pPr>
+            <a:r>
+              <a:t>Transfer the scrambled eggs to a plate. Serve immediately for the best taste and texture.</a:t>
+            </a:r>
+            <a:endParaRPr>
+              <a:solidFill>
+                <a:schemeClr val="dk1"/>
+              </a:solidFill>
+            </a:endParaRPr>
+          </a:p>
+        </p:txBody>
+      </p:sp>
+    </p:spTree>
+  </p:cSld>
+  <p:clrMapOvr>
+    <a:masterClrMapping/>
+  </p:clrMapOvr>
+</p:sld>
+</file>
+
+<file path=ppt/slides/slide12.xml><?xml version="1.0" encoding="utf-8"?>
+<p:sld xmlns:a="http://schemas.openxmlformats.org/drawingml/2006/main" xmlns:p="http://schemas.openxmlformats.org/presentationml/2006/main" xmlns:r="http://schemas.openxmlformats.org/officeDocument/2006/relationships">
+  <p:cSld>
+    <p:spTree>
+      <p:nvGrpSpPr>
+        <p:cNvPr id="1" name=""/>
+        <p:cNvGrpSpPr/>
+        <p:nvPr/>
+      </p:nvGrpSpPr>
+      <p:grpSpPr/>
+      <p:sp>
+        <p:nvSpPr>
+          <p:cNvPr id="60" name="Google Shape;60;p14"/>
+          <p:cNvSpPr txBox="1"/>
+          <p:nvPr>
+            <p:ph type="title"/>
+          </p:nvPr>
+        </p:nvSpPr>
+        <p:spPr>
+          <a:xfrm>
+            <a:off x="311700" y="445025"/>
+            <a:ext cx="8520600" cy="572700"/>
+          </a:xfrm>
+          <a:prstGeom prst="rect">
+            <a:avLst/>
+          </a:prstGeom>
+        </p:spPr>
+        <p:txBody>
+          <a:bodyPr anchorCtr="0" anchor="t" bIns="91425" lIns="91425" spcFirstLastPara="1" rIns="91425" wrap="square" tIns="91425">
+            <a:normAutofit fontScale="90000"/>
+          </a:bodyPr>
+          <a:lstStyle/>
+          <a:p>
+            <a:pPr indent="0" lvl="0" marL="0" rtl="0" algn="l">
+              <a:spcBef>
+                <a:spcPts val="0"/>
+              </a:spcBef>
+              <a:spcAft>
+                <a:spcPts val="0"/>
+              </a:spcAft>
+              <a:buNone/>
+            </a:pPr>
+            <a:r>
+              <a:t>Tips and Tricks</a:t>
+            </a:r>
+            <a:endParaRPr/>
+          </a:p>
+        </p:txBody>
+      </p:sp>
+      <p:sp>
+        <p:nvSpPr>
+          <p:cNvPr id="61" name="Google Shape;61;p14"/>
+          <p:cNvSpPr txBox="1"/>
+          <p:nvPr>
+            <p:ph idx="1" type="body"/>
+          </p:nvPr>
+        </p:nvSpPr>
+        <p:spPr>
+          <a:xfrm>
+            <a:off x="311700" y="1152475"/>
+            <a:ext cx="8520600" cy="3416400"/>
+          </a:xfrm>
+          <a:prstGeom prst="rect">
+            <a:avLst/>
+          </a:prstGeom>
+        </p:spPr>
+        <p:txBody>
+          <a:bodyPr anchorCtr="0" anchor="t" bIns="91425" lIns="91425" spcFirstLastPara="1" rIns="91425" wrap="square" tIns="91425">
+            <a:normAutofit/>
+          </a:bodyPr>
+          <a:lstStyle/>
+          <a:p>
+            <a:pPr indent="0" lvl="0" marL="0" rtl="0" algn="l">
+              <a:spcBef>
+                <a:spcPts val="0"/>
+              </a:spcBef>
+              <a:spcAft>
+                <a:spcPts val="1200"/>
+              </a:spcAft>
+              <a:buNone/>
+            </a:pPr>
+            <a:r>
+              <a:t>Use fresh eggs, whisk vigorously for airiness, cook on low heat, and don't stir too frequently.</a:t>
+            </a:r>
+            <a:endParaRPr>
+              <a:solidFill>
+                <a:schemeClr val="dk1"/>
+              </a:solidFill>
+            </a:endParaRPr>
+          </a:p>
+        </p:txBody>
+      </p:sp>
+    </p:spTree>
+  </p:cSld>
+  <p:clrMapOvr>
+    <a:masterClrMapping/>
+  </p:clrMapOvr>
+</p:sld>
+</file>
+
+<file path=ppt/slides/slide13.xml><?xml version="1.0" encoding="utf-8"?>
+<p:sld xmlns:a="http://schemas.openxmlformats.org/drawingml/2006/main" xmlns:p="http://schemas.openxmlformats.org/presentationml/2006/main" xmlns:r="http://schemas.openxmlformats.org/officeDocument/2006/relationships">
+  <p:cSld>
+    <p:spTree>
+      <p:nvGrpSpPr>
+        <p:cNvPr id="1" name=""/>
+        <p:cNvGrpSpPr/>
+        <p:nvPr/>
+      </p:nvGrpSpPr>
+      <p:grpSpPr/>
+      <p:sp>
+        <p:nvSpPr>
+          <p:cNvPr id="60" name="Google Shape;60;p14"/>
+          <p:cNvSpPr txBox="1"/>
+          <p:nvPr>
+            <p:ph type="title"/>
+          </p:nvPr>
+        </p:nvSpPr>
+        <p:spPr>
+          <a:xfrm>
+            <a:off x="311700" y="445025"/>
+            <a:ext cx="8520600" cy="572700"/>
+          </a:xfrm>
+          <a:prstGeom prst="rect">
+            <a:avLst/>
+          </a:prstGeom>
+        </p:spPr>
+        <p:txBody>
+          <a:bodyPr anchorCtr="0" anchor="t" bIns="91425" lIns="91425" spcFirstLastPara="1" rIns="91425" wrap="square" tIns="91425">
+            <a:normAutofit fontScale="90000"/>
+          </a:bodyPr>
+          <a:lstStyle/>
+          <a:p>
+            <a:pPr indent="0" lvl="0" marL="0" rtl="0" algn="l">
+              <a:spcBef>
+                <a:spcPts val="0"/>
+              </a:spcBef>
+              <a:spcAft>
+                <a:spcPts val="0"/>
+              </a:spcAft>
+              <a:buNone/>
+            </a:pPr>
+            <a:r>
+              <a:t>Common Mistakes</a:t>
+            </a:r>
+            <a:endParaRPr/>
+          </a:p>
+        </p:txBody>
+      </p:sp>
+      <p:sp>
+        <p:nvSpPr>
+          <p:cNvPr id="61" name="Google Shape;61;p14"/>
+          <p:cNvSpPr txBox="1"/>
+          <p:nvPr>
+            <p:ph idx="1" type="body"/>
+          </p:nvPr>
+        </p:nvSpPr>
+        <p:spPr>
+          <a:xfrm>
+            <a:off x="311700" y="1152475"/>
+            <a:ext cx="8520600" cy="3416400"/>
+          </a:xfrm>
+          <a:prstGeom prst="rect">
+            <a:avLst/>
+          </a:prstGeom>
+        </p:spPr>
+        <p:txBody>
+          <a:bodyPr anchorCtr="0" anchor="t" bIns="91425" lIns="91425" spcFirstLastPara="1" rIns="91425" wrap="square" tIns="91425">
+            <a:normAutofit/>
+          </a:bodyPr>
+          <a:lstStyle/>
+          <a:p>
+            <a:pPr indent="0" lvl="0" marL="0" rtl="0" algn="l">
+              <a:spcBef>
+                <a:spcPts val="0"/>
+              </a:spcBef>
+              <a:spcAft>
+                <a:spcPts val="1200"/>
+              </a:spcAft>
+              <a:buNone/>
+            </a:pPr>
+            <a:r>
+              <a:t>Overbeating the eggs, using high heat, overcooking, and not using butter.</a:t>
+            </a:r>
+            <a:endParaRPr>
+              <a:solidFill>
+                <a:schemeClr val="dk1"/>
+              </a:solidFill>
+            </a:endParaRPr>
+          </a:p>
+        </p:txBody>
+      </p:sp>
+    </p:spTree>
+  </p:cSld>
+  <p:clrMapOvr>
+    <a:masterClrMapping/>
+  </p:clrMapOvr>
+</p:sld>
+</file>
+
+<file path=ppt/slides/slide14.xml><?xml version="1.0" encoding="utf-8"?>
+<p:sld xmlns:a="http://schemas.openxmlformats.org/drawingml/2006/main" xmlns:p="http://schemas.openxmlformats.org/presentationml/2006/main" xmlns:r="http://schemas.openxmlformats.org/officeDocument/2006/relationships">
+  <p:cSld>
+    <p:spTree>
+      <p:nvGrpSpPr>
+        <p:cNvPr id="1" name=""/>
+        <p:cNvGrpSpPr/>
+        <p:nvPr/>
+      </p:nvGrpSpPr>
+      <p:grpSpPr/>
+      <p:sp>
+        <p:nvSpPr>
+          <p:cNvPr id="60" name="Google Shape;60;p14"/>
+          <p:cNvSpPr txBox="1"/>
+          <p:nvPr>
+            <p:ph type="title"/>
+          </p:nvPr>
+        </p:nvSpPr>
+        <p:spPr>
+          <a:xfrm>
+            <a:off x="311700" y="445025"/>
+            <a:ext cx="8520600" cy="572700"/>
+          </a:xfrm>
+          <a:prstGeom prst="rect">
+            <a:avLst/>
+          </a:prstGeom>
+        </p:spPr>
+        <p:txBody>
+          <a:bodyPr anchorCtr="0" anchor="t" bIns="91425" lIns="91425" spcFirstLastPara="1" rIns="91425" wrap="square" tIns="91425">
+            <a:normAutofit fontScale="90000"/>
+          </a:bodyPr>
+          <a:lstStyle/>
+          <a:p>
+            <a:pPr indent="0" lvl="0" marL="0" rtl="0" algn="l">
+              <a:spcBef>
+                <a:spcPts val="0"/>
+              </a:spcBef>
+              <a:spcAft>
+                <a:spcPts val="0"/>
+              </a:spcAft>
+              <a:buNone/>
+            </a:pPr>
+            <a:r>
+              <a:t>Variations</a:t>
+            </a:r>
+            <a:endParaRPr/>
+          </a:p>
+        </p:txBody>
+      </p:sp>
+      <p:sp>
+        <p:nvSpPr>
+          <p:cNvPr id="61" name="Google Shape;61;p14"/>
+          <p:cNvSpPr txBox="1"/>
+          <p:nvPr>
+            <p:ph idx="1" type="body"/>
+          </p:nvPr>
+        </p:nvSpPr>
+        <p:spPr>
+          <a:xfrm>
+            <a:off x="311700" y="1152475"/>
+            <a:ext cx="8520600" cy="3416400"/>
+          </a:xfrm>
+          <a:prstGeom prst="rect">
+            <a:avLst/>
+          </a:prstGeom>
+        </p:spPr>
+        <p:txBody>
+          <a:bodyPr anchorCtr="0" anchor="t" bIns="91425" lIns="91425" spcFirstLastPara="1" rIns="91425" wrap="square" tIns="91425">
+            <a:normAutofit/>
+          </a:bodyPr>
+          <a:lstStyle/>
+          <a:p>
+            <a:pPr indent="0" lvl="0" marL="0" rtl="0" algn="l">
+              <a:spcBef>
+                <a:spcPts val="0"/>
+              </a:spcBef>
+              <a:spcAft>
+                <a:spcPts val="1200"/>
+              </a:spcAft>
+              <a:buNone/>
+            </a:pPr>
+            <a:r>
+              <a:t>Add cheese, herbs, or cream for variety. Try different cooking techniques like adding water for fluffiness.</a:t>
+            </a:r>
+            <a:endParaRPr>
+              <a:solidFill>
+                <a:schemeClr val="dk1"/>
+              </a:solidFill>
+            </a:endParaRPr>
+          </a:p>
+        </p:txBody>
+      </p:sp>
+    </p:spTree>
+  </p:cSld>
+  <p:clrMapOvr>
+    <a:masterClrMapping/>
+  </p:clrMapOvr>
+</p:sld>
+</file>
+
+<file path=ppt/slides/slide15.xml><?xml version="1.0" encoding="utf-8"?>
+<p:sld xmlns:a="http://schemas.openxmlformats.org/drawingml/2006/main" xmlns:p="http://schemas.openxmlformats.org/presentationml/2006/main" xmlns:r="http://schemas.openxmlformats.org/officeDocument/2006/relationships">
+  <p:cSld>
+    <p:spTree>
+      <p:nvGrpSpPr>
+        <p:cNvPr id="1" name=""/>
+        <p:cNvGrpSpPr/>
+        <p:nvPr/>
+      </p:nvGrpSpPr>
+      <p:grpSpPr/>
+      <p:sp>
+        <p:nvSpPr>
+          <p:cNvPr id="60" name="Google Shape;60;p14"/>
+          <p:cNvSpPr txBox="1"/>
+          <p:nvPr>
+            <p:ph type="title"/>
+          </p:nvPr>
+        </p:nvSpPr>
+        <p:spPr>
+          <a:xfrm>
+            <a:off x="311700" y="445025"/>
+            <a:ext cx="8520600" cy="572700"/>
+          </a:xfrm>
+          <a:prstGeom prst="rect">
+            <a:avLst/>
+          </a:prstGeom>
+        </p:spPr>
+        <p:txBody>
+          <a:bodyPr anchorCtr="0" anchor="t" bIns="91425" lIns="91425" spcFirstLastPara="1" rIns="91425" wrap="square" tIns="91425">
+            <a:normAutofit fontScale="90000"/>
+          </a:bodyPr>
+          <a:lstStyle/>
+          <a:p>
+            <a:pPr indent="0" lvl="0" marL="0" rtl="0" algn="l">
+              <a:spcBef>
+                <a:spcPts val="0"/>
+              </a:spcBef>
+              <a:spcAft>
+                <a:spcPts val="0"/>
+              </a:spcAft>
+              <a:buNone/>
+            </a:pPr>
+            <a:r>
+              <a:t>Nutritional Information</a:t>
+            </a:r>
+            <a:endParaRPr/>
+          </a:p>
+        </p:txBody>
+      </p:sp>
+      <p:sp>
+        <p:nvSpPr>
+          <p:cNvPr id="61" name="Google Shape;61;p14"/>
+          <p:cNvSpPr txBox="1"/>
+          <p:nvPr>
+            <p:ph idx="1" type="body"/>
+          </p:nvPr>
+        </p:nvSpPr>
+        <p:spPr>
+          <a:xfrm>
+            <a:off x="311700" y="1152475"/>
+            <a:ext cx="8520600" cy="3416400"/>
+          </a:xfrm>
+          <a:prstGeom prst="rect">
+            <a:avLst/>
+          </a:prstGeom>
+        </p:spPr>
+        <p:txBody>
+          <a:bodyPr anchorCtr="0" anchor="t" bIns="91425" lIns="91425" spcFirstLastPara="1" rIns="91425" wrap="square" tIns="91425">
+            <a:normAutofit/>
+          </a:bodyPr>
+          <a:lstStyle/>
+          <a:p>
+            <a:pPr indent="0" lvl="0" marL="0" rtl="0" algn="l">
+              <a:spcBef>
+                <a:spcPts val="0"/>
+              </a:spcBef>
+              <a:spcAft>
+                <a:spcPts val="1200"/>
+              </a:spcAft>
+              <a:buNone/>
+            </a:pPr>
+            <a:r>
+              <a:t>Discuss the protein, vitamins, and calories in scrambled eggs. Option to compare with other breakfast choices.</a:t>
+            </a:r>
+            <a:endParaRPr>
+              <a:solidFill>
+                <a:schemeClr val="dk1"/>
+              </a:solidFill>
+            </a:endParaRPr>
+          </a:p>
+        </p:txBody>
+      </p:sp>
+    </p:spTree>
+  </p:cSld>
+  <p:clrMapOvr>
+    <a:masterClrMapping/>
+  </p:clrMapOvr>
+</p:sld>
+</file>
+
+<file path=ppt/slides/slide16.xml><?xml version="1.0" encoding="utf-8"?>
+<p:sld xmlns:a="http://schemas.openxmlformats.org/drawingml/2006/main" xmlns:p="http://schemas.openxmlformats.org/presentationml/2006/main" xmlns:r="http://schemas.openxmlformats.org/officeDocument/2006/relationships">
+  <p:cSld>
+    <p:spTree>
+      <p:nvGrpSpPr>
+        <p:cNvPr id="1" name=""/>
+        <p:cNvGrpSpPr/>
+        <p:nvPr/>
+      </p:nvGrpSpPr>
+      <p:grpSpPr/>
+      <p:sp>
+        <p:nvSpPr>
+          <p:cNvPr id="60" name="Google Shape;60;p14"/>
+          <p:cNvSpPr txBox="1"/>
+          <p:nvPr>
+            <p:ph type="title"/>
+          </p:nvPr>
+        </p:nvSpPr>
+        <p:spPr>
+          <a:xfrm>
+            <a:off x="311700" y="445025"/>
+            <a:ext cx="8520600" cy="572700"/>
+          </a:xfrm>
+          <a:prstGeom prst="rect">
+            <a:avLst/>
+          </a:prstGeom>
+        </p:spPr>
+        <p:txBody>
+          <a:bodyPr anchorCtr="0" anchor="t" bIns="91425" lIns="91425" spcFirstLastPara="1" rIns="91425" wrap="square" tIns="91425">
+            <a:normAutofit fontScale="90000"/>
+          </a:bodyPr>
+          <a:lstStyle/>
+          <a:p>
+            <a:pPr indent="0" lvl="0" marL="0" rtl="0" algn="l">
+              <a:spcBef>
+                <a:spcPts val="0"/>
+              </a:spcBef>
+              <a:spcAft>
+                <a:spcPts val="0"/>
+              </a:spcAft>
+              <a:buNone/>
+            </a:pPr>
+            <a:r>
+              <a:t>Summary</a:t>
+            </a:r>
+            <a:endParaRPr/>
+          </a:p>
+        </p:txBody>
+      </p:sp>
+      <p:sp>
+        <p:nvSpPr>
+          <p:cNvPr id="61" name="Google Shape;61;p14"/>
+          <p:cNvSpPr txBox="1"/>
+          <p:nvPr>
+            <p:ph idx="1" type="body"/>
+          </p:nvPr>
+        </p:nvSpPr>
+        <p:spPr>
+          <a:xfrm>
+            <a:off x="311700" y="1152475"/>
+            <a:ext cx="8520600" cy="3416400"/>
+          </a:xfrm>
+          <a:prstGeom prst="rect">
+            <a:avLst/>
+          </a:prstGeom>
+        </p:spPr>
+        <p:txBody>
+          <a:bodyPr anchorCtr="0" anchor="t" bIns="91425" lIns="91425" spcFirstLastPara="1" rIns="91425" wrap="square" tIns="91425">
+            <a:normAutofit/>
+          </a:bodyPr>
+          <a:lstStyle/>
+          <a:p>
+            <a:pPr indent="0" lvl="0" marL="0" rtl="0" algn="l">
+              <a:spcBef>
+                <a:spcPts val="0"/>
+              </a:spcBef>
+              <a:spcAft>
+                <a:spcPts val="1200"/>
+              </a:spcAft>
+              <a:buNone/>
+            </a:pPr>
+            <a:r>
+              <a:t>A quick recap of the process, tips, and variations in making the perfect scrambled eggs.</a:t>
+            </a:r>
+            <a:endParaRPr>
+              <a:solidFill>
+                <a:schemeClr val="dk1"/>
+              </a:solidFill>
+            </a:endParaRPr>
+          </a:p>
+        </p:txBody>
+      </p:sp>
+    </p:spTree>
+  </p:cSld>
+  <p:clrMapOvr>
+    <a:masterClrMapping/>
+  </p:clrMapOvr>
+</p:sld>
+</file>
+
+<file path=ppt/slides/slide2.xml><?xml version="1.0" encoding="utf-8"?>
+<p:sld xmlns:a="http://schemas.openxmlformats.org/drawingml/2006/main" xmlns:p="http://schemas.openxmlformats.org/presentationml/2006/main" xmlns:r="http://schemas.openxmlformats.org/officeDocument/2006/relationships">
+  <p:cSld>
+    <p:spTree>
+      <p:nvGrpSpPr>
+        <p:cNvPr id="1" name=""/>
+        <p:cNvGrpSpPr/>
+        <p:nvPr/>
+      </p:nvGrpSpPr>
+      <p:grpSpPr/>
+      <p:sp>
+        <p:nvSpPr>
+          <p:cNvPr id="60" name="Google Shape;60;p14"/>
+          <p:cNvSpPr txBox="1"/>
+          <p:nvPr>
+            <p:ph type="title"/>
+          </p:nvPr>
+        </p:nvSpPr>
+        <p:spPr>
+          <a:xfrm>
+            <a:off x="311700" y="445025"/>
+            <a:ext cx="8520600" cy="572700"/>
+          </a:xfrm>
+          <a:prstGeom prst="rect">
+            <a:avLst/>
+          </a:prstGeom>
+        </p:spPr>
+        <p:txBody>
+          <a:bodyPr anchorCtr="0" anchor="t" bIns="91425" lIns="91425" spcFirstLastPara="1" rIns="91425" wrap="square" tIns="91425">
+            <a:normAutofit fontScale="90000"/>
+          </a:bodyPr>
+          <a:lstStyle/>
+          <a:p>
+            <a:pPr indent="0" lvl="0" marL="0" rtl="0" algn="l">
+              <a:spcBef>
+                <a:spcPts val="0"/>
+              </a:spcBef>
+              <a:spcAft>
+                <a:spcPts val="0"/>
+              </a:spcAft>
+              <a:buNone/>
+            </a:pPr>
+            <a:r>
+              <a:t>Objective</a:t>
+            </a:r>
+            <a:endParaRPr/>
+          </a:p>
+        </p:txBody>
+      </p:sp>
+      <p:sp>
+        <p:nvSpPr>
+          <p:cNvPr id="61" name="Google Shape;61;p14"/>
+          <p:cNvSpPr txBox="1"/>
+          <p:nvPr>
+            <p:ph idx="1" type="body"/>
+          </p:nvPr>
+        </p:nvSpPr>
+        <p:spPr>
+          <a:xfrm>
+            <a:off x="311700" y="1152475"/>
+            <a:ext cx="8520600" cy="3416400"/>
+          </a:xfrm>
+          <a:prstGeom prst="rect">
+            <a:avLst/>
+          </a:prstGeom>
+        </p:spPr>
+        <p:txBody>
+          <a:bodyPr anchorCtr="0" anchor="t" bIns="91425" lIns="91425" spcFirstLastPara="1" rIns="91425" wrap="square" tIns="91425">
+            <a:normAutofit/>
+          </a:bodyPr>
+          <a:lstStyle/>
+          <a:p>
+            <a:pPr indent="0" lvl="0" marL="0" rtl="0" algn="l">
+              <a:spcBef>
+                <a:spcPts val="0"/>
+              </a:spcBef>
+              <a:spcAft>
+                <a:spcPts val="1200"/>
+              </a:spcAft>
+              <a:buNone/>
+            </a:pPr>
+            <a:r>
+              <a:t>Understand the ingredients, equipment, and steps needed to cook scrambled eggs. Learn tips and tricks for enhancing flavor and texture.</a:t>
+            </a:r>
+            <a:endParaRPr>
+              <a:solidFill>
+                <a:schemeClr val="dk1"/>
+              </a:solidFill>
+            </a:endParaRPr>
+          </a:p>
+        </p:txBody>
+      </p:sp>
+    </p:spTree>
+  </p:cSld>
+  <p:clrMapOvr>
+    <a:masterClrMapping/>
+  </p:clrMapOvr>
+</p:sld>
+</file>
+
+<file path=ppt/slides/slide3.xml><?xml version="1.0" encoding="utf-8"?>
+<p:sld xmlns:a="http://schemas.openxmlformats.org/drawingml/2006/main" xmlns:p="http://schemas.openxmlformats.org/presentationml/2006/main" xmlns:r="http://schemas.openxmlformats.org/officeDocument/2006/relationships">
+  <p:cSld>
+    <p:spTree>
+      <p:nvGrpSpPr>
+        <p:cNvPr id="1" name=""/>
+        <p:cNvGrpSpPr/>
+        <p:nvPr/>
+      </p:nvGrpSpPr>
+      <p:grpSpPr/>
+      <p:sp>
+        <p:nvSpPr>
+          <p:cNvPr id="60" name="Google Shape;60;p14"/>
+          <p:cNvSpPr txBox="1"/>
+          <p:nvPr>
+            <p:ph type="title"/>
+          </p:nvPr>
+        </p:nvSpPr>
+        <p:spPr>
+          <a:xfrm>
+            <a:off x="311700" y="445025"/>
+            <a:ext cx="8520600" cy="572700"/>
+          </a:xfrm>
+          <a:prstGeom prst="rect">
+            <a:avLst/>
+          </a:prstGeom>
+        </p:spPr>
+        <p:txBody>
+          <a:bodyPr anchorCtr="0" anchor="t" bIns="91425" lIns="91425" spcFirstLastPara="1" rIns="91425" wrap="square" tIns="91425">
+            <a:normAutofit fontScale="90000"/>
+          </a:bodyPr>
+          <a:lstStyle/>
+          <a:p>
+            <a:pPr indent="0" lvl="0" marL="0" rtl="0" algn="l">
+              <a:spcBef>
+                <a:spcPts val="0"/>
+              </a:spcBef>
+              <a:spcAft>
+                <a:spcPts val="0"/>
+              </a:spcAft>
+              <a:buNone/>
+            </a:pPr>
+            <a:r>
+              <a:t>Ingredients</a:t>
+            </a:r>
+            <a:endParaRPr/>
+          </a:p>
+        </p:txBody>
+      </p:sp>
+      <p:sp>
+        <p:nvSpPr>
+          <p:cNvPr id="61" name="Google Shape;61;p14"/>
+          <p:cNvSpPr txBox="1"/>
+          <p:nvPr>
+            <p:ph idx="1" type="body"/>
+          </p:nvPr>
+        </p:nvSpPr>
+        <p:spPr>
+          <a:xfrm>
+            <a:off x="311700" y="1152475"/>
+            <a:ext cx="8520600" cy="3416400"/>
+          </a:xfrm>
+          <a:prstGeom prst="rect">
+            <a:avLst/>
+          </a:prstGeom>
+        </p:spPr>
+        <p:txBody>
+          <a:bodyPr anchorCtr="0" anchor="t" bIns="91425" lIns="91425" spcFirstLastPara="1" rIns="91425" wrap="square" tIns="91425">
+            <a:normAutofit/>
+          </a:bodyPr>
+          <a:lstStyle/>
+          <a:p>
+            <a:pPr indent="0" lvl="0" marL="0" rtl="0" algn="l">
+              <a:spcBef>
+                <a:spcPts val="0"/>
+              </a:spcBef>
+              <a:spcAft>
+                <a:spcPts val="1200"/>
+              </a:spcAft>
+              <a:buNone/>
+            </a:pPr>
+            <a:r>
+              <a:t>Eggs, Salt, Butter, Optional add-ins such as cheese, herbs, and milk.</a:t>
+            </a:r>
+            <a:endParaRPr>
+              <a:solidFill>
+                <a:schemeClr val="dk1"/>
+              </a:solidFill>
+            </a:endParaRPr>
+          </a:p>
+        </p:txBody>
+      </p:sp>
+    </p:spTree>
+  </p:cSld>
+  <p:clrMapOvr>
+    <a:masterClrMapping/>
+  </p:clrMapOvr>
+</p:sld>
+</file>
+
+<file path=ppt/slides/slide4.xml><?xml version="1.0" encoding="utf-8"?>
+<p:sld xmlns:a="http://schemas.openxmlformats.org/drawingml/2006/main" xmlns:p="http://schemas.openxmlformats.org/presentationml/2006/main" xmlns:r="http://schemas.openxmlformats.org/officeDocument/2006/relationships">
+  <p:cSld>
+    <p:spTree>
+      <p:nvGrpSpPr>
+        <p:cNvPr id="1" name=""/>
+        <p:cNvGrpSpPr/>
+        <p:nvPr/>
+      </p:nvGrpSpPr>
+      <p:grpSpPr/>
+      <p:sp>
+        <p:nvSpPr>
+          <p:cNvPr id="60" name="Google Shape;60;p14"/>
+          <p:cNvSpPr txBox="1"/>
+          <p:nvPr>
+            <p:ph type="title"/>
+          </p:nvPr>
+        </p:nvSpPr>
+        <p:spPr>
+          <a:xfrm>
+            <a:off x="311700" y="445025"/>
+            <a:ext cx="8520600" cy="572700"/>
+          </a:xfrm>
+          <a:prstGeom prst="rect">
+            <a:avLst/>
+          </a:prstGeom>
+        </p:spPr>
+        <p:txBody>
+          <a:bodyPr anchorCtr="0" anchor="t" bIns="91425" lIns="91425" spcFirstLastPara="1" rIns="91425" wrap="square" tIns="91425">
+            <a:normAutofit fontScale="90000"/>
+          </a:bodyPr>
+          <a:lstStyle/>
+          <a:p>
+            <a:pPr indent="0" lvl="0" marL="0" rtl="0" algn="l">
+              <a:spcBef>
+                <a:spcPts val="0"/>
+              </a:spcBef>
+              <a:spcAft>
+                <a:spcPts val="0"/>
+              </a:spcAft>
+              <a:buNone/>
+            </a:pPr>
+            <a:r>
+              <a:t>Equipment</a:t>
+            </a:r>
+            <a:endParaRPr/>
+          </a:p>
+        </p:txBody>
+      </p:sp>
+      <p:sp>
+        <p:nvSpPr>
+          <p:cNvPr id="61" name="Google Shape;61;p14"/>
+          <p:cNvSpPr txBox="1"/>
+          <p:nvPr>
+            <p:ph idx="1" type="body"/>
+          </p:nvPr>
+        </p:nvSpPr>
+        <p:spPr>
+          <a:xfrm>
+            <a:off x="311700" y="1152475"/>
+            <a:ext cx="8520600" cy="3416400"/>
+          </a:xfrm>
+          <a:prstGeom prst="rect">
+            <a:avLst/>
+          </a:prstGeom>
+        </p:spPr>
+        <p:txBody>
+          <a:bodyPr anchorCtr="0" anchor="t" bIns="91425" lIns="91425" spcFirstLastPara="1" rIns="91425" wrap="square" tIns="91425">
+            <a:normAutofit/>
+          </a:bodyPr>
+          <a:lstStyle/>
+          <a:p>
+            <a:pPr indent="0" lvl="0" marL="0" rtl="0" algn="l">
+              <a:spcBef>
+                <a:spcPts val="0"/>
+              </a:spcBef>
+              <a:spcAft>
+                <a:spcPts val="1200"/>
+              </a:spcAft>
+              <a:buNone/>
+            </a:pPr>
+            <a:r>
+              <a:t>Non-stick frying pan, whisk or fork, spatula, mixing bowl.</a:t>
+            </a:r>
+            <a:endParaRPr>
+              <a:solidFill>
+                <a:schemeClr val="dk1"/>
+              </a:solidFill>
+            </a:endParaRPr>
+          </a:p>
+        </p:txBody>
+      </p:sp>
+    </p:spTree>
+  </p:cSld>
+  <p:clrMapOvr>
+    <a:masterClrMapping/>
+  </p:clrMapOvr>
+</p:sld>
+</file>
+
+<file path=ppt/slides/slide5.xml><?xml version="1.0" encoding="utf-8"?>
+<p:sld xmlns:a="http://schemas.openxmlformats.org/drawingml/2006/main" xmlns:p="http://schemas.openxmlformats.org/presentationml/2006/main" xmlns:r="http://schemas.openxmlformats.org/officeDocument/2006/relationships">
+  <p:cSld>
+    <p:spTree>
+      <p:nvGrpSpPr>
+        <p:cNvPr id="1" name=""/>
+        <p:cNvGrpSpPr/>
+        <p:nvPr/>
+      </p:nvGrpSpPr>
+      <p:grpSpPr/>
+      <p:sp>
+        <p:nvSpPr>
+          <p:cNvPr id="60" name="Google Shape;60;p14"/>
+          <p:cNvSpPr txBox="1"/>
+          <p:nvPr>
+            <p:ph type="title"/>
+          </p:nvPr>
+        </p:nvSpPr>
+        <p:spPr>
+          <a:xfrm>
+            <a:off x="311700" y="445025"/>
+            <a:ext cx="8520600" cy="572700"/>
+          </a:xfrm>
+          <a:prstGeom prst="rect">
+            <a:avLst/>
+          </a:prstGeom>
+        </p:spPr>
+        <p:txBody>
+          <a:bodyPr anchorCtr="0" anchor="t" bIns="91425" lIns="91425" spcFirstLastPara="1" rIns="91425" wrap="square" tIns="91425">
+            <a:normAutofit fontScale="90000"/>
+          </a:bodyPr>
+          <a:lstStyle/>
+          <a:p>
+            <a:pPr indent="0" lvl="0" marL="0" rtl="0" algn="l">
+              <a:spcBef>
+                <a:spcPts val="0"/>
+              </a:spcBef>
+              <a:spcAft>
+                <a:spcPts val="0"/>
+              </a:spcAft>
+              <a:buNone/>
+            </a:pPr>
+            <a:r>
+              <a:t>Procedure Overview</a:t>
+            </a:r>
+            <a:endParaRPr/>
+          </a:p>
+        </p:txBody>
+      </p:sp>
+      <p:sp>
+        <p:nvSpPr>
+          <p:cNvPr id="61" name="Google Shape;61;p14"/>
+          <p:cNvSpPr txBox="1"/>
+          <p:nvPr>
+            <p:ph idx="1" type="body"/>
+          </p:nvPr>
+        </p:nvSpPr>
+        <p:spPr>
+          <a:xfrm>
+            <a:off x="311700" y="1152475"/>
+            <a:ext cx="8520600" cy="3416400"/>
+          </a:xfrm>
+          <a:prstGeom prst="rect">
+            <a:avLst/>
+          </a:prstGeom>
+        </p:spPr>
+        <p:txBody>
+          <a:bodyPr anchorCtr="0" anchor="t" bIns="91425" lIns="91425" spcFirstLastPara="1" rIns="91425" wrap="square" tIns="91425">
+            <a:normAutofit/>
+          </a:bodyPr>
+          <a:lstStyle/>
+          <a:p>
+            <a:pPr indent="0" lvl="0" marL="0" rtl="0" algn="l">
+              <a:spcBef>
+                <a:spcPts val="0"/>
+              </a:spcBef>
+              <a:spcAft>
+                <a:spcPts val="1200"/>
+              </a:spcAft>
+              <a:buNone/>
+            </a:pPr>
+            <a:r>
+              <a:t>Brief overview of steps: Beat eggs, heat pan, cook with constant stirring, remove when slightly underdone.</a:t>
+            </a:r>
+            <a:endParaRPr>
+              <a:solidFill>
+                <a:schemeClr val="dk1"/>
+              </a:solidFill>
+            </a:endParaRPr>
+          </a:p>
+        </p:txBody>
+      </p:sp>
+    </p:spTree>
+  </p:cSld>
+  <p:clrMapOvr>
+    <a:masterClrMapping/>
+  </p:clrMapOvr>
+</p:sld>
+</file>
+
+<file path=ppt/slides/slide6.xml><?xml version="1.0" encoding="utf-8"?>
+<p:sld xmlns:a="http://schemas.openxmlformats.org/drawingml/2006/main" xmlns:p="http://schemas.openxmlformats.org/presentationml/2006/main" xmlns:r="http://schemas.openxmlformats.org/officeDocument/2006/relationships">
+  <p:cSld>
+    <p:spTree>
+      <p:nvGrpSpPr>
+        <p:cNvPr id="1" name=""/>
+        <p:cNvGrpSpPr/>
+        <p:nvPr/>
+      </p:nvGrpSpPr>
+      <p:grpSpPr/>
+      <p:sp>
+        <p:nvSpPr>
+          <p:cNvPr id="60" name="Google Shape;60;p14"/>
+          <p:cNvSpPr txBox="1"/>
+          <p:nvPr>
+            <p:ph type="title"/>
+          </p:nvPr>
+        </p:nvSpPr>
+        <p:spPr>
+          <a:xfrm>
+            <a:off x="311700" y="445025"/>
+            <a:ext cx="8520600" cy="572700"/>
+          </a:xfrm>
+          <a:prstGeom prst="rect">
+            <a:avLst/>
+          </a:prstGeom>
+        </p:spPr>
+        <p:txBody>
+          <a:bodyPr anchorCtr="0" anchor="t" bIns="91425" lIns="91425" spcFirstLastPara="1" rIns="91425" wrap="square" tIns="91425">
+            <a:normAutofit fontScale="90000"/>
+          </a:bodyPr>
+          <a:lstStyle/>
+          <a:p>
+            <a:pPr indent="0" lvl="0" marL="0" rtl="0" algn="l">
+              <a:spcBef>
+                <a:spcPts val="0"/>
+              </a:spcBef>
+              <a:spcAft>
+                <a:spcPts val="0"/>
+              </a:spcAft>
+              <a:buNone/>
+            </a:pPr>
+            <a:r>
+              <a:t>Step 1: Beating the Eggs</a:t>
+            </a:r>
+            <a:endParaRPr/>
+          </a:p>
+        </p:txBody>
+      </p:sp>
+      <p:sp>
+        <p:nvSpPr>
+          <p:cNvPr id="61" name="Google Shape;61;p14"/>
+          <p:cNvSpPr txBox="1"/>
+          <p:nvPr>
+            <p:ph idx="1" type="body"/>
+          </p:nvPr>
+        </p:nvSpPr>
+        <p:spPr>
+          <a:xfrm>
+            <a:off x="311700" y="1152475"/>
+            <a:ext cx="8520600" cy="3416400"/>
+          </a:xfrm>
+          <a:prstGeom prst="rect">
+            <a:avLst/>
+          </a:prstGeom>
+        </p:spPr>
+        <p:txBody>
+          <a:bodyPr anchorCtr="0" anchor="t" bIns="91425" lIns="91425" spcFirstLastPara="1" rIns="91425" wrap="square" tIns="91425">
+            <a:normAutofit/>
+          </a:bodyPr>
+          <a:lstStyle/>
+          <a:p>
+            <a:pPr indent="0" lvl="0" marL="0" rtl="0" algn="l">
+              <a:spcBef>
+                <a:spcPts val="0"/>
+              </a:spcBef>
+              <a:spcAft>
+                <a:spcPts val="1200"/>
+              </a:spcAft>
+              <a:buNone/>
+            </a:pPr>
+            <a:r>
+              <a:t>Break the eggs into a bowl. Season with salt. Whisk until fully blended</a:t>
+            </a:r>
+            <a:endParaRPr>
+              <a:solidFill>
+                <a:schemeClr val="dk1"/>
+              </a:solidFill>
+            </a:endParaRPr>
+          </a:p>
+        </p:txBody>
+      </p:sp>
+    </p:spTree>
+  </p:cSld>
+  <p:clrMapOvr>
+    <a:masterClrMapping/>
+  </p:clrMapOvr>
+</p:sld>
+</file>
+
+<file path=ppt/slides/slide7.xml><?xml version="1.0" encoding="utf-8"?>
+<p:sld xmlns:a="http://schemas.openxmlformats.org/drawingml/2006/main" xmlns:p="http://schemas.openxmlformats.org/presentationml/2006/main" xmlns:r="http://schemas.openxmlformats.org/officeDocument/2006/relationships">
+  <p:cSld>
+    <p:spTree>
+      <p:nvGrpSpPr>
+        <p:cNvPr id="1" name=""/>
+        <p:cNvGrpSpPr/>
+        <p:nvPr/>
+      </p:nvGrpSpPr>
+      <p:grpSpPr/>
+      <p:sp>
+        <p:nvSpPr>
+          <p:cNvPr id="60" name="Google Shape;60;p14"/>
+          <p:cNvSpPr txBox="1"/>
+          <p:nvPr>
+            <p:ph type="title"/>
+          </p:nvPr>
+        </p:nvSpPr>
+        <p:spPr>
+          <a:xfrm>
+            <a:off x="311700" y="445025"/>
+            <a:ext cx="8520600" cy="572700"/>
+          </a:xfrm>
+          <a:prstGeom prst="rect">
+            <a:avLst/>
+          </a:prstGeom>
+        </p:spPr>
+        <p:txBody>
+          <a:bodyPr anchorCtr="0" anchor="t" bIns="91425" lIns="91425" spcFirstLastPara="1" rIns="91425" wrap="square" tIns="91425">
+            <a:normAutofit fontScale="90000"/>
+          </a:bodyPr>
+          <a:lstStyle/>
+          <a:p>
+            <a:pPr indent="0" lvl="0" marL="0" rtl="0" algn="l">
+              <a:spcBef>
+                <a:spcPts val="0"/>
+              </a:spcBef>
+              <a:spcAft>
+                <a:spcPts val="0"/>
+              </a:spcAft>
+              <a:buNone/>
+            </a:pPr>
+            <a:r>
+              <a:t>Step 2: Prepping the Pan</a:t>
+            </a:r>
+            <a:endParaRPr/>
+          </a:p>
+        </p:txBody>
+      </p:sp>
+      <p:sp>
+        <p:nvSpPr>
+          <p:cNvPr id="61" name="Google Shape;61;p14"/>
+          <p:cNvSpPr txBox="1"/>
+          <p:nvPr>
+            <p:ph idx="1" type="body"/>
+          </p:nvPr>
+        </p:nvSpPr>
+        <p:spPr>
+          <a:xfrm>
+            <a:off x="311700" y="1152475"/>
+            <a:ext cx="8520600" cy="3416400"/>
+          </a:xfrm>
+          <a:prstGeom prst="rect">
+            <a:avLst/>
+          </a:prstGeom>
+        </p:spPr>
+        <p:txBody>
+          <a:bodyPr anchorCtr="0" anchor="t" bIns="91425" lIns="91425" spcFirstLastPara="1" rIns="91425" wrap="square" tIns="91425">
+            <a:normAutofit/>
+          </a:bodyPr>
+          <a:lstStyle/>
+          <a:p>
+            <a:pPr indent="0" lvl="0" marL="0" rtl="0" algn="l">
+              <a:spcBef>
+                <a:spcPts val="0"/>
+              </a:spcBef>
+              <a:spcAft>
+                <a:spcPts val="1200"/>
+              </a:spcAft>
+              <a:buNone/>
+            </a:pPr>
+            <a:r>
+              <a:t>Heat the non-stick pan over medium-low heat. Add butter and let it melt.</a:t>
+            </a:r>
+            <a:endParaRPr>
+              <a:solidFill>
+                <a:schemeClr val="dk1"/>
+              </a:solidFill>
+            </a:endParaRPr>
+          </a:p>
+        </p:txBody>
+      </p:sp>
+    </p:spTree>
+  </p:cSld>
+  <p:clrMapOvr>
+    <a:masterClrMapping/>
+  </p:clrMapOvr>
+</p:sld>
+</file>
+
+<file path=ppt/slides/slide8.xml><?xml version="1.0" encoding="utf-8"?>
+<p:sld xmlns:a="http://schemas.openxmlformats.org/drawingml/2006/main" xmlns:p="http://schemas.openxmlformats.org/presentationml/2006/main" xmlns:r="http://schemas.openxmlformats.org/officeDocument/2006/relationships">
+  <p:cSld>
+    <p:spTree>
+      <p:nvGrpSpPr>
+        <p:cNvPr id="1" name=""/>
+        <p:cNvGrpSpPr/>
+        <p:nvPr/>
+      </p:nvGrpSpPr>
+      <p:grpSpPr/>
+      <p:sp>
+        <p:nvSpPr>
+          <p:cNvPr id="60" name="Google Shape;60;p14"/>
+          <p:cNvSpPr txBox="1"/>
+          <p:nvPr>
+            <p:ph type="title"/>
+          </p:nvPr>
+        </p:nvSpPr>
+        <p:spPr>
+          <a:xfrm>
+            <a:off x="311700" y="445025"/>
+            <a:ext cx="8520600" cy="572700"/>
+          </a:xfrm>
+          <a:prstGeom prst="rect">
+            <a:avLst/>
+          </a:prstGeom>
+        </p:spPr>
+        <p:txBody>
+          <a:bodyPr anchorCtr="0" anchor="t" bIns="91425" lIns="91425" spcFirstLastPara="1" rIns="91425" wrap="square" tIns="91425">
+            <a:normAutofit fontScale="90000"/>
+          </a:bodyPr>
+          <a:lstStyle/>
+          <a:p>
+            <a:pPr indent="0" lvl="0" marL="0" rtl="0" algn="l">
+              <a:spcBef>
+                <a:spcPts val="0"/>
+              </a:spcBef>
+              <a:spcAft>
+                <a:spcPts val="0"/>
+              </a:spcAft>
+              <a:buNone/>
+            </a:pPr>
+            <a:r>
+              <a:t>Step 3: Cooking the Eggs</a:t>
+            </a:r>
+            <a:endParaRPr/>
+          </a:p>
+        </p:txBody>
+      </p:sp>
+      <p:sp>
+        <p:nvSpPr>
+          <p:cNvPr id="61" name="Google Shape;61;p14"/>
+          <p:cNvSpPr txBox="1"/>
+          <p:nvPr>
+            <p:ph idx="1" type="body"/>
+          </p:nvPr>
+        </p:nvSpPr>
+        <p:spPr>
+          <a:xfrm>
+            <a:off x="311700" y="1152475"/>
+            <a:ext cx="8520600" cy="3416400"/>
+          </a:xfrm>
+          <a:prstGeom prst="rect">
+            <a:avLst/>
+          </a:prstGeom>
+        </p:spPr>
+        <p:txBody>
+          <a:bodyPr anchorCtr="0" anchor="t" bIns="91425" lIns="91425" spcFirstLastPara="1" rIns="91425" wrap="square" tIns="91425">
+            <a:normAutofit/>
+          </a:bodyPr>
+          <a:lstStyle/>
+          <a:p>
+            <a:pPr indent="0" lvl="0" marL="0" rtl="0" algn="l">
+              <a:spcBef>
+                <a:spcPts val="0"/>
+              </a:spcBef>
+              <a:spcAft>
+                <a:spcPts val="1200"/>
+              </a:spcAft>
+              <a:buNone/>
+            </a:pPr>
+            <a:r>
+              <a:t>Pour the beaten eggs into the pan. Gently stir with a spatula, scraping the bottom and sides.</a:t>
+            </a:r>
+            <a:endParaRPr>
+              <a:solidFill>
+                <a:schemeClr val="dk1"/>
+              </a:solidFill>
+            </a:endParaRPr>
+          </a:p>
+        </p:txBody>
+      </p:sp>
+    </p:spTree>
+  </p:cSld>
+  <p:clrMapOvr>
+    <a:masterClrMapping/>
+  </p:clrMapOvr>
+</p:sld>
+</file>
+
+<file path=ppt/slides/slide9.xml><?xml version="1.0" encoding="utf-8"?>
+<p:sld xmlns:a="http://schemas.openxmlformats.org/drawingml/2006/main" xmlns:p="http://schemas.openxmlformats.org/presentationml/2006/main" xmlns:r="http://schemas.openxmlformats.org/officeDocument/2006/relationships">
+  <p:cSld>
+    <p:spTree>
+      <p:nvGrpSpPr>
+        <p:cNvPr id="1" name=""/>
+        <p:cNvGrpSpPr/>
+        <p:nvPr/>
+      </p:nvGrpSpPr>
+      <p:grpSpPr/>
+      <p:sp>
+        <p:nvSpPr>
+          <p:cNvPr id="60" name="Google Shape;60;p14"/>
+          <p:cNvSpPr txBox="1"/>
+          <p:nvPr>
+            <p:ph type="title"/>
+          </p:nvPr>
+        </p:nvSpPr>
+        <p:spPr>
+          <a:xfrm>
+            <a:off x="311700" y="445025"/>
+            <a:ext cx="8520600" cy="572700"/>
+          </a:xfrm>
+          <a:prstGeom prst="rect">
+            <a:avLst/>
+          </a:prstGeom>
+        </p:spPr>
+        <p:txBody>
+          <a:bodyPr anchorCtr="0" anchor="t" bIns="91425" lIns="91425" spcFirstLastPara="1" rIns="91425" wrap="square" tIns="91425">
+            <a:normAutofit fontScale="90000"/>
+          </a:bodyPr>
+          <a:lstStyle/>
+          <a:p>
+            <a:pPr indent="0" lvl="0" marL="0" rtl="0" algn="l">
+              <a:spcBef>
+                <a:spcPts val="0"/>
+              </a:spcBef>
+              <a:spcAft>
+                <a:spcPts val="0"/>
+              </a:spcAft>
+              <a:buNone/>
+            </a:pPr>
+            <a:r>
+              <a:t>Step 4: Soft Scramble</a:t>
+            </a:r>
+            <a:endParaRPr/>
+          </a:p>
+        </p:txBody>
+      </p:sp>
+      <p:sp>
+        <p:nvSpPr>
+          <p:cNvPr id="61" name="Google Shape;61;p14"/>
+          <p:cNvSpPr txBox="1"/>
+          <p:nvPr>
+            <p:ph idx="1" type="body"/>
+          </p:nvPr>
+        </p:nvSpPr>
+        <p:spPr>
+          <a:xfrm>
+            <a:off x="311700" y="1152475"/>
+            <a:ext cx="8520600" cy="3416400"/>
+          </a:xfrm>
+          <a:prstGeom prst="rect">
+            <a:avLst/>
+          </a:prstGeom>
+        </p:spPr>
+        <p:txBody>
+          <a:bodyPr anchorCtr="0" anchor="t" bIns="91425" lIns="91425" spcFirstLastPara="1" rIns="91425" wrap="square" tIns="91425">
+            <a:normAutofit/>
+          </a:bodyPr>
+          <a:lstStyle/>
+          <a:p>
+            <a:pPr indent="0" lvl="0" marL="0" rtl="0" algn="l">
+              <a:spcBef>
+                <a:spcPts val="0"/>
+              </a:spcBef>
+              <a:spcAft>
+                <a:spcPts val="1200"/>
+              </a:spcAft>
+              <a:buNone/>
+            </a:pPr>
+            <a:r>
+              <a:t>Continue to stir, allowing the eggs to form soft curds. Avoid overcooking.</a:t>
             </a:r>
             <a:endParaRPr>
               <a:solidFill>

</xml_diff>

<commit_message>
system prompt and content slide prompt tweaking
</commit_message>
<xml_diff>
--- a/cool.pptx
+++ b/cool.pptx
@@ -14,15 +14,6 @@
     <p:sldId id="262" r:id="rId13"/>
     <p:sldId id="263" r:id="rId14"/>
     <p:sldId id="264" r:id="rId15"/>
-    <p:sldId id="265" r:id="rId16"/>
-    <p:sldId id="266" r:id="rId17"/>
-    <p:sldId id="267" r:id="rId18"/>
-    <p:sldId id="268" r:id="rId19"/>
-    <p:sldId id="269" r:id="rId20"/>
-    <p:sldId id="270" r:id="rId21"/>
-    <p:sldId id="271" r:id="rId22"/>
-    <p:sldId id="272" r:id="rId23"/>
-    <p:sldId id="273" r:id="rId24"/>
   </p:sldIdLst>
   <p:sldSz cx="9144000" cy="5143500" type="screen4x3"/>
   <p:notesSz cx="6858000" cy="9144000"/>
@@ -3127,12 +3118,12 @@
           </a:ln>
         </p:spPr>
         <p:txBody>
-          <a:bodyPr spcFirstLastPara="1" wrap="square" lIns="91425" tIns="91425" rIns="91425" bIns="91425" anchor="ctr" anchorCtr="0">
+          <a:bodyPr anchorCtr="0" anchor="ctr" bIns="91425" lIns="91425" spcFirstLastPara="1" rIns="91425" wrap="square" tIns="91425">
             <a:noAutofit/>
           </a:bodyPr>
           <a:lstStyle/>
           <a:p>
-            <a:pPr marL="0" lvl="0" indent="0" algn="l" rtl="0">
+            <a:pPr indent="0" lvl="0" marL="0" rtl="0" algn="l">
               <a:spcBef>
                 <a:spcPts val="0"/>
               </a:spcBef>
@@ -3141,6 +3132,9 @@
               </a:spcAft>
               <a:buNone/>
             </a:pPr>
+            <a:r>
+              <a:t/>
+            </a:r>
             <a:endParaRPr/>
           </a:p>
         </p:txBody>
@@ -3158,29 +3152,29 @@
           </a:xfrm>
           <a:prstGeom prst="diagStripe">
             <a:avLst>
-              <a:gd name="adj" fmla="val 50000"/>
+              <a:gd fmla="val 50000" name="adj"/>
             </a:avLst>
           </a:prstGeom>
           <a:solidFill>
             <a:srgbClr val="FFC971"/>
           </a:solidFill>
-          <a:ln w="9525" cap="flat" cmpd="sng">
+          <a:ln cap="flat" cmpd="sng" w="9525">
             <a:solidFill>
               <a:srgbClr val="FFC971"/>
             </a:solidFill>
             <a:prstDash val="solid"/>
             <a:round/>
-            <a:headEnd type="none" w="sm" len="sm"/>
-            <a:tailEnd type="none" w="sm" len="sm"/>
+            <a:headEnd len="sm" w="sm" type="none"/>
+            <a:tailEnd len="sm" w="sm" type="none"/>
           </a:ln>
         </p:spPr>
         <p:txBody>
-          <a:bodyPr spcFirstLastPara="1" wrap="square" lIns="91425" tIns="91425" rIns="91425" bIns="91425" anchor="ctr" anchorCtr="0">
+          <a:bodyPr anchorCtr="0" anchor="ctr" bIns="91425" lIns="91425" spcFirstLastPara="1" rIns="91425" wrap="square" tIns="91425">
             <a:noAutofit/>
           </a:bodyPr>
           <a:lstStyle/>
           <a:p>
-            <a:pPr marL="0" lvl="0" indent="0" algn="l" rtl="0">
+            <a:pPr indent="0" lvl="0" marL="0" rtl="0" algn="l">
               <a:spcBef>
                 <a:spcPts val="0"/>
               </a:spcBef>
@@ -3189,6 +3183,9 @@
               </a:spcAft>
               <a:buNone/>
             </a:pPr>
+            <a:r>
+              <a:t/>
+            </a:r>
             <a:endParaRPr/>
           </a:p>
         </p:txBody>
@@ -3213,12 +3210,12 @@
           </a:ln>
         </p:spPr>
         <p:txBody>
-          <a:bodyPr spcFirstLastPara="1" wrap="square" lIns="91425" tIns="91425" rIns="91425" bIns="91425" anchor="b" anchorCtr="0">
-            <a:noAutofit/>
+          <a:bodyPr anchorCtr="0" anchor="b" bIns="91425" lIns="91425" spcFirstLastPara="1" rIns="91425" wrap="square" tIns="91425">
+            <a:normAutofit/>
           </a:bodyPr>
           <a:lstStyle/>
           <a:p>
-            <a:pPr marL="0" lvl="0" indent="0" algn="ctr" rtl="0">
+            <a:pPr indent="0" lvl="0" marL="0" rtl="0" algn="ctr">
               <a:spcBef>
                 <a:spcPts val="0"/>
               </a:spcBef>
@@ -3234,7 +3231,7 @@
                 <a:cs typeface="Bungee"/>
                 <a:sym typeface="Bungee"/>
               </a:rPr>
-              <a:t>Decoding de_nuke: A Comprehensive History of an Iconic Counter-Strike Map</a:t>
+              <a:t>Sunny Side Up Eggs</a:t>
             </a:r>
             <a:endParaRPr sz="5200">
               <a:solidFill>
@@ -3268,12 +3265,12 @@
           </a:ln>
         </p:spPr>
         <p:txBody>
-          <a:bodyPr spcFirstLastPara="1" wrap="square" lIns="91425" tIns="91425" rIns="91425" bIns="91425" anchor="t" anchorCtr="0">
+          <a:bodyPr anchorCtr="0" anchor="t" bIns="91425" lIns="91425" spcFirstLastPara="1" rIns="91425" wrap="square" tIns="91425">
             <a:noAutofit/>
           </a:bodyPr>
           <a:lstStyle/>
           <a:p>
-            <a:pPr marL="0" lvl="0" indent="0" algn="ctr" rtl="0">
+            <a:pPr indent="0" lvl="0" marL="0" rtl="0" algn="ctr">
               <a:spcBef>
                 <a:spcPts val="0"/>
               </a:spcBef>
@@ -3292,7 +3289,7 @@
                 <a:cs typeface="Oswald"/>
                 <a:sym typeface="Oswald"/>
               </a:rPr>
-              <a:t>Exploring the Evolution, Strategy, and Legacy</a:t>
+              <a:t>8 Quick &amp; Easy Steps to the Perfect Breakfast</a:t>
             </a:r>
             <a:endParaRPr sz="2800">
               <a:solidFill>
@@ -3319,7 +3316,7 @@
           </a:xfrm>
           <a:prstGeom prst="donut">
             <a:avLst>
-              <a:gd name="adj" fmla="val 25000"/>
+              <a:gd fmla="val 25000" name="adj"/>
             </a:avLst>
           </a:prstGeom>
           <a:solidFill>
@@ -3330,12 +3327,12 @@
           </a:ln>
         </p:spPr>
         <p:txBody>
-          <a:bodyPr spcFirstLastPara="1" wrap="square" lIns="91425" tIns="91425" rIns="91425" bIns="91425" anchor="ctr" anchorCtr="0">
+          <a:bodyPr anchorCtr="0" anchor="ctr" bIns="91425" lIns="91425" spcFirstLastPara="1" rIns="91425" wrap="square" tIns="91425">
             <a:noAutofit/>
           </a:bodyPr>
           <a:lstStyle/>
           <a:p>
-            <a:pPr marL="0" lvl="0" indent="0" algn="l" rtl="0">
+            <a:pPr indent="0" lvl="0" marL="0" rtl="0" algn="l">
               <a:spcBef>
                 <a:spcPts val="0"/>
               </a:spcBef>
@@ -3344,2652 +3341,9 @@
               </a:spcAft>
               <a:buNone/>
             </a:pPr>
-            <a:endParaRPr/>
-          </a:p>
-        </p:txBody>
-      </p:sp>
-    </p:spTree>
-  </p:cSld>
-  <p:clrMapOvr>
-    <a:masterClrMapping/>
-  </p:clrMapOvr>
-</p:sld>
-</file>
-
-<file path=ppt/slides/slide10.xml><?xml version="1.0" encoding="utf-8"?>
-<p:sld xmlns:a="http://schemas.openxmlformats.org/drawingml/2006/main" xmlns:p="http://schemas.openxmlformats.org/presentationml/2006/main" xmlns:r="http://schemas.openxmlformats.org/officeDocument/2006/relationships">
-  <p:cSld>
-    <p:spTree>
-      <p:nvGrpSpPr>
-        <p:cNvPr id="1" name=""/>
-        <p:cNvGrpSpPr/>
-        <p:nvPr/>
-      </p:nvGrpSpPr>
-      <p:grpSpPr/>
-      <p:sp>
-        <p:nvSpPr>
-          <p:cNvPr id="63" name="Google Shape;63;p14"/>
-          <p:cNvSpPr/>
-          <p:nvPr/>
-        </p:nvSpPr>
-        <p:spPr>
-          <a:xfrm>
-            <a:off x="-54925" y="-1345525"/>
-            <a:ext cx="8816400" cy="7043400"/>
-          </a:xfrm>
-          <a:prstGeom prst="rect">
-            <a:avLst/>
-          </a:prstGeom>
-          <a:solidFill>
-            <a:srgbClr val="FFC971"/>
-          </a:solidFill>
-          <a:ln>
-            <a:noFill/>
-          </a:ln>
-        </p:spPr>
-        <p:txBody>
-          <a:bodyPr spcFirstLastPara="1" wrap="square" lIns="91425" tIns="91425" rIns="91425" bIns="91425" anchor="ctr" anchorCtr="0">
-            <a:noAutofit/>
-          </a:bodyPr>
-          <a:lstStyle/>
-          <a:p>
-            <a:pPr marL="0" lvl="0" indent="0" algn="l" rtl="0">
-              <a:spcBef>
-                <a:spcPts val="0"/>
-              </a:spcBef>
-              <a:spcAft>
-                <a:spcPts val="0"/>
-              </a:spcAft>
-              <a:buNone/>
-            </a:pPr>
-            <a:endParaRPr/>
-          </a:p>
-        </p:txBody>
-      </p:sp>
-      <p:sp>
-        <p:nvSpPr>
-          <p:cNvPr id="64" name="Google Shape;64;p14"/>
-          <p:cNvSpPr/>
-          <p:nvPr/>
-        </p:nvSpPr>
-        <p:spPr>
-          <a:xfrm rot="-5400000">
-            <a:off x="1434900" y="-1489525"/>
-            <a:ext cx="5162400" cy="8141400"/>
-          </a:xfrm>
-          <a:prstGeom prst="rtTriangle">
-            <a:avLst/>
-          </a:prstGeom>
-          <a:solidFill>
-            <a:srgbClr val="FFE599"/>
-          </a:solidFill>
-          <a:ln>
-            <a:noFill/>
-          </a:ln>
-        </p:spPr>
-        <p:txBody>
-          <a:bodyPr spcFirstLastPara="1" wrap="square" lIns="91425" tIns="91425" rIns="91425" bIns="91425" anchor="ctr" anchorCtr="0">
-            <a:noAutofit/>
-          </a:bodyPr>
-          <a:lstStyle/>
-          <a:p>
-            <a:pPr marL="0" lvl="0" indent="0" algn="l" rtl="0">
-              <a:spcBef>
-                <a:spcPts val="0"/>
-              </a:spcBef>
-              <a:spcAft>
-                <a:spcPts val="0"/>
-              </a:spcAft>
-              <a:buNone/>
-            </a:pPr>
-            <a:endParaRPr/>
-          </a:p>
-        </p:txBody>
-      </p:sp>
-      <p:sp>
-        <p:nvSpPr>
-          <p:cNvPr id="65" name="Google Shape;65;p14"/>
-          <p:cNvSpPr txBox="1"/>
-          <p:nvPr/>
-        </p:nvSpPr>
-        <p:spPr>
-          <a:xfrm>
-            <a:off x="311700" y="445025"/>
-            <a:ext cx="8520600" cy="572700"/>
-          </a:xfrm>
-          <a:prstGeom prst="rect">
-            <a:avLst/>
-          </a:prstGeom>
-          <a:noFill/>
-          <a:ln>
-            <a:noFill/>
-          </a:ln>
-        </p:spPr>
-        <p:txBody>
-          <a:bodyPr spcFirstLastPara="1" wrap="square" lIns="91425" tIns="91425" rIns="91425" bIns="91425" anchor="t" anchorCtr="0">
-            <a:noAutofit/>
-          </a:bodyPr>
-          <a:lstStyle/>
-          <a:p>
-            <a:pPr marL="0" lvl="0" indent="0" algn="l" rtl="0">
-              <a:spcBef>
-                <a:spcPts val="0"/>
-              </a:spcBef>
-              <a:spcAft>
-                <a:spcPts val="0"/>
-              </a:spcAft>
-              <a:buNone/>
-            </a:pPr>
-            <a:r>
-              <a:rPr lang="en" sz="2800">
-                <a:latin typeface="Bungee"/>
-                <a:ea typeface="Bungee"/>
-                <a:cs typeface="Bungee"/>
-                <a:sym typeface="Bungee"/>
-              </a:rPr>
-              <a:t>Memorable Matches: Highlights from Competitions on de_nuke</a:t>
-            </a:r>
-            <a:endParaRPr sz="2800">
-              <a:solidFill>
-                <a:srgbClr val="000000"/>
-              </a:solidFill>
-              <a:latin typeface="Bungee"/>
-              <a:ea typeface="Bungee"/>
-              <a:cs typeface="Bungee"/>
-              <a:sym typeface="Bungee"/>
-            </a:endParaRPr>
-          </a:p>
-        </p:txBody>
-      </p:sp>
-      <p:sp>
-        <p:nvSpPr>
-          <p:cNvPr id="66" name="Google Shape;66;p14"/>
-          <p:cNvSpPr txBox="1"/>
-          <p:nvPr/>
-        </p:nvSpPr>
-        <p:spPr>
-          <a:xfrm>
-            <a:off x="311700" y="1152475"/>
-            <a:ext cx="7422525" cy="3416400"/>
-          </a:xfrm>
-          <a:prstGeom prst="rect">
-            <a:avLst/>
-          </a:prstGeom>
-          <a:noFill/>
-          <a:ln>
-            <a:noFill/>
-          </a:ln>
-        </p:spPr>
-        <p:txBody>
-          <a:bodyPr spcFirstLastPara="1" wrap="square" lIns="91425" tIns="91425" rIns="91425" bIns="91425" anchor="t" anchorCtr="0">
-            <a:noAutofit/>
-          </a:bodyPr>
-          <a:lstStyle/>
-          <a:p>
-            <a:pPr marL="0" lvl="0" indent="0" algn="l" rtl="0">
-              <a:lnSpc>
-                <a:spcPct val="115000"/>
-              </a:lnSpc>
-              <a:spcBef>
-                <a:spcPts val="0"/>
-              </a:spcBef>
-              <a:spcAft>
-                <a:spcPts val="1200"/>
-              </a:spcAft>
-              <a:buNone/>
-            </a:pPr>
-            <a:r>
-              <a:rPr lang="en" sz="1800">
-                <a:solidFill>
-                  <a:srgbClr val="595959"/>
-                </a:solidFill>
-                <a:latin typeface="Oswald"/>
-                <a:ea typeface="Oswald"/>
-                <a:cs typeface="Oswald"/>
-                <a:sym typeface="Oswald"/>
-              </a:rPr>
-              <a:t>Relive the most memorable matches played on de_nuke, showcasing the high stakes and legendary plays that have taken place.</a:t>
-            </a:r>
-            <a:endParaRPr sz="1800">
-              <a:solidFill>
-                <a:srgbClr val="595959"/>
-              </a:solidFill>
-              <a:latin typeface="Oswald"/>
-              <a:ea typeface="Oswald"/>
-              <a:cs typeface="Oswald"/>
-              <a:sym typeface="Oswald"/>
-            </a:endParaRPr>
-          </a:p>
-        </p:txBody>
-      </p:sp>
-      <p:sp>
-        <p:nvSpPr>
-          <p:cNvPr id="67" name="Google Shape;67;p14"/>
-          <p:cNvSpPr/>
-          <p:nvPr/>
-        </p:nvSpPr>
-        <p:spPr>
-          <a:xfrm>
-            <a:off x="8074450" y="-1345525"/>
-            <a:ext cx="346800" cy="7043400"/>
-          </a:xfrm>
-          <a:prstGeom prst="rect">
-            <a:avLst/>
-          </a:prstGeom>
-          <a:solidFill>
-            <a:srgbClr val="FFB627"/>
-          </a:solidFill>
-          <a:ln>
-            <a:noFill/>
-          </a:ln>
-        </p:spPr>
-        <p:txBody>
-          <a:bodyPr spcFirstLastPara="1" wrap="square" lIns="91425" tIns="91425" rIns="91425" bIns="91425" anchor="ctr" anchorCtr="0">
-            <a:noAutofit/>
-          </a:bodyPr>
-          <a:lstStyle/>
-          <a:p>
-            <a:pPr marL="0" lvl="0" indent="0" algn="l" rtl="0">
-              <a:spcBef>
-                <a:spcPts val="0"/>
-              </a:spcBef>
-              <a:spcAft>
-                <a:spcPts val="0"/>
-              </a:spcAft>
-              <a:buNone/>
-            </a:pPr>
-            <a:endParaRPr/>
-          </a:p>
-        </p:txBody>
-      </p:sp>
-      <p:sp>
-        <p:nvSpPr>
-          <p:cNvPr id="68" name="Google Shape;68;p14"/>
-          <p:cNvSpPr/>
-          <p:nvPr/>
-        </p:nvSpPr>
-        <p:spPr>
-          <a:xfrm>
-            <a:off x="8421250" y="-1345525"/>
-            <a:ext cx="346800" cy="7043400"/>
-          </a:xfrm>
-          <a:prstGeom prst="rect">
-            <a:avLst/>
-          </a:prstGeom>
-          <a:solidFill>
-            <a:srgbClr val="FF9505"/>
-          </a:solidFill>
-          <a:ln>
-            <a:noFill/>
-          </a:ln>
-        </p:spPr>
-        <p:txBody>
-          <a:bodyPr spcFirstLastPara="1" wrap="square" lIns="91425" tIns="91425" rIns="91425" bIns="91425" anchor="ctr" anchorCtr="0">
-            <a:noAutofit/>
-          </a:bodyPr>
-          <a:lstStyle/>
-          <a:p>
-            <a:pPr marL="0" lvl="0" indent="0" algn="l" rtl="0">
-              <a:spcBef>
-                <a:spcPts val="0"/>
-              </a:spcBef>
-              <a:spcAft>
-                <a:spcPts val="0"/>
-              </a:spcAft>
-              <a:buNone/>
-            </a:pPr>
-            <a:endParaRPr/>
-          </a:p>
-        </p:txBody>
-      </p:sp>
-    </p:spTree>
-  </p:cSld>
-  <p:clrMapOvr>
-    <a:masterClrMapping/>
-  </p:clrMapOvr>
-</p:sld>
-</file>
-
-<file path=ppt/slides/slide11.xml><?xml version="1.0" encoding="utf-8"?>
-<p:sld xmlns:a="http://schemas.openxmlformats.org/drawingml/2006/main" xmlns:p="http://schemas.openxmlformats.org/presentationml/2006/main" xmlns:r="http://schemas.openxmlformats.org/officeDocument/2006/relationships">
-  <p:cSld>
-    <p:spTree>
-      <p:nvGrpSpPr>
-        <p:cNvPr id="1" name=""/>
-        <p:cNvGrpSpPr/>
-        <p:nvPr/>
-      </p:nvGrpSpPr>
-      <p:grpSpPr/>
-      <p:sp>
-        <p:nvSpPr>
-          <p:cNvPr id="63" name="Google Shape;63;p14"/>
-          <p:cNvSpPr/>
-          <p:nvPr/>
-        </p:nvSpPr>
-        <p:spPr>
-          <a:xfrm>
-            <a:off x="-54925" y="-1345525"/>
-            <a:ext cx="8816400" cy="7043400"/>
-          </a:xfrm>
-          <a:prstGeom prst="rect">
-            <a:avLst/>
-          </a:prstGeom>
-          <a:solidFill>
-            <a:srgbClr val="FFC971"/>
-          </a:solidFill>
-          <a:ln>
-            <a:noFill/>
-          </a:ln>
-        </p:spPr>
-        <p:txBody>
-          <a:bodyPr spcFirstLastPara="1" wrap="square" lIns="91425" tIns="91425" rIns="91425" bIns="91425" anchor="ctr" anchorCtr="0">
-            <a:noAutofit/>
-          </a:bodyPr>
-          <a:lstStyle/>
-          <a:p>
-            <a:pPr marL="0" lvl="0" indent="0" algn="l" rtl="0">
-              <a:spcBef>
-                <a:spcPts val="0"/>
-              </a:spcBef>
-              <a:spcAft>
-                <a:spcPts val="0"/>
-              </a:spcAft>
-              <a:buNone/>
-            </a:pPr>
-            <a:endParaRPr/>
-          </a:p>
-        </p:txBody>
-      </p:sp>
-      <p:sp>
-        <p:nvSpPr>
-          <p:cNvPr id="64" name="Google Shape;64;p14"/>
-          <p:cNvSpPr/>
-          <p:nvPr/>
-        </p:nvSpPr>
-        <p:spPr>
-          <a:xfrm rot="-5400000">
-            <a:off x="1434900" y="-1489525"/>
-            <a:ext cx="5162400" cy="8141400"/>
-          </a:xfrm>
-          <a:prstGeom prst="rtTriangle">
-            <a:avLst/>
-          </a:prstGeom>
-          <a:solidFill>
-            <a:srgbClr val="FFE599"/>
-          </a:solidFill>
-          <a:ln>
-            <a:noFill/>
-          </a:ln>
-        </p:spPr>
-        <p:txBody>
-          <a:bodyPr spcFirstLastPara="1" wrap="square" lIns="91425" tIns="91425" rIns="91425" bIns="91425" anchor="ctr" anchorCtr="0">
-            <a:noAutofit/>
-          </a:bodyPr>
-          <a:lstStyle/>
-          <a:p>
-            <a:pPr marL="0" lvl="0" indent="0" algn="l" rtl="0">
-              <a:spcBef>
-                <a:spcPts val="0"/>
-              </a:spcBef>
-              <a:spcAft>
-                <a:spcPts val="0"/>
-              </a:spcAft>
-              <a:buNone/>
-            </a:pPr>
-            <a:endParaRPr/>
-          </a:p>
-        </p:txBody>
-      </p:sp>
-      <p:sp>
-        <p:nvSpPr>
-          <p:cNvPr id="65" name="Google Shape;65;p14"/>
-          <p:cNvSpPr txBox="1"/>
-          <p:nvPr/>
-        </p:nvSpPr>
-        <p:spPr>
-          <a:xfrm>
-            <a:off x="311700" y="445025"/>
-            <a:ext cx="8520600" cy="572700"/>
-          </a:xfrm>
-          <a:prstGeom prst="rect">
-            <a:avLst/>
-          </a:prstGeom>
-          <a:noFill/>
-          <a:ln>
-            <a:noFill/>
-          </a:ln>
-        </p:spPr>
-        <p:txBody>
-          <a:bodyPr spcFirstLastPara="1" wrap="square" lIns="91425" tIns="91425" rIns="91425" bIns="91425" anchor="t" anchorCtr="0">
-            <a:noAutofit/>
-          </a:bodyPr>
-          <a:lstStyle/>
-          <a:p>
-            <a:pPr marL="0" lvl="0" indent="0" algn="l" rtl="0">
-              <a:spcBef>
-                <a:spcPts val="0"/>
-              </a:spcBef>
-              <a:spcAft>
-                <a:spcPts val="0"/>
-              </a:spcAft>
-              <a:buNone/>
-            </a:pPr>
-            <a:r>
-              <a:rPr lang="en" sz="2800">
-                <a:latin typeface="Bungee"/>
-                <a:ea typeface="Bungee"/>
-                <a:cs typeface="Bungee"/>
-                <a:sym typeface="Bungee"/>
-              </a:rPr>
-              <a:t>Map Aesthetics: Graphical Updates Through the Years</a:t>
-            </a:r>
-            <a:endParaRPr sz="2800">
-              <a:solidFill>
-                <a:srgbClr val="000000"/>
-              </a:solidFill>
-              <a:latin typeface="Bungee"/>
-              <a:ea typeface="Bungee"/>
-              <a:cs typeface="Bungee"/>
-              <a:sym typeface="Bungee"/>
-            </a:endParaRPr>
-          </a:p>
-        </p:txBody>
-      </p:sp>
-      <p:sp>
-        <p:nvSpPr>
-          <p:cNvPr id="66" name="Google Shape;66;p14"/>
-          <p:cNvSpPr txBox="1"/>
-          <p:nvPr/>
-        </p:nvSpPr>
-        <p:spPr>
-          <a:xfrm>
-            <a:off x="311700" y="1152475"/>
-            <a:ext cx="7422525" cy="3416400"/>
-          </a:xfrm>
-          <a:prstGeom prst="rect">
-            <a:avLst/>
-          </a:prstGeom>
-          <a:noFill/>
-          <a:ln>
-            <a:noFill/>
-          </a:ln>
-        </p:spPr>
-        <p:txBody>
-          <a:bodyPr spcFirstLastPara="1" wrap="square" lIns="91425" tIns="91425" rIns="91425" bIns="91425" anchor="t" anchorCtr="0">
-            <a:noAutofit/>
-          </a:bodyPr>
-          <a:lstStyle/>
-          <a:p>
-            <a:pPr marL="0" lvl="0" indent="0" algn="l" rtl="0">
-              <a:lnSpc>
-                <a:spcPct val="115000"/>
-              </a:lnSpc>
-              <a:spcBef>
-                <a:spcPts val="0"/>
-              </a:spcBef>
-              <a:spcAft>
-                <a:spcPts val="1200"/>
-              </a:spcAft>
-              <a:buNone/>
-            </a:pPr>
-            <a:r>
-              <a:rPr lang="en" sz="1800">
-                <a:solidFill>
-                  <a:srgbClr val="595959"/>
-                </a:solidFill>
-                <a:latin typeface="Oswald"/>
-                <a:ea typeface="Oswald"/>
-                <a:cs typeface="Oswald"/>
-                <a:sym typeface="Oswald"/>
-              </a:rPr>
-              <a:t>Witness the transformation of de_nuke's visuals with each graphical update, reflecting the advances in game development technology.</a:t>
-            </a:r>
-            <a:endParaRPr sz="1800">
-              <a:solidFill>
-                <a:srgbClr val="595959"/>
-              </a:solidFill>
-              <a:latin typeface="Oswald"/>
-              <a:ea typeface="Oswald"/>
-              <a:cs typeface="Oswald"/>
-              <a:sym typeface="Oswald"/>
-            </a:endParaRPr>
-          </a:p>
-        </p:txBody>
-      </p:sp>
-      <p:sp>
-        <p:nvSpPr>
-          <p:cNvPr id="67" name="Google Shape;67;p14"/>
-          <p:cNvSpPr/>
-          <p:nvPr/>
-        </p:nvSpPr>
-        <p:spPr>
-          <a:xfrm>
-            <a:off x="8074450" y="-1345525"/>
-            <a:ext cx="346800" cy="7043400"/>
-          </a:xfrm>
-          <a:prstGeom prst="rect">
-            <a:avLst/>
-          </a:prstGeom>
-          <a:solidFill>
-            <a:srgbClr val="FFB627"/>
-          </a:solidFill>
-          <a:ln>
-            <a:noFill/>
-          </a:ln>
-        </p:spPr>
-        <p:txBody>
-          <a:bodyPr spcFirstLastPara="1" wrap="square" lIns="91425" tIns="91425" rIns="91425" bIns="91425" anchor="ctr" anchorCtr="0">
-            <a:noAutofit/>
-          </a:bodyPr>
-          <a:lstStyle/>
-          <a:p>
-            <a:pPr marL="0" lvl="0" indent="0" algn="l" rtl="0">
-              <a:spcBef>
-                <a:spcPts val="0"/>
-              </a:spcBef>
-              <a:spcAft>
-                <a:spcPts val="0"/>
-              </a:spcAft>
-              <a:buNone/>
-            </a:pPr>
-            <a:endParaRPr/>
-          </a:p>
-        </p:txBody>
-      </p:sp>
-      <p:sp>
-        <p:nvSpPr>
-          <p:cNvPr id="68" name="Google Shape;68;p14"/>
-          <p:cNvSpPr/>
-          <p:nvPr/>
-        </p:nvSpPr>
-        <p:spPr>
-          <a:xfrm>
-            <a:off x="8421250" y="-1345525"/>
-            <a:ext cx="346800" cy="7043400"/>
-          </a:xfrm>
-          <a:prstGeom prst="rect">
-            <a:avLst/>
-          </a:prstGeom>
-          <a:solidFill>
-            <a:srgbClr val="FF9505"/>
-          </a:solidFill>
-          <a:ln>
-            <a:noFill/>
-          </a:ln>
-        </p:spPr>
-        <p:txBody>
-          <a:bodyPr spcFirstLastPara="1" wrap="square" lIns="91425" tIns="91425" rIns="91425" bIns="91425" anchor="ctr" anchorCtr="0">
-            <a:noAutofit/>
-          </a:bodyPr>
-          <a:lstStyle/>
-          <a:p>
-            <a:pPr marL="0" lvl="0" indent="0" algn="l" rtl="0">
-              <a:spcBef>
-                <a:spcPts val="0"/>
-              </a:spcBef>
-              <a:spcAft>
-                <a:spcPts val="0"/>
-              </a:spcAft>
-              <a:buNone/>
-            </a:pPr>
-            <a:endParaRPr/>
-          </a:p>
-        </p:txBody>
-      </p:sp>
-    </p:spTree>
-  </p:cSld>
-  <p:clrMapOvr>
-    <a:masterClrMapping/>
-  </p:clrMapOvr>
-</p:sld>
-</file>
-
-<file path=ppt/slides/slide12.xml><?xml version="1.0" encoding="utf-8"?>
-<p:sld xmlns:a="http://schemas.openxmlformats.org/drawingml/2006/main" xmlns:p="http://schemas.openxmlformats.org/presentationml/2006/main" xmlns:r="http://schemas.openxmlformats.org/officeDocument/2006/relationships">
-  <p:cSld>
-    <p:spTree>
-      <p:nvGrpSpPr>
-        <p:cNvPr id="1" name=""/>
-        <p:cNvGrpSpPr/>
-        <p:nvPr/>
-      </p:nvGrpSpPr>
-      <p:grpSpPr/>
-      <p:sp>
-        <p:nvSpPr>
-          <p:cNvPr id="63" name="Google Shape;63;p14"/>
-          <p:cNvSpPr/>
-          <p:nvPr/>
-        </p:nvSpPr>
-        <p:spPr>
-          <a:xfrm>
-            <a:off x="-54925" y="-1345525"/>
-            <a:ext cx="8816400" cy="7043400"/>
-          </a:xfrm>
-          <a:prstGeom prst="rect">
-            <a:avLst/>
-          </a:prstGeom>
-          <a:solidFill>
-            <a:srgbClr val="FFC971"/>
-          </a:solidFill>
-          <a:ln>
-            <a:noFill/>
-          </a:ln>
-        </p:spPr>
-        <p:txBody>
-          <a:bodyPr spcFirstLastPara="1" wrap="square" lIns="91425" tIns="91425" rIns="91425" bIns="91425" anchor="ctr" anchorCtr="0">
-            <a:noAutofit/>
-          </a:bodyPr>
-          <a:lstStyle/>
-          <a:p>
-            <a:pPr marL="0" lvl="0" indent="0" algn="l" rtl="0">
-              <a:spcBef>
-                <a:spcPts val="0"/>
-              </a:spcBef>
-              <a:spcAft>
-                <a:spcPts val="0"/>
-              </a:spcAft>
-              <a:buNone/>
-            </a:pPr>
-            <a:endParaRPr/>
-          </a:p>
-        </p:txBody>
-      </p:sp>
-      <p:sp>
-        <p:nvSpPr>
-          <p:cNvPr id="64" name="Google Shape;64;p14"/>
-          <p:cNvSpPr/>
-          <p:nvPr/>
-        </p:nvSpPr>
-        <p:spPr>
-          <a:xfrm rot="-5400000">
-            <a:off x="1434900" y="-1489525"/>
-            <a:ext cx="5162400" cy="8141400"/>
-          </a:xfrm>
-          <a:prstGeom prst="rtTriangle">
-            <a:avLst/>
-          </a:prstGeom>
-          <a:solidFill>
-            <a:srgbClr val="FFE599"/>
-          </a:solidFill>
-          <a:ln>
-            <a:noFill/>
-          </a:ln>
-        </p:spPr>
-        <p:txBody>
-          <a:bodyPr spcFirstLastPara="1" wrap="square" lIns="91425" tIns="91425" rIns="91425" bIns="91425" anchor="ctr" anchorCtr="0">
-            <a:noAutofit/>
-          </a:bodyPr>
-          <a:lstStyle/>
-          <a:p>
-            <a:pPr marL="0" lvl="0" indent="0" algn="l" rtl="0">
-              <a:spcBef>
-                <a:spcPts val="0"/>
-              </a:spcBef>
-              <a:spcAft>
-                <a:spcPts val="0"/>
-              </a:spcAft>
-              <a:buNone/>
-            </a:pPr>
-            <a:endParaRPr/>
-          </a:p>
-        </p:txBody>
-      </p:sp>
-      <p:sp>
-        <p:nvSpPr>
-          <p:cNvPr id="65" name="Google Shape;65;p14"/>
-          <p:cNvSpPr txBox="1"/>
-          <p:nvPr/>
-        </p:nvSpPr>
-        <p:spPr>
-          <a:xfrm>
-            <a:off x="311700" y="445025"/>
-            <a:ext cx="8520600" cy="572700"/>
-          </a:xfrm>
-          <a:prstGeom prst="rect">
-            <a:avLst/>
-          </a:prstGeom>
-          <a:noFill/>
-          <a:ln>
-            <a:noFill/>
-          </a:ln>
-        </p:spPr>
-        <p:txBody>
-          <a:bodyPr spcFirstLastPara="1" wrap="square" lIns="91425" tIns="91425" rIns="91425" bIns="91425" anchor="t" anchorCtr="0">
-            <a:noAutofit/>
-          </a:bodyPr>
-          <a:lstStyle/>
-          <a:p>
-            <a:pPr marL="0" lvl="0" indent="0" algn="l" rtl="0">
-              <a:spcBef>
-                <a:spcPts val="0"/>
-              </a:spcBef>
-              <a:spcAft>
-                <a:spcPts val="0"/>
-              </a:spcAft>
-              <a:buNone/>
-            </a:pPr>
-            <a:r>
-              <a:rPr lang="en" sz="2800">
-                <a:latin typeface="Bungee"/>
-                <a:ea typeface="Bungee"/>
-                <a:cs typeface="Bungee"/>
-                <a:sym typeface="Bungee"/>
-              </a:rPr>
-              <a:t>Player and Community Perspectives on de_nuke</a:t>
-            </a:r>
-            <a:endParaRPr sz="2800">
-              <a:solidFill>
-                <a:srgbClr val="000000"/>
-              </a:solidFill>
-              <a:latin typeface="Bungee"/>
-              <a:ea typeface="Bungee"/>
-              <a:cs typeface="Bungee"/>
-              <a:sym typeface="Bungee"/>
-            </a:endParaRPr>
-          </a:p>
-        </p:txBody>
-      </p:sp>
-      <p:sp>
-        <p:nvSpPr>
-          <p:cNvPr id="66" name="Google Shape;66;p14"/>
-          <p:cNvSpPr txBox="1"/>
-          <p:nvPr/>
-        </p:nvSpPr>
-        <p:spPr>
-          <a:xfrm>
-            <a:off x="311700" y="1152475"/>
-            <a:ext cx="7422525" cy="3416400"/>
-          </a:xfrm>
-          <a:prstGeom prst="rect">
-            <a:avLst/>
-          </a:prstGeom>
-          <a:noFill/>
-          <a:ln>
-            <a:noFill/>
-          </a:ln>
-        </p:spPr>
-        <p:txBody>
-          <a:bodyPr spcFirstLastPara="1" wrap="square" lIns="91425" tIns="91425" rIns="91425" bIns="91425" anchor="t" anchorCtr="0">
-            <a:noAutofit/>
-          </a:bodyPr>
-          <a:lstStyle/>
-          <a:p>
-            <a:pPr marL="0" lvl="0" indent="0" algn="l" rtl="0">
-              <a:lnSpc>
-                <a:spcPct val="115000"/>
-              </a:lnSpc>
-              <a:spcBef>
-                <a:spcPts val="0"/>
-              </a:spcBef>
-              <a:spcAft>
-                <a:spcPts val="1200"/>
-              </a:spcAft>
-              <a:buNone/>
-            </a:pPr>
-            <a:r>
-              <a:rPr lang="en" sz="1800">
-                <a:solidFill>
-                  <a:srgbClr val="595959"/>
-                </a:solidFill>
-                <a:latin typeface="Oswald"/>
-                <a:ea typeface="Oswald"/>
-                <a:cs typeface="Oswald"/>
-                <a:sym typeface="Oswald"/>
-              </a:rPr>
-              <a:t>Gauge the varied opinions and perspectives from the player community regarding the layout, balance, and design of de_nuke.</a:t>
-            </a:r>
-            <a:endParaRPr sz="1800">
-              <a:solidFill>
-                <a:srgbClr val="595959"/>
-              </a:solidFill>
-              <a:latin typeface="Oswald"/>
-              <a:ea typeface="Oswald"/>
-              <a:cs typeface="Oswald"/>
-              <a:sym typeface="Oswald"/>
-            </a:endParaRPr>
-          </a:p>
-        </p:txBody>
-      </p:sp>
-      <p:sp>
-        <p:nvSpPr>
-          <p:cNvPr id="67" name="Google Shape;67;p14"/>
-          <p:cNvSpPr/>
-          <p:nvPr/>
-        </p:nvSpPr>
-        <p:spPr>
-          <a:xfrm>
-            <a:off x="8074450" y="-1345525"/>
-            <a:ext cx="346800" cy="7043400"/>
-          </a:xfrm>
-          <a:prstGeom prst="rect">
-            <a:avLst/>
-          </a:prstGeom>
-          <a:solidFill>
-            <a:srgbClr val="FFB627"/>
-          </a:solidFill>
-          <a:ln>
-            <a:noFill/>
-          </a:ln>
-        </p:spPr>
-        <p:txBody>
-          <a:bodyPr spcFirstLastPara="1" wrap="square" lIns="91425" tIns="91425" rIns="91425" bIns="91425" anchor="ctr" anchorCtr="0">
-            <a:noAutofit/>
-          </a:bodyPr>
-          <a:lstStyle/>
-          <a:p>
-            <a:pPr marL="0" lvl="0" indent="0" algn="l" rtl="0">
-              <a:spcBef>
-                <a:spcPts val="0"/>
-              </a:spcBef>
-              <a:spcAft>
-                <a:spcPts val="0"/>
-              </a:spcAft>
-              <a:buNone/>
-            </a:pPr>
-            <a:endParaRPr/>
-          </a:p>
-        </p:txBody>
-      </p:sp>
-      <p:sp>
-        <p:nvSpPr>
-          <p:cNvPr id="68" name="Google Shape;68;p14"/>
-          <p:cNvSpPr/>
-          <p:nvPr/>
-        </p:nvSpPr>
-        <p:spPr>
-          <a:xfrm>
-            <a:off x="8421250" y="-1345525"/>
-            <a:ext cx="346800" cy="7043400"/>
-          </a:xfrm>
-          <a:prstGeom prst="rect">
-            <a:avLst/>
-          </a:prstGeom>
-          <a:solidFill>
-            <a:srgbClr val="FF9505"/>
-          </a:solidFill>
-          <a:ln>
-            <a:noFill/>
-          </a:ln>
-        </p:spPr>
-        <p:txBody>
-          <a:bodyPr spcFirstLastPara="1" wrap="square" lIns="91425" tIns="91425" rIns="91425" bIns="91425" anchor="ctr" anchorCtr="0">
-            <a:noAutofit/>
-          </a:bodyPr>
-          <a:lstStyle/>
-          <a:p>
-            <a:pPr marL="0" lvl="0" indent="0" algn="l" rtl="0">
-              <a:spcBef>
-                <a:spcPts val="0"/>
-              </a:spcBef>
-              <a:spcAft>
-                <a:spcPts val="0"/>
-              </a:spcAft>
-              <a:buNone/>
-            </a:pPr>
-            <a:endParaRPr/>
-          </a:p>
-        </p:txBody>
-      </p:sp>
-    </p:spTree>
-  </p:cSld>
-  <p:clrMapOvr>
-    <a:masterClrMapping/>
-  </p:clrMapOvr>
-</p:sld>
-</file>
-
-<file path=ppt/slides/slide13.xml><?xml version="1.0" encoding="utf-8"?>
-<p:sld xmlns:a="http://schemas.openxmlformats.org/drawingml/2006/main" xmlns:p="http://schemas.openxmlformats.org/presentationml/2006/main" xmlns:r="http://schemas.openxmlformats.org/officeDocument/2006/relationships">
-  <p:cSld>
-    <p:spTree>
-      <p:nvGrpSpPr>
-        <p:cNvPr id="1" name=""/>
-        <p:cNvGrpSpPr/>
-        <p:nvPr/>
-      </p:nvGrpSpPr>
-      <p:grpSpPr/>
-      <p:sp>
-        <p:nvSpPr>
-          <p:cNvPr id="63" name="Google Shape;63;p14"/>
-          <p:cNvSpPr/>
-          <p:nvPr/>
-        </p:nvSpPr>
-        <p:spPr>
-          <a:xfrm>
-            <a:off x="-54925" y="-1345525"/>
-            <a:ext cx="8816400" cy="7043400"/>
-          </a:xfrm>
-          <a:prstGeom prst="rect">
-            <a:avLst/>
-          </a:prstGeom>
-          <a:solidFill>
-            <a:srgbClr val="FFC971"/>
-          </a:solidFill>
-          <a:ln>
-            <a:noFill/>
-          </a:ln>
-        </p:spPr>
-        <p:txBody>
-          <a:bodyPr spcFirstLastPara="1" wrap="square" lIns="91425" tIns="91425" rIns="91425" bIns="91425" anchor="ctr" anchorCtr="0">
-            <a:noAutofit/>
-          </a:bodyPr>
-          <a:lstStyle/>
-          <a:p>
-            <a:pPr marL="0" lvl="0" indent="0" algn="l" rtl="0">
-              <a:spcBef>
-                <a:spcPts val="0"/>
-              </a:spcBef>
-              <a:spcAft>
-                <a:spcPts val="0"/>
-              </a:spcAft>
-              <a:buNone/>
-            </a:pPr>
-            <a:endParaRPr/>
-          </a:p>
-        </p:txBody>
-      </p:sp>
-      <p:sp>
-        <p:nvSpPr>
-          <p:cNvPr id="64" name="Google Shape;64;p14"/>
-          <p:cNvSpPr/>
-          <p:nvPr/>
-        </p:nvSpPr>
-        <p:spPr>
-          <a:xfrm rot="-5400000">
-            <a:off x="1434900" y="-1489525"/>
-            <a:ext cx="5162400" cy="8141400"/>
-          </a:xfrm>
-          <a:prstGeom prst="rtTriangle">
-            <a:avLst/>
-          </a:prstGeom>
-          <a:solidFill>
-            <a:srgbClr val="FFE599"/>
-          </a:solidFill>
-          <a:ln>
-            <a:noFill/>
-          </a:ln>
-        </p:spPr>
-        <p:txBody>
-          <a:bodyPr spcFirstLastPara="1" wrap="square" lIns="91425" tIns="91425" rIns="91425" bIns="91425" anchor="ctr" anchorCtr="0">
-            <a:noAutofit/>
-          </a:bodyPr>
-          <a:lstStyle/>
-          <a:p>
-            <a:pPr marL="0" lvl="0" indent="0" algn="l" rtl="0">
-              <a:spcBef>
-                <a:spcPts val="0"/>
-              </a:spcBef>
-              <a:spcAft>
-                <a:spcPts val="0"/>
-              </a:spcAft>
-              <a:buNone/>
-            </a:pPr>
-            <a:endParaRPr/>
-          </a:p>
-        </p:txBody>
-      </p:sp>
-      <p:sp>
-        <p:nvSpPr>
-          <p:cNvPr id="65" name="Google Shape;65;p14"/>
-          <p:cNvSpPr txBox="1"/>
-          <p:nvPr/>
-        </p:nvSpPr>
-        <p:spPr>
-          <a:xfrm>
-            <a:off x="311700" y="445025"/>
-            <a:ext cx="8520600" cy="572700"/>
-          </a:xfrm>
-          <a:prstGeom prst="rect">
-            <a:avLst/>
-          </a:prstGeom>
-          <a:noFill/>
-          <a:ln>
-            <a:noFill/>
-          </a:ln>
-        </p:spPr>
-        <p:txBody>
-          <a:bodyPr spcFirstLastPara="1" wrap="square" lIns="91425" tIns="91425" rIns="91425" bIns="91425" anchor="t" anchorCtr="0">
-            <a:noAutofit/>
-          </a:bodyPr>
-          <a:lstStyle/>
-          <a:p>
-            <a:pPr marL="0" lvl="0" indent="0" algn="l" rtl="0">
-              <a:spcBef>
-                <a:spcPts val="0"/>
-              </a:spcBef>
-              <a:spcAft>
-                <a:spcPts val="0"/>
-              </a:spcAft>
-              <a:buNone/>
-            </a:pPr>
-            <a:r>
-              <a:rPr lang="en" sz="2800">
-                <a:latin typeface="Bungee"/>
-                <a:ea typeface="Bungee"/>
-                <a:cs typeface="Bungee"/>
-                <a:sym typeface="Bungee"/>
-              </a:rPr>
-              <a:t>Balancing Act: Addressing de_nuke’s CT-T Bias Controversies</a:t>
-            </a:r>
-            <a:endParaRPr sz="2800">
-              <a:solidFill>
-                <a:srgbClr val="000000"/>
-              </a:solidFill>
-              <a:latin typeface="Bungee"/>
-              <a:ea typeface="Bungee"/>
-              <a:cs typeface="Bungee"/>
-              <a:sym typeface="Bungee"/>
-            </a:endParaRPr>
-          </a:p>
-        </p:txBody>
-      </p:sp>
-      <p:sp>
-        <p:nvSpPr>
-          <p:cNvPr id="66" name="Google Shape;66;p14"/>
-          <p:cNvSpPr txBox="1"/>
-          <p:nvPr/>
-        </p:nvSpPr>
-        <p:spPr>
-          <a:xfrm>
-            <a:off x="311700" y="1152475"/>
-            <a:ext cx="7422525" cy="3416400"/>
-          </a:xfrm>
-          <a:prstGeom prst="rect">
-            <a:avLst/>
-          </a:prstGeom>
-          <a:noFill/>
-          <a:ln>
-            <a:noFill/>
-          </a:ln>
-        </p:spPr>
-        <p:txBody>
-          <a:bodyPr spcFirstLastPara="1" wrap="square" lIns="91425" tIns="91425" rIns="91425" bIns="91425" anchor="t" anchorCtr="0">
-            <a:noAutofit/>
-          </a:bodyPr>
-          <a:lstStyle/>
-          <a:p>
-            <a:pPr marL="0" lvl="0" indent="0" algn="l" rtl="0">
-              <a:lnSpc>
-                <a:spcPct val="115000"/>
-              </a:lnSpc>
-              <a:spcBef>
-                <a:spcPts val="0"/>
-              </a:spcBef>
-              <a:spcAft>
-                <a:spcPts val="1200"/>
-              </a:spcAft>
-              <a:buNone/>
-            </a:pPr>
-            <a:r>
-              <a:rPr lang="en" sz="1800">
-                <a:solidFill>
-                  <a:srgbClr val="595959"/>
-                </a:solidFill>
-                <a:latin typeface="Oswald"/>
-                <a:ea typeface="Oswald"/>
-                <a:cs typeface="Oswald"/>
-                <a:sym typeface="Oswald"/>
-              </a:rPr>
-              <a:t>Examine the ongoing debates about de_nuke's balance between Counter-Terrorist and Terrorist sides, and efforts to address potential biases.</a:t>
-            </a:r>
-            <a:endParaRPr sz="1800">
-              <a:solidFill>
-                <a:srgbClr val="595959"/>
-              </a:solidFill>
-              <a:latin typeface="Oswald"/>
-              <a:ea typeface="Oswald"/>
-              <a:cs typeface="Oswald"/>
-              <a:sym typeface="Oswald"/>
-            </a:endParaRPr>
-          </a:p>
-        </p:txBody>
-      </p:sp>
-      <p:sp>
-        <p:nvSpPr>
-          <p:cNvPr id="67" name="Google Shape;67;p14"/>
-          <p:cNvSpPr/>
-          <p:nvPr/>
-        </p:nvSpPr>
-        <p:spPr>
-          <a:xfrm>
-            <a:off x="8074450" y="-1345525"/>
-            <a:ext cx="346800" cy="7043400"/>
-          </a:xfrm>
-          <a:prstGeom prst="rect">
-            <a:avLst/>
-          </a:prstGeom>
-          <a:solidFill>
-            <a:srgbClr val="FFB627"/>
-          </a:solidFill>
-          <a:ln>
-            <a:noFill/>
-          </a:ln>
-        </p:spPr>
-        <p:txBody>
-          <a:bodyPr spcFirstLastPara="1" wrap="square" lIns="91425" tIns="91425" rIns="91425" bIns="91425" anchor="ctr" anchorCtr="0">
-            <a:noAutofit/>
-          </a:bodyPr>
-          <a:lstStyle/>
-          <a:p>
-            <a:pPr marL="0" lvl="0" indent="0" algn="l" rtl="0">
-              <a:spcBef>
-                <a:spcPts val="0"/>
-              </a:spcBef>
-              <a:spcAft>
-                <a:spcPts val="0"/>
-              </a:spcAft>
-              <a:buNone/>
-            </a:pPr>
-            <a:endParaRPr/>
-          </a:p>
-        </p:txBody>
-      </p:sp>
-      <p:sp>
-        <p:nvSpPr>
-          <p:cNvPr id="68" name="Google Shape;68;p14"/>
-          <p:cNvSpPr/>
-          <p:nvPr/>
-        </p:nvSpPr>
-        <p:spPr>
-          <a:xfrm>
-            <a:off x="8421250" y="-1345525"/>
-            <a:ext cx="346800" cy="7043400"/>
-          </a:xfrm>
-          <a:prstGeom prst="rect">
-            <a:avLst/>
-          </a:prstGeom>
-          <a:solidFill>
-            <a:srgbClr val="FF9505"/>
-          </a:solidFill>
-          <a:ln>
-            <a:noFill/>
-          </a:ln>
-        </p:spPr>
-        <p:txBody>
-          <a:bodyPr spcFirstLastPara="1" wrap="square" lIns="91425" tIns="91425" rIns="91425" bIns="91425" anchor="ctr" anchorCtr="0">
-            <a:noAutofit/>
-          </a:bodyPr>
-          <a:lstStyle/>
-          <a:p>
-            <a:pPr marL="0" lvl="0" indent="0" algn="l" rtl="0">
-              <a:spcBef>
-                <a:spcPts val="0"/>
-              </a:spcBef>
-              <a:spcAft>
-                <a:spcPts val="0"/>
-              </a:spcAft>
-              <a:buNone/>
-            </a:pPr>
-            <a:endParaRPr/>
-          </a:p>
-        </p:txBody>
-      </p:sp>
-    </p:spTree>
-  </p:cSld>
-  <p:clrMapOvr>
-    <a:masterClrMapping/>
-  </p:clrMapOvr>
-</p:sld>
-</file>
-
-<file path=ppt/slides/slide14.xml><?xml version="1.0" encoding="utf-8"?>
-<p:sld xmlns:a="http://schemas.openxmlformats.org/drawingml/2006/main" xmlns:p="http://schemas.openxmlformats.org/presentationml/2006/main" xmlns:r="http://schemas.openxmlformats.org/officeDocument/2006/relationships">
-  <p:cSld>
-    <p:spTree>
-      <p:nvGrpSpPr>
-        <p:cNvPr id="1" name=""/>
-        <p:cNvGrpSpPr/>
-        <p:nvPr/>
-      </p:nvGrpSpPr>
-      <p:grpSpPr/>
-      <p:sp>
-        <p:nvSpPr>
-          <p:cNvPr id="63" name="Google Shape;63;p14"/>
-          <p:cNvSpPr/>
-          <p:nvPr/>
-        </p:nvSpPr>
-        <p:spPr>
-          <a:xfrm>
-            <a:off x="-54925" y="-1345525"/>
-            <a:ext cx="8816400" cy="7043400"/>
-          </a:xfrm>
-          <a:prstGeom prst="rect">
-            <a:avLst/>
-          </a:prstGeom>
-          <a:solidFill>
-            <a:srgbClr val="FFC971"/>
-          </a:solidFill>
-          <a:ln>
-            <a:noFill/>
-          </a:ln>
-        </p:spPr>
-        <p:txBody>
-          <a:bodyPr spcFirstLastPara="1" wrap="square" lIns="91425" tIns="91425" rIns="91425" bIns="91425" anchor="ctr" anchorCtr="0">
-            <a:noAutofit/>
-          </a:bodyPr>
-          <a:lstStyle/>
-          <a:p>
-            <a:pPr marL="0" lvl="0" indent="0" algn="l" rtl="0">
-              <a:spcBef>
-                <a:spcPts val="0"/>
-              </a:spcBef>
-              <a:spcAft>
-                <a:spcPts val="0"/>
-              </a:spcAft>
-              <a:buNone/>
-            </a:pPr>
-            <a:endParaRPr/>
-          </a:p>
-        </p:txBody>
-      </p:sp>
-      <p:sp>
-        <p:nvSpPr>
-          <p:cNvPr id="64" name="Google Shape;64;p14"/>
-          <p:cNvSpPr/>
-          <p:nvPr/>
-        </p:nvSpPr>
-        <p:spPr>
-          <a:xfrm rot="-5400000">
-            <a:off x="1434900" y="-1489525"/>
-            <a:ext cx="5162400" cy="8141400"/>
-          </a:xfrm>
-          <a:prstGeom prst="rtTriangle">
-            <a:avLst/>
-          </a:prstGeom>
-          <a:solidFill>
-            <a:srgbClr val="FFE599"/>
-          </a:solidFill>
-          <a:ln>
-            <a:noFill/>
-          </a:ln>
-        </p:spPr>
-        <p:txBody>
-          <a:bodyPr spcFirstLastPara="1" wrap="square" lIns="91425" tIns="91425" rIns="91425" bIns="91425" anchor="ctr" anchorCtr="0">
-            <a:noAutofit/>
-          </a:bodyPr>
-          <a:lstStyle/>
-          <a:p>
-            <a:pPr marL="0" lvl="0" indent="0" algn="l" rtl="0">
-              <a:spcBef>
-                <a:spcPts val="0"/>
-              </a:spcBef>
-              <a:spcAft>
-                <a:spcPts val="0"/>
-              </a:spcAft>
-              <a:buNone/>
-            </a:pPr>
-            <a:endParaRPr/>
-          </a:p>
-        </p:txBody>
-      </p:sp>
-      <p:sp>
-        <p:nvSpPr>
-          <p:cNvPr id="65" name="Google Shape;65;p14"/>
-          <p:cNvSpPr txBox="1"/>
-          <p:nvPr/>
-        </p:nvSpPr>
-        <p:spPr>
-          <a:xfrm>
-            <a:off x="311700" y="445025"/>
-            <a:ext cx="8520600" cy="572700"/>
-          </a:xfrm>
-          <a:prstGeom prst="rect">
-            <a:avLst/>
-          </a:prstGeom>
-          <a:noFill/>
-          <a:ln>
-            <a:noFill/>
-          </a:ln>
-        </p:spPr>
-        <p:txBody>
-          <a:bodyPr spcFirstLastPara="1" wrap="square" lIns="91425" tIns="91425" rIns="91425" bIns="91425" anchor="t" anchorCtr="0">
-            <a:noAutofit/>
-          </a:bodyPr>
-          <a:lstStyle/>
-          <a:p>
-            <a:pPr marL="0" lvl="0" indent="0" algn="l" rtl="0">
-              <a:spcBef>
-                <a:spcPts val="0"/>
-              </a:spcBef>
-              <a:spcAft>
-                <a:spcPts val="0"/>
-              </a:spcAft>
-              <a:buNone/>
-            </a:pPr>
-            <a:r>
-              <a:rPr lang="en" sz="2800">
-                <a:latin typeface="Bungee"/>
-                <a:ea typeface="Bungee"/>
-                <a:cs typeface="Bungee"/>
-                <a:sym typeface="Bungee"/>
-              </a:rPr>
-              <a:t>Modding and Custom Content: de_nuke Variants Created by Fans</a:t>
-            </a:r>
-            <a:endParaRPr sz="2800">
-              <a:solidFill>
-                <a:srgbClr val="000000"/>
-              </a:solidFill>
-              <a:latin typeface="Bungee"/>
-              <a:ea typeface="Bungee"/>
-              <a:cs typeface="Bungee"/>
-              <a:sym typeface="Bungee"/>
-            </a:endParaRPr>
-          </a:p>
-        </p:txBody>
-      </p:sp>
-      <p:sp>
-        <p:nvSpPr>
-          <p:cNvPr id="66" name="Google Shape;66;p14"/>
-          <p:cNvSpPr txBox="1"/>
-          <p:nvPr/>
-        </p:nvSpPr>
-        <p:spPr>
-          <a:xfrm>
-            <a:off x="311700" y="1152475"/>
-            <a:ext cx="7422525" cy="3416400"/>
-          </a:xfrm>
-          <a:prstGeom prst="rect">
-            <a:avLst/>
-          </a:prstGeom>
-          <a:noFill/>
-          <a:ln>
-            <a:noFill/>
-          </a:ln>
-        </p:spPr>
-        <p:txBody>
-          <a:bodyPr spcFirstLastPara="1" wrap="square" lIns="91425" tIns="91425" rIns="91425" bIns="91425" anchor="t" anchorCtr="0">
-            <a:noAutofit/>
-          </a:bodyPr>
-          <a:lstStyle/>
-          <a:p>
-            <a:pPr marL="0" lvl="0" indent="0" algn="l" rtl="0">
-              <a:lnSpc>
-                <a:spcPct val="115000"/>
-              </a:lnSpc>
-              <a:spcBef>
-                <a:spcPts val="0"/>
-              </a:spcBef>
-              <a:spcAft>
-                <a:spcPts val="1200"/>
-              </a:spcAft>
-              <a:buNone/>
-            </a:pPr>
-            <a:r>
-              <a:rPr lang="en" sz="1800">
-                <a:solidFill>
-                  <a:srgbClr val="595959"/>
-                </a:solidFill>
-                <a:latin typeface="Oswald"/>
-                <a:ea typeface="Oswald"/>
-                <a:cs typeface="Oswald"/>
-                <a:sym typeface="Oswald"/>
-              </a:rPr>
-              <a:t>Take a look at the creative contributions of the community, with fan-made de_nuke variants and how they've been received.</a:t>
-            </a:r>
-            <a:endParaRPr sz="1800">
-              <a:solidFill>
-                <a:srgbClr val="595959"/>
-              </a:solidFill>
-              <a:latin typeface="Oswald"/>
-              <a:ea typeface="Oswald"/>
-              <a:cs typeface="Oswald"/>
-              <a:sym typeface="Oswald"/>
-            </a:endParaRPr>
-          </a:p>
-        </p:txBody>
-      </p:sp>
-      <p:sp>
-        <p:nvSpPr>
-          <p:cNvPr id="67" name="Google Shape;67;p14"/>
-          <p:cNvSpPr/>
-          <p:nvPr/>
-        </p:nvSpPr>
-        <p:spPr>
-          <a:xfrm>
-            <a:off x="8074450" y="-1345525"/>
-            <a:ext cx="346800" cy="7043400"/>
-          </a:xfrm>
-          <a:prstGeom prst="rect">
-            <a:avLst/>
-          </a:prstGeom>
-          <a:solidFill>
-            <a:srgbClr val="FFB627"/>
-          </a:solidFill>
-          <a:ln>
-            <a:noFill/>
-          </a:ln>
-        </p:spPr>
-        <p:txBody>
-          <a:bodyPr spcFirstLastPara="1" wrap="square" lIns="91425" tIns="91425" rIns="91425" bIns="91425" anchor="ctr" anchorCtr="0">
-            <a:noAutofit/>
-          </a:bodyPr>
-          <a:lstStyle/>
-          <a:p>
-            <a:pPr marL="0" lvl="0" indent="0" algn="l" rtl="0">
-              <a:spcBef>
-                <a:spcPts val="0"/>
-              </a:spcBef>
-              <a:spcAft>
-                <a:spcPts val="0"/>
-              </a:spcAft>
-              <a:buNone/>
-            </a:pPr>
-            <a:endParaRPr/>
-          </a:p>
-        </p:txBody>
-      </p:sp>
-      <p:sp>
-        <p:nvSpPr>
-          <p:cNvPr id="68" name="Google Shape;68;p14"/>
-          <p:cNvSpPr/>
-          <p:nvPr/>
-        </p:nvSpPr>
-        <p:spPr>
-          <a:xfrm>
-            <a:off x="8421250" y="-1345525"/>
-            <a:ext cx="346800" cy="7043400"/>
-          </a:xfrm>
-          <a:prstGeom prst="rect">
-            <a:avLst/>
-          </a:prstGeom>
-          <a:solidFill>
-            <a:srgbClr val="FF9505"/>
-          </a:solidFill>
-          <a:ln>
-            <a:noFill/>
-          </a:ln>
-        </p:spPr>
-        <p:txBody>
-          <a:bodyPr spcFirstLastPara="1" wrap="square" lIns="91425" tIns="91425" rIns="91425" bIns="91425" anchor="ctr" anchorCtr="0">
-            <a:noAutofit/>
-          </a:bodyPr>
-          <a:lstStyle/>
-          <a:p>
-            <a:pPr marL="0" lvl="0" indent="0" algn="l" rtl="0">
-              <a:spcBef>
-                <a:spcPts val="0"/>
-              </a:spcBef>
-              <a:spcAft>
-                <a:spcPts val="0"/>
-              </a:spcAft>
-              <a:buNone/>
-            </a:pPr>
-            <a:endParaRPr/>
-          </a:p>
-        </p:txBody>
-      </p:sp>
-    </p:spTree>
-  </p:cSld>
-  <p:clrMapOvr>
-    <a:masterClrMapping/>
-  </p:clrMapOvr>
-</p:sld>
-</file>
-
-<file path=ppt/slides/slide15.xml><?xml version="1.0" encoding="utf-8"?>
-<p:sld xmlns:a="http://schemas.openxmlformats.org/drawingml/2006/main" xmlns:p="http://schemas.openxmlformats.org/presentationml/2006/main" xmlns:r="http://schemas.openxmlformats.org/officeDocument/2006/relationships">
-  <p:cSld>
-    <p:spTree>
-      <p:nvGrpSpPr>
-        <p:cNvPr id="1" name=""/>
-        <p:cNvGrpSpPr/>
-        <p:nvPr/>
-      </p:nvGrpSpPr>
-      <p:grpSpPr/>
-      <p:sp>
-        <p:nvSpPr>
-          <p:cNvPr id="63" name="Google Shape;63;p14"/>
-          <p:cNvSpPr/>
-          <p:nvPr/>
-        </p:nvSpPr>
-        <p:spPr>
-          <a:xfrm>
-            <a:off x="-54925" y="-1345525"/>
-            <a:ext cx="8816400" cy="7043400"/>
-          </a:xfrm>
-          <a:prstGeom prst="rect">
-            <a:avLst/>
-          </a:prstGeom>
-          <a:solidFill>
-            <a:srgbClr val="FFC971"/>
-          </a:solidFill>
-          <a:ln>
-            <a:noFill/>
-          </a:ln>
-        </p:spPr>
-        <p:txBody>
-          <a:bodyPr spcFirstLastPara="1" wrap="square" lIns="91425" tIns="91425" rIns="91425" bIns="91425" anchor="ctr" anchorCtr="0">
-            <a:noAutofit/>
-          </a:bodyPr>
-          <a:lstStyle/>
-          <a:p>
-            <a:pPr marL="0" lvl="0" indent="0" algn="l" rtl="0">
-              <a:spcBef>
-                <a:spcPts val="0"/>
-              </a:spcBef>
-              <a:spcAft>
-                <a:spcPts val="0"/>
-              </a:spcAft>
-              <a:buNone/>
-            </a:pPr>
-            <a:endParaRPr/>
-          </a:p>
-        </p:txBody>
-      </p:sp>
-      <p:sp>
-        <p:nvSpPr>
-          <p:cNvPr id="64" name="Google Shape;64;p14"/>
-          <p:cNvSpPr/>
-          <p:nvPr/>
-        </p:nvSpPr>
-        <p:spPr>
-          <a:xfrm rot="-5400000">
-            <a:off x="1434900" y="-1489525"/>
-            <a:ext cx="5162400" cy="8141400"/>
-          </a:xfrm>
-          <a:prstGeom prst="rtTriangle">
-            <a:avLst/>
-          </a:prstGeom>
-          <a:solidFill>
-            <a:srgbClr val="FFE599"/>
-          </a:solidFill>
-          <a:ln>
-            <a:noFill/>
-          </a:ln>
-        </p:spPr>
-        <p:txBody>
-          <a:bodyPr spcFirstLastPara="1" wrap="square" lIns="91425" tIns="91425" rIns="91425" bIns="91425" anchor="ctr" anchorCtr="0">
-            <a:noAutofit/>
-          </a:bodyPr>
-          <a:lstStyle/>
-          <a:p>
-            <a:pPr marL="0" lvl="0" indent="0" algn="l" rtl="0">
-              <a:spcBef>
-                <a:spcPts val="0"/>
-              </a:spcBef>
-              <a:spcAft>
-                <a:spcPts val="0"/>
-              </a:spcAft>
-              <a:buNone/>
-            </a:pPr>
-            <a:endParaRPr/>
-          </a:p>
-        </p:txBody>
-      </p:sp>
-      <p:sp>
-        <p:nvSpPr>
-          <p:cNvPr id="65" name="Google Shape;65;p14"/>
-          <p:cNvSpPr txBox="1"/>
-          <p:nvPr/>
-        </p:nvSpPr>
-        <p:spPr>
-          <a:xfrm>
-            <a:off x="311700" y="445025"/>
-            <a:ext cx="8520600" cy="572700"/>
-          </a:xfrm>
-          <a:prstGeom prst="rect">
-            <a:avLst/>
-          </a:prstGeom>
-          <a:noFill/>
-          <a:ln>
-            <a:noFill/>
-          </a:ln>
-        </p:spPr>
-        <p:txBody>
-          <a:bodyPr spcFirstLastPara="1" wrap="square" lIns="91425" tIns="91425" rIns="91425" bIns="91425" anchor="t" anchorCtr="0">
-            <a:noAutofit/>
-          </a:bodyPr>
-          <a:lstStyle/>
-          <a:p>
-            <a:pPr marL="0" lvl="0" indent="0" algn="l" rtl="0">
-              <a:spcBef>
-                <a:spcPts val="0"/>
-              </a:spcBef>
-              <a:spcAft>
-                <a:spcPts val="0"/>
-              </a:spcAft>
-              <a:buNone/>
-            </a:pPr>
-            <a:r>
-              <a:rPr lang="en" sz="2800">
-                <a:latin typeface="Bungee"/>
-                <a:ea typeface="Bungee"/>
-                <a:cs typeface="Bungee"/>
-                <a:sym typeface="Bungee"/>
-              </a:rPr>
-              <a:t>de_nuke in Popular Culture: References Outside of Gaming</a:t>
-            </a:r>
-            <a:endParaRPr sz="2800">
-              <a:solidFill>
-                <a:srgbClr val="000000"/>
-              </a:solidFill>
-              <a:latin typeface="Bungee"/>
-              <a:ea typeface="Bungee"/>
-              <a:cs typeface="Bungee"/>
-              <a:sym typeface="Bungee"/>
-            </a:endParaRPr>
-          </a:p>
-        </p:txBody>
-      </p:sp>
-      <p:sp>
-        <p:nvSpPr>
-          <p:cNvPr id="66" name="Google Shape;66;p14"/>
-          <p:cNvSpPr txBox="1"/>
-          <p:nvPr/>
-        </p:nvSpPr>
-        <p:spPr>
-          <a:xfrm>
-            <a:off x="311700" y="1152475"/>
-            <a:ext cx="7422525" cy="3416400"/>
-          </a:xfrm>
-          <a:prstGeom prst="rect">
-            <a:avLst/>
-          </a:prstGeom>
-          <a:noFill/>
-          <a:ln>
-            <a:noFill/>
-          </a:ln>
-        </p:spPr>
-        <p:txBody>
-          <a:bodyPr spcFirstLastPara="1" wrap="square" lIns="91425" tIns="91425" rIns="91425" bIns="91425" anchor="t" anchorCtr="0">
-            <a:noAutofit/>
-          </a:bodyPr>
-          <a:lstStyle/>
-          <a:p>
-            <a:pPr marL="0" lvl="0" indent="0" algn="l" rtl="0">
-              <a:lnSpc>
-                <a:spcPct val="115000"/>
-              </a:lnSpc>
-              <a:spcBef>
-                <a:spcPts val="0"/>
-              </a:spcBef>
-              <a:spcAft>
-                <a:spcPts val="1200"/>
-              </a:spcAft>
-              <a:buNone/>
-            </a:pPr>
-            <a:r>
-              <a:rPr lang="en" sz="1800">
-                <a:solidFill>
-                  <a:srgbClr val="595959"/>
-                </a:solidFill>
-                <a:latin typeface="Oswald"/>
-                <a:ea typeface="Oswald"/>
-                <a:cs typeface="Oswald"/>
-                <a:sym typeface="Oswald"/>
-              </a:rPr>
-              <a:t>Discover the cultural impact of de_nuke, finding its place in various forms of media and entertainment beyond the gaming world.</a:t>
-            </a:r>
-            <a:endParaRPr sz="1800">
-              <a:solidFill>
-                <a:srgbClr val="595959"/>
-              </a:solidFill>
-              <a:latin typeface="Oswald"/>
-              <a:ea typeface="Oswald"/>
-              <a:cs typeface="Oswald"/>
-              <a:sym typeface="Oswald"/>
-            </a:endParaRPr>
-          </a:p>
-        </p:txBody>
-      </p:sp>
-      <p:sp>
-        <p:nvSpPr>
-          <p:cNvPr id="67" name="Google Shape;67;p14"/>
-          <p:cNvSpPr/>
-          <p:nvPr/>
-        </p:nvSpPr>
-        <p:spPr>
-          <a:xfrm>
-            <a:off x="8074450" y="-1345525"/>
-            <a:ext cx="346800" cy="7043400"/>
-          </a:xfrm>
-          <a:prstGeom prst="rect">
-            <a:avLst/>
-          </a:prstGeom>
-          <a:solidFill>
-            <a:srgbClr val="FFB627"/>
-          </a:solidFill>
-          <a:ln>
-            <a:noFill/>
-          </a:ln>
-        </p:spPr>
-        <p:txBody>
-          <a:bodyPr spcFirstLastPara="1" wrap="square" lIns="91425" tIns="91425" rIns="91425" bIns="91425" anchor="ctr" anchorCtr="0">
-            <a:noAutofit/>
-          </a:bodyPr>
-          <a:lstStyle/>
-          <a:p>
-            <a:pPr marL="0" lvl="0" indent="0" algn="l" rtl="0">
-              <a:spcBef>
-                <a:spcPts val="0"/>
-              </a:spcBef>
-              <a:spcAft>
-                <a:spcPts val="0"/>
-              </a:spcAft>
-              <a:buNone/>
-            </a:pPr>
-            <a:endParaRPr/>
-          </a:p>
-        </p:txBody>
-      </p:sp>
-      <p:sp>
-        <p:nvSpPr>
-          <p:cNvPr id="68" name="Google Shape;68;p14"/>
-          <p:cNvSpPr/>
-          <p:nvPr/>
-        </p:nvSpPr>
-        <p:spPr>
-          <a:xfrm>
-            <a:off x="8421250" y="-1345525"/>
-            <a:ext cx="346800" cy="7043400"/>
-          </a:xfrm>
-          <a:prstGeom prst="rect">
-            <a:avLst/>
-          </a:prstGeom>
-          <a:solidFill>
-            <a:srgbClr val="FF9505"/>
-          </a:solidFill>
-          <a:ln>
-            <a:noFill/>
-          </a:ln>
-        </p:spPr>
-        <p:txBody>
-          <a:bodyPr spcFirstLastPara="1" wrap="square" lIns="91425" tIns="91425" rIns="91425" bIns="91425" anchor="ctr" anchorCtr="0">
-            <a:noAutofit/>
-          </a:bodyPr>
-          <a:lstStyle/>
-          <a:p>
-            <a:pPr marL="0" lvl="0" indent="0" algn="l" rtl="0">
-              <a:spcBef>
-                <a:spcPts val="0"/>
-              </a:spcBef>
-              <a:spcAft>
-                <a:spcPts val="0"/>
-              </a:spcAft>
-              <a:buNone/>
-            </a:pPr>
-            <a:endParaRPr/>
-          </a:p>
-        </p:txBody>
-      </p:sp>
-    </p:spTree>
-  </p:cSld>
-  <p:clrMapOvr>
-    <a:masterClrMapping/>
-  </p:clrMapOvr>
-</p:sld>
-</file>
-
-<file path=ppt/slides/slide16.xml><?xml version="1.0" encoding="utf-8"?>
-<p:sld xmlns:a="http://schemas.openxmlformats.org/drawingml/2006/main" xmlns:p="http://schemas.openxmlformats.org/presentationml/2006/main" xmlns:r="http://schemas.openxmlformats.org/officeDocument/2006/relationships">
-  <p:cSld>
-    <p:spTree>
-      <p:nvGrpSpPr>
-        <p:cNvPr id="1" name=""/>
-        <p:cNvGrpSpPr/>
-        <p:nvPr/>
-      </p:nvGrpSpPr>
-      <p:grpSpPr/>
-      <p:sp>
-        <p:nvSpPr>
-          <p:cNvPr id="63" name="Google Shape;63;p14"/>
-          <p:cNvSpPr/>
-          <p:nvPr/>
-        </p:nvSpPr>
-        <p:spPr>
-          <a:xfrm>
-            <a:off x="-54925" y="-1345525"/>
-            <a:ext cx="8816400" cy="7043400"/>
-          </a:xfrm>
-          <a:prstGeom prst="rect">
-            <a:avLst/>
-          </a:prstGeom>
-          <a:solidFill>
-            <a:srgbClr val="FFC971"/>
-          </a:solidFill>
-          <a:ln>
-            <a:noFill/>
-          </a:ln>
-        </p:spPr>
-        <p:txBody>
-          <a:bodyPr spcFirstLastPara="1" wrap="square" lIns="91425" tIns="91425" rIns="91425" bIns="91425" anchor="ctr" anchorCtr="0">
-            <a:noAutofit/>
-          </a:bodyPr>
-          <a:lstStyle/>
-          <a:p>
-            <a:pPr marL="0" lvl="0" indent="0" algn="l" rtl="0">
-              <a:spcBef>
-                <a:spcPts val="0"/>
-              </a:spcBef>
-              <a:spcAft>
-                <a:spcPts val="0"/>
-              </a:spcAft>
-              <a:buNone/>
-            </a:pPr>
-            <a:endParaRPr/>
-          </a:p>
-        </p:txBody>
-      </p:sp>
-      <p:sp>
-        <p:nvSpPr>
-          <p:cNvPr id="64" name="Google Shape;64;p14"/>
-          <p:cNvSpPr/>
-          <p:nvPr/>
-        </p:nvSpPr>
-        <p:spPr>
-          <a:xfrm rot="-5400000">
-            <a:off x="1434900" y="-1489525"/>
-            <a:ext cx="5162400" cy="8141400"/>
-          </a:xfrm>
-          <a:prstGeom prst="rtTriangle">
-            <a:avLst/>
-          </a:prstGeom>
-          <a:solidFill>
-            <a:srgbClr val="FFE599"/>
-          </a:solidFill>
-          <a:ln>
-            <a:noFill/>
-          </a:ln>
-        </p:spPr>
-        <p:txBody>
-          <a:bodyPr spcFirstLastPara="1" wrap="square" lIns="91425" tIns="91425" rIns="91425" bIns="91425" anchor="ctr" anchorCtr="0">
-            <a:noAutofit/>
-          </a:bodyPr>
-          <a:lstStyle/>
-          <a:p>
-            <a:pPr marL="0" lvl="0" indent="0" algn="l" rtl="0">
-              <a:spcBef>
-                <a:spcPts val="0"/>
-              </a:spcBef>
-              <a:spcAft>
-                <a:spcPts val="0"/>
-              </a:spcAft>
-              <a:buNone/>
-            </a:pPr>
-            <a:endParaRPr/>
-          </a:p>
-        </p:txBody>
-      </p:sp>
-      <p:sp>
-        <p:nvSpPr>
-          <p:cNvPr id="65" name="Google Shape;65;p14"/>
-          <p:cNvSpPr txBox="1"/>
-          <p:nvPr/>
-        </p:nvSpPr>
-        <p:spPr>
-          <a:xfrm>
-            <a:off x="311700" y="445025"/>
-            <a:ext cx="8520600" cy="572700"/>
-          </a:xfrm>
-          <a:prstGeom prst="rect">
-            <a:avLst/>
-          </a:prstGeom>
-          <a:noFill/>
-          <a:ln>
-            <a:noFill/>
-          </a:ln>
-        </p:spPr>
-        <p:txBody>
-          <a:bodyPr spcFirstLastPara="1" wrap="square" lIns="91425" tIns="91425" rIns="91425" bIns="91425" anchor="t" anchorCtr="0">
-            <a:noAutofit/>
-          </a:bodyPr>
-          <a:lstStyle/>
-          <a:p>
-            <a:pPr marL="0" lvl="0" indent="0" algn="l" rtl="0">
-              <a:spcBef>
-                <a:spcPts val="0"/>
-              </a:spcBef>
-              <a:spcAft>
-                <a:spcPts val="0"/>
-              </a:spcAft>
-              <a:buNone/>
-            </a:pPr>
-            <a:r>
-              <a:rPr lang="en" sz="2800">
-                <a:latin typeface="Bungee"/>
-                <a:ea typeface="Bungee"/>
-                <a:cs typeface="Bungee"/>
-                <a:sym typeface="Bungee"/>
-              </a:rPr>
-              <a:t>The Present and Future: de_nuke in Current Competitive Play</a:t>
-            </a:r>
-            <a:endParaRPr sz="2800">
-              <a:solidFill>
-                <a:srgbClr val="000000"/>
-              </a:solidFill>
-              <a:latin typeface="Bungee"/>
-              <a:ea typeface="Bungee"/>
-              <a:cs typeface="Bungee"/>
-              <a:sym typeface="Bungee"/>
-            </a:endParaRPr>
-          </a:p>
-        </p:txBody>
-      </p:sp>
-      <p:sp>
-        <p:nvSpPr>
-          <p:cNvPr id="66" name="Google Shape;66;p14"/>
-          <p:cNvSpPr txBox="1"/>
-          <p:nvPr/>
-        </p:nvSpPr>
-        <p:spPr>
-          <a:xfrm>
-            <a:off x="311700" y="1152475"/>
-            <a:ext cx="7422525" cy="3416400"/>
-          </a:xfrm>
-          <a:prstGeom prst="rect">
-            <a:avLst/>
-          </a:prstGeom>
-          <a:noFill/>
-          <a:ln>
-            <a:noFill/>
-          </a:ln>
-        </p:spPr>
-        <p:txBody>
-          <a:bodyPr spcFirstLastPara="1" wrap="square" lIns="91425" tIns="91425" rIns="91425" bIns="91425" anchor="t" anchorCtr="0">
-            <a:noAutofit/>
-          </a:bodyPr>
-          <a:lstStyle/>
-          <a:p>
-            <a:pPr marL="0" lvl="0" indent="0" algn="l" rtl="0">
-              <a:lnSpc>
-                <a:spcPct val="115000"/>
-              </a:lnSpc>
-              <a:spcBef>
-                <a:spcPts val="0"/>
-              </a:spcBef>
-              <a:spcAft>
-                <a:spcPts val="1200"/>
-              </a:spcAft>
-              <a:buNone/>
-            </a:pPr>
-            <a:r>
-              <a:rPr lang="en" sz="1800">
-                <a:solidFill>
-                  <a:srgbClr val="595959"/>
-                </a:solidFill>
-                <a:latin typeface="Oswald"/>
-                <a:ea typeface="Oswald"/>
-                <a:cs typeface="Oswald"/>
-                <a:sym typeface="Oswald"/>
-              </a:rPr>
-              <a:t>Analyze de_nuke's current role in competitive Counter-Strike, and what future updates or changes may be on the horizon.</a:t>
-            </a:r>
-            <a:endParaRPr sz="1800">
-              <a:solidFill>
-                <a:srgbClr val="595959"/>
-              </a:solidFill>
-              <a:latin typeface="Oswald"/>
-              <a:ea typeface="Oswald"/>
-              <a:cs typeface="Oswald"/>
-              <a:sym typeface="Oswald"/>
-            </a:endParaRPr>
-          </a:p>
-        </p:txBody>
-      </p:sp>
-      <p:sp>
-        <p:nvSpPr>
-          <p:cNvPr id="67" name="Google Shape;67;p14"/>
-          <p:cNvSpPr/>
-          <p:nvPr/>
-        </p:nvSpPr>
-        <p:spPr>
-          <a:xfrm>
-            <a:off x="8074450" y="-1345525"/>
-            <a:ext cx="346800" cy="7043400"/>
-          </a:xfrm>
-          <a:prstGeom prst="rect">
-            <a:avLst/>
-          </a:prstGeom>
-          <a:solidFill>
-            <a:srgbClr val="FFB627"/>
-          </a:solidFill>
-          <a:ln>
-            <a:noFill/>
-          </a:ln>
-        </p:spPr>
-        <p:txBody>
-          <a:bodyPr spcFirstLastPara="1" wrap="square" lIns="91425" tIns="91425" rIns="91425" bIns="91425" anchor="ctr" anchorCtr="0">
-            <a:noAutofit/>
-          </a:bodyPr>
-          <a:lstStyle/>
-          <a:p>
-            <a:pPr marL="0" lvl="0" indent="0" algn="l" rtl="0">
-              <a:spcBef>
-                <a:spcPts val="0"/>
-              </a:spcBef>
-              <a:spcAft>
-                <a:spcPts val="0"/>
-              </a:spcAft>
-              <a:buNone/>
-            </a:pPr>
-            <a:endParaRPr/>
-          </a:p>
-        </p:txBody>
-      </p:sp>
-      <p:sp>
-        <p:nvSpPr>
-          <p:cNvPr id="68" name="Google Shape;68;p14"/>
-          <p:cNvSpPr/>
-          <p:nvPr/>
-        </p:nvSpPr>
-        <p:spPr>
-          <a:xfrm>
-            <a:off x="8421250" y="-1345525"/>
-            <a:ext cx="346800" cy="7043400"/>
-          </a:xfrm>
-          <a:prstGeom prst="rect">
-            <a:avLst/>
-          </a:prstGeom>
-          <a:solidFill>
-            <a:srgbClr val="FF9505"/>
-          </a:solidFill>
-          <a:ln>
-            <a:noFill/>
-          </a:ln>
-        </p:spPr>
-        <p:txBody>
-          <a:bodyPr spcFirstLastPara="1" wrap="square" lIns="91425" tIns="91425" rIns="91425" bIns="91425" anchor="ctr" anchorCtr="0">
-            <a:noAutofit/>
-          </a:bodyPr>
-          <a:lstStyle/>
-          <a:p>
-            <a:pPr marL="0" lvl="0" indent="0" algn="l" rtl="0">
-              <a:spcBef>
-                <a:spcPts val="0"/>
-              </a:spcBef>
-              <a:spcAft>
-                <a:spcPts val="0"/>
-              </a:spcAft>
-              <a:buNone/>
-            </a:pPr>
-            <a:endParaRPr/>
-          </a:p>
-        </p:txBody>
-      </p:sp>
-    </p:spTree>
-  </p:cSld>
-  <p:clrMapOvr>
-    <a:masterClrMapping/>
-  </p:clrMapOvr>
-</p:sld>
-</file>
-
-<file path=ppt/slides/slide17.xml><?xml version="1.0" encoding="utf-8"?>
-<p:sld xmlns:a="http://schemas.openxmlformats.org/drawingml/2006/main" xmlns:p="http://schemas.openxmlformats.org/presentationml/2006/main" xmlns:r="http://schemas.openxmlformats.org/officeDocument/2006/relationships">
-  <p:cSld>
-    <p:spTree>
-      <p:nvGrpSpPr>
-        <p:cNvPr id="1" name=""/>
-        <p:cNvGrpSpPr/>
-        <p:nvPr/>
-      </p:nvGrpSpPr>
-      <p:grpSpPr/>
-      <p:sp>
-        <p:nvSpPr>
-          <p:cNvPr id="63" name="Google Shape;63;p14"/>
-          <p:cNvSpPr/>
-          <p:nvPr/>
-        </p:nvSpPr>
-        <p:spPr>
-          <a:xfrm>
-            <a:off x="-54925" y="-1345525"/>
-            <a:ext cx="8816400" cy="7043400"/>
-          </a:xfrm>
-          <a:prstGeom prst="rect">
-            <a:avLst/>
-          </a:prstGeom>
-          <a:solidFill>
-            <a:srgbClr val="FFC971"/>
-          </a:solidFill>
-          <a:ln>
-            <a:noFill/>
-          </a:ln>
-        </p:spPr>
-        <p:txBody>
-          <a:bodyPr spcFirstLastPara="1" wrap="square" lIns="91425" tIns="91425" rIns="91425" bIns="91425" anchor="ctr" anchorCtr="0">
-            <a:noAutofit/>
-          </a:bodyPr>
-          <a:lstStyle/>
-          <a:p>
-            <a:pPr marL="0" lvl="0" indent="0" algn="l" rtl="0">
-              <a:spcBef>
-                <a:spcPts val="0"/>
-              </a:spcBef>
-              <a:spcAft>
-                <a:spcPts val="0"/>
-              </a:spcAft>
-              <a:buNone/>
-            </a:pPr>
-            <a:endParaRPr/>
-          </a:p>
-        </p:txBody>
-      </p:sp>
-      <p:sp>
-        <p:nvSpPr>
-          <p:cNvPr id="64" name="Google Shape;64;p14"/>
-          <p:cNvSpPr/>
-          <p:nvPr/>
-        </p:nvSpPr>
-        <p:spPr>
-          <a:xfrm rot="-5400000">
-            <a:off x="1434900" y="-1489525"/>
-            <a:ext cx="5162400" cy="8141400"/>
-          </a:xfrm>
-          <a:prstGeom prst="rtTriangle">
-            <a:avLst/>
-          </a:prstGeom>
-          <a:solidFill>
-            <a:srgbClr val="FFE599"/>
-          </a:solidFill>
-          <a:ln>
-            <a:noFill/>
-          </a:ln>
-        </p:spPr>
-        <p:txBody>
-          <a:bodyPr spcFirstLastPara="1" wrap="square" lIns="91425" tIns="91425" rIns="91425" bIns="91425" anchor="ctr" anchorCtr="0">
-            <a:noAutofit/>
-          </a:bodyPr>
-          <a:lstStyle/>
-          <a:p>
-            <a:pPr marL="0" lvl="0" indent="0" algn="l" rtl="0">
-              <a:spcBef>
-                <a:spcPts val="0"/>
-              </a:spcBef>
-              <a:spcAft>
-                <a:spcPts val="0"/>
-              </a:spcAft>
-              <a:buNone/>
-            </a:pPr>
-            <a:endParaRPr/>
-          </a:p>
-        </p:txBody>
-      </p:sp>
-      <p:sp>
-        <p:nvSpPr>
-          <p:cNvPr id="65" name="Google Shape;65;p14"/>
-          <p:cNvSpPr txBox="1"/>
-          <p:nvPr/>
-        </p:nvSpPr>
-        <p:spPr>
-          <a:xfrm>
-            <a:off x="311700" y="445025"/>
-            <a:ext cx="8520600" cy="572700"/>
-          </a:xfrm>
-          <a:prstGeom prst="rect">
-            <a:avLst/>
-          </a:prstGeom>
-          <a:noFill/>
-          <a:ln>
-            <a:noFill/>
-          </a:ln>
-        </p:spPr>
-        <p:txBody>
-          <a:bodyPr spcFirstLastPara="1" wrap="square" lIns="91425" tIns="91425" rIns="91425" bIns="91425" anchor="t" anchorCtr="0">
-            <a:noAutofit/>
-          </a:bodyPr>
-          <a:lstStyle/>
-          <a:p>
-            <a:pPr marL="0" lvl="0" indent="0" algn="l" rtl="0">
-              <a:spcBef>
-                <a:spcPts val="0"/>
-              </a:spcBef>
-              <a:spcAft>
-                <a:spcPts val="0"/>
-              </a:spcAft>
-              <a:buNone/>
-            </a:pPr>
-            <a:r>
-              <a:rPr lang="en" sz="2800">
-                <a:latin typeface="Bungee"/>
-                <a:ea typeface="Bungee"/>
-                <a:cs typeface="Bungee"/>
-                <a:sym typeface="Bungee"/>
-              </a:rPr>
-              <a:t>Preserving Legacy: The Importance of Map Making in Counter-Strike’s Longevity</a:t>
-            </a:r>
-            <a:endParaRPr sz="2800">
-              <a:solidFill>
-                <a:srgbClr val="000000"/>
-              </a:solidFill>
-              <a:latin typeface="Bungee"/>
-              <a:ea typeface="Bungee"/>
-              <a:cs typeface="Bungee"/>
-              <a:sym typeface="Bungee"/>
-            </a:endParaRPr>
-          </a:p>
-        </p:txBody>
-      </p:sp>
-      <p:sp>
-        <p:nvSpPr>
-          <p:cNvPr id="66" name="Google Shape;66;p14"/>
-          <p:cNvSpPr txBox="1"/>
-          <p:nvPr/>
-        </p:nvSpPr>
-        <p:spPr>
-          <a:xfrm>
-            <a:off x="311700" y="1152475"/>
-            <a:ext cx="7422525" cy="3416400"/>
-          </a:xfrm>
-          <a:prstGeom prst="rect">
-            <a:avLst/>
-          </a:prstGeom>
-          <a:noFill/>
-          <a:ln>
-            <a:noFill/>
-          </a:ln>
-        </p:spPr>
-        <p:txBody>
-          <a:bodyPr spcFirstLastPara="1" wrap="square" lIns="91425" tIns="91425" rIns="91425" bIns="91425" anchor="t" anchorCtr="0">
-            <a:noAutofit/>
-          </a:bodyPr>
-          <a:lstStyle/>
-          <a:p>
-            <a:pPr marL="0" lvl="0" indent="0" algn="l" rtl="0">
-              <a:lnSpc>
-                <a:spcPct val="115000"/>
-              </a:lnSpc>
-              <a:spcBef>
-                <a:spcPts val="0"/>
-              </a:spcBef>
-              <a:spcAft>
-                <a:spcPts val="1200"/>
-              </a:spcAft>
-              <a:buNone/>
-            </a:pPr>
-            <a:r>
-              <a:rPr lang="en" sz="1800">
-                <a:solidFill>
-                  <a:srgbClr val="595959"/>
-                </a:solidFill>
-                <a:latin typeface="Oswald"/>
-                <a:ea typeface="Oswald"/>
-                <a:cs typeface="Oswald"/>
-                <a:sym typeface="Oswald"/>
-              </a:rPr>
-              <a:t>Reflect on how the art of map making, exemplified by de_nuke, contributes to the enduring legacy and ongoing success of Counter-Strike.</a:t>
-            </a:r>
-            <a:endParaRPr sz="1800">
-              <a:solidFill>
-                <a:srgbClr val="595959"/>
-              </a:solidFill>
-              <a:latin typeface="Oswald"/>
-              <a:ea typeface="Oswald"/>
-              <a:cs typeface="Oswald"/>
-              <a:sym typeface="Oswald"/>
-            </a:endParaRPr>
-          </a:p>
-        </p:txBody>
-      </p:sp>
-      <p:sp>
-        <p:nvSpPr>
-          <p:cNvPr id="67" name="Google Shape;67;p14"/>
-          <p:cNvSpPr/>
-          <p:nvPr/>
-        </p:nvSpPr>
-        <p:spPr>
-          <a:xfrm>
-            <a:off x="8074450" y="-1345525"/>
-            <a:ext cx="346800" cy="7043400"/>
-          </a:xfrm>
-          <a:prstGeom prst="rect">
-            <a:avLst/>
-          </a:prstGeom>
-          <a:solidFill>
-            <a:srgbClr val="FFB627"/>
-          </a:solidFill>
-          <a:ln>
-            <a:noFill/>
-          </a:ln>
-        </p:spPr>
-        <p:txBody>
-          <a:bodyPr spcFirstLastPara="1" wrap="square" lIns="91425" tIns="91425" rIns="91425" bIns="91425" anchor="ctr" anchorCtr="0">
-            <a:noAutofit/>
-          </a:bodyPr>
-          <a:lstStyle/>
-          <a:p>
-            <a:pPr marL="0" lvl="0" indent="0" algn="l" rtl="0">
-              <a:spcBef>
-                <a:spcPts val="0"/>
-              </a:spcBef>
-              <a:spcAft>
-                <a:spcPts val="0"/>
-              </a:spcAft>
-              <a:buNone/>
-            </a:pPr>
-            <a:endParaRPr/>
-          </a:p>
-        </p:txBody>
-      </p:sp>
-      <p:sp>
-        <p:nvSpPr>
-          <p:cNvPr id="68" name="Google Shape;68;p14"/>
-          <p:cNvSpPr/>
-          <p:nvPr/>
-        </p:nvSpPr>
-        <p:spPr>
-          <a:xfrm>
-            <a:off x="8421250" y="-1345525"/>
-            <a:ext cx="346800" cy="7043400"/>
-          </a:xfrm>
-          <a:prstGeom prst="rect">
-            <a:avLst/>
-          </a:prstGeom>
-          <a:solidFill>
-            <a:srgbClr val="FF9505"/>
-          </a:solidFill>
-          <a:ln>
-            <a:noFill/>
-          </a:ln>
-        </p:spPr>
-        <p:txBody>
-          <a:bodyPr spcFirstLastPara="1" wrap="square" lIns="91425" tIns="91425" rIns="91425" bIns="91425" anchor="ctr" anchorCtr="0">
-            <a:noAutofit/>
-          </a:bodyPr>
-          <a:lstStyle/>
-          <a:p>
-            <a:pPr marL="0" lvl="0" indent="0" algn="l" rtl="0">
-              <a:spcBef>
-                <a:spcPts val="0"/>
-              </a:spcBef>
-              <a:spcAft>
-                <a:spcPts val="0"/>
-              </a:spcAft>
-              <a:buNone/>
-            </a:pPr>
-            <a:endParaRPr/>
-          </a:p>
-        </p:txBody>
-      </p:sp>
-    </p:spTree>
-  </p:cSld>
-  <p:clrMapOvr>
-    <a:masterClrMapping/>
-  </p:clrMapOvr>
-</p:sld>
-</file>
-
-<file path=ppt/slides/slide18.xml><?xml version="1.0" encoding="utf-8"?>
-<p:sld xmlns:a="http://schemas.openxmlformats.org/drawingml/2006/main" xmlns:p="http://schemas.openxmlformats.org/presentationml/2006/main" xmlns:r="http://schemas.openxmlformats.org/officeDocument/2006/relationships">
-  <p:cSld>
-    <p:spTree>
-      <p:nvGrpSpPr>
-        <p:cNvPr id="1" name=""/>
-        <p:cNvGrpSpPr/>
-        <p:nvPr/>
-      </p:nvGrpSpPr>
-      <p:grpSpPr/>
-      <p:sp>
-        <p:nvSpPr>
-          <p:cNvPr id="63" name="Google Shape;63;p14"/>
-          <p:cNvSpPr/>
-          <p:nvPr/>
-        </p:nvSpPr>
-        <p:spPr>
-          <a:xfrm>
-            <a:off x="-54925" y="-1345525"/>
-            <a:ext cx="8816400" cy="7043400"/>
-          </a:xfrm>
-          <a:prstGeom prst="rect">
-            <a:avLst/>
-          </a:prstGeom>
-          <a:solidFill>
-            <a:srgbClr val="FFC971"/>
-          </a:solidFill>
-          <a:ln>
-            <a:noFill/>
-          </a:ln>
-        </p:spPr>
-        <p:txBody>
-          <a:bodyPr spcFirstLastPara="1" wrap="square" lIns="91425" tIns="91425" rIns="91425" bIns="91425" anchor="ctr" anchorCtr="0">
-            <a:noAutofit/>
-          </a:bodyPr>
-          <a:lstStyle/>
-          <a:p>
-            <a:pPr marL="0" lvl="0" indent="0" algn="l" rtl="0">
-              <a:spcBef>
-                <a:spcPts val="0"/>
-              </a:spcBef>
-              <a:spcAft>
-                <a:spcPts val="0"/>
-              </a:spcAft>
-              <a:buNone/>
-            </a:pPr>
-            <a:endParaRPr/>
-          </a:p>
-        </p:txBody>
-      </p:sp>
-      <p:sp>
-        <p:nvSpPr>
-          <p:cNvPr id="64" name="Google Shape;64;p14"/>
-          <p:cNvSpPr/>
-          <p:nvPr/>
-        </p:nvSpPr>
-        <p:spPr>
-          <a:xfrm rot="-5400000">
-            <a:off x="1434900" y="-1489525"/>
-            <a:ext cx="5162400" cy="8141400"/>
-          </a:xfrm>
-          <a:prstGeom prst="rtTriangle">
-            <a:avLst/>
-          </a:prstGeom>
-          <a:solidFill>
-            <a:srgbClr val="FFE599"/>
-          </a:solidFill>
-          <a:ln>
-            <a:noFill/>
-          </a:ln>
-        </p:spPr>
-        <p:txBody>
-          <a:bodyPr spcFirstLastPara="1" wrap="square" lIns="91425" tIns="91425" rIns="91425" bIns="91425" anchor="ctr" anchorCtr="0">
-            <a:noAutofit/>
-          </a:bodyPr>
-          <a:lstStyle/>
-          <a:p>
-            <a:pPr marL="0" lvl="0" indent="0" algn="l" rtl="0">
-              <a:spcBef>
-                <a:spcPts val="0"/>
-              </a:spcBef>
-              <a:spcAft>
-                <a:spcPts val="0"/>
-              </a:spcAft>
-              <a:buNone/>
-            </a:pPr>
-            <a:endParaRPr/>
-          </a:p>
-        </p:txBody>
-      </p:sp>
-      <p:sp>
-        <p:nvSpPr>
-          <p:cNvPr id="65" name="Google Shape;65;p14"/>
-          <p:cNvSpPr txBox="1"/>
-          <p:nvPr/>
-        </p:nvSpPr>
-        <p:spPr>
-          <a:xfrm>
-            <a:off x="311700" y="445025"/>
-            <a:ext cx="8520600" cy="572700"/>
-          </a:xfrm>
-          <a:prstGeom prst="rect">
-            <a:avLst/>
-          </a:prstGeom>
-          <a:noFill/>
-          <a:ln>
-            <a:noFill/>
-          </a:ln>
-        </p:spPr>
-        <p:txBody>
-          <a:bodyPr spcFirstLastPara="1" wrap="square" lIns="91425" tIns="91425" rIns="91425" bIns="91425" anchor="t" anchorCtr="0">
-            <a:noAutofit/>
-          </a:bodyPr>
-          <a:lstStyle/>
-          <a:p>
-            <a:pPr marL="0" lvl="0" indent="0" algn="l" rtl="0">
-              <a:spcBef>
-                <a:spcPts val="0"/>
-              </a:spcBef>
-              <a:spcAft>
-                <a:spcPts val="0"/>
-              </a:spcAft>
-              <a:buNone/>
-            </a:pPr>
-            <a:r>
-              <a:rPr lang="en" sz="2800">
-                <a:latin typeface="Bungee"/>
-                <a:ea typeface="Bungee"/>
-                <a:cs typeface="Bungee"/>
-                <a:sym typeface="Bungee"/>
-              </a:rPr>
-              <a:t>Conclusion: The Enduring Legacy of de_nuke and its Impact on the FPS Genre</a:t>
-            </a:r>
-            <a:endParaRPr sz="2800">
-              <a:solidFill>
-                <a:srgbClr val="000000"/>
-              </a:solidFill>
-              <a:latin typeface="Bungee"/>
-              <a:ea typeface="Bungee"/>
-              <a:cs typeface="Bungee"/>
-              <a:sym typeface="Bungee"/>
-            </a:endParaRPr>
-          </a:p>
-        </p:txBody>
-      </p:sp>
-      <p:sp>
-        <p:nvSpPr>
-          <p:cNvPr id="66" name="Google Shape;66;p14"/>
-          <p:cNvSpPr txBox="1"/>
-          <p:nvPr/>
-        </p:nvSpPr>
-        <p:spPr>
-          <a:xfrm>
-            <a:off x="311700" y="1152475"/>
-            <a:ext cx="7422525" cy="3416400"/>
-          </a:xfrm>
-          <a:prstGeom prst="rect">
-            <a:avLst/>
-          </a:prstGeom>
-          <a:noFill/>
-          <a:ln>
-            <a:noFill/>
-          </a:ln>
-        </p:spPr>
-        <p:txBody>
-          <a:bodyPr spcFirstLastPara="1" wrap="square" lIns="91425" tIns="91425" rIns="91425" bIns="91425" anchor="t" anchorCtr="0">
-            <a:noAutofit/>
-          </a:bodyPr>
-          <a:lstStyle/>
-          <a:p>
-            <a:pPr marL="0" lvl="0" indent="0" algn="l" rtl="0">
-              <a:lnSpc>
-                <a:spcPct val="115000"/>
-              </a:lnSpc>
-              <a:spcBef>
-                <a:spcPts val="0"/>
-              </a:spcBef>
-              <a:spcAft>
-                <a:spcPts val="1200"/>
-              </a:spcAft>
-              <a:buNone/>
-            </a:pPr>
-            <a:r>
-              <a:rPr lang="en" sz="1800">
-                <a:solidFill>
-                  <a:srgbClr val="595959"/>
-                </a:solidFill>
-                <a:latin typeface="Oswald"/>
-                <a:ea typeface="Oswald"/>
-                <a:cs typeface="Oswald"/>
-                <a:sym typeface="Oswald"/>
-              </a:rPr>
-              <a:t>Summarize the lasting influence de_nuke has had on Counter-Strike and the first-person shooter genre, cementing its place in gaming history.</a:t>
-            </a:r>
-            <a:endParaRPr sz="1800">
-              <a:solidFill>
-                <a:srgbClr val="595959"/>
-              </a:solidFill>
-              <a:latin typeface="Oswald"/>
-              <a:ea typeface="Oswald"/>
-              <a:cs typeface="Oswald"/>
-              <a:sym typeface="Oswald"/>
-            </a:endParaRPr>
-          </a:p>
-        </p:txBody>
-      </p:sp>
-      <p:sp>
-        <p:nvSpPr>
-          <p:cNvPr id="67" name="Google Shape;67;p14"/>
-          <p:cNvSpPr/>
-          <p:nvPr/>
-        </p:nvSpPr>
-        <p:spPr>
-          <a:xfrm>
-            <a:off x="8074450" y="-1345525"/>
-            <a:ext cx="346800" cy="7043400"/>
-          </a:xfrm>
-          <a:prstGeom prst="rect">
-            <a:avLst/>
-          </a:prstGeom>
-          <a:solidFill>
-            <a:srgbClr val="FFB627"/>
-          </a:solidFill>
-          <a:ln>
-            <a:noFill/>
-          </a:ln>
-        </p:spPr>
-        <p:txBody>
-          <a:bodyPr spcFirstLastPara="1" wrap="square" lIns="91425" tIns="91425" rIns="91425" bIns="91425" anchor="ctr" anchorCtr="0">
-            <a:noAutofit/>
-          </a:bodyPr>
-          <a:lstStyle/>
-          <a:p>
-            <a:pPr marL="0" lvl="0" indent="0" algn="l" rtl="0">
-              <a:spcBef>
-                <a:spcPts val="0"/>
-              </a:spcBef>
-              <a:spcAft>
-                <a:spcPts val="0"/>
-              </a:spcAft>
-              <a:buNone/>
-            </a:pPr>
-            <a:endParaRPr/>
-          </a:p>
-        </p:txBody>
-      </p:sp>
-      <p:sp>
-        <p:nvSpPr>
-          <p:cNvPr id="68" name="Google Shape;68;p14"/>
-          <p:cNvSpPr/>
-          <p:nvPr/>
-        </p:nvSpPr>
-        <p:spPr>
-          <a:xfrm>
-            <a:off x="8421250" y="-1345525"/>
-            <a:ext cx="346800" cy="7043400"/>
-          </a:xfrm>
-          <a:prstGeom prst="rect">
-            <a:avLst/>
-          </a:prstGeom>
-          <a:solidFill>
-            <a:srgbClr val="FF9505"/>
-          </a:solidFill>
-          <a:ln>
-            <a:noFill/>
-          </a:ln>
-        </p:spPr>
-        <p:txBody>
-          <a:bodyPr spcFirstLastPara="1" wrap="square" lIns="91425" tIns="91425" rIns="91425" bIns="91425" anchor="ctr" anchorCtr="0">
-            <a:noAutofit/>
-          </a:bodyPr>
-          <a:lstStyle/>
-          <a:p>
-            <a:pPr marL="0" lvl="0" indent="0" algn="l" rtl="0">
-              <a:spcBef>
-                <a:spcPts val="0"/>
-              </a:spcBef>
-              <a:spcAft>
-                <a:spcPts val="0"/>
-              </a:spcAft>
-              <a:buNone/>
-            </a:pPr>
+            <a:r>
+              <a:t/>
+            </a:r>
             <a:endParaRPr/>
           </a:p>
         </p:txBody>
@@ -6034,12 +3388,12 @@
           </a:ln>
         </p:spPr>
         <p:txBody>
-          <a:bodyPr spcFirstLastPara="1" wrap="square" lIns="91425" tIns="91425" rIns="91425" bIns="91425" anchor="ctr" anchorCtr="0">
+          <a:bodyPr anchorCtr="0" anchor="ctr" bIns="91425" lIns="91425" spcFirstLastPara="1" rIns="91425" wrap="square" tIns="91425">
             <a:noAutofit/>
           </a:bodyPr>
           <a:lstStyle/>
           <a:p>
-            <a:pPr marL="0" lvl="0" indent="0" algn="l" rtl="0">
+            <a:pPr indent="0" lvl="0" marL="0" rtl="0" algn="l">
               <a:spcBef>
                 <a:spcPts val="0"/>
               </a:spcBef>
@@ -6048,6 +3402,9 @@
               </a:spcAft>
               <a:buNone/>
             </a:pPr>
+            <a:r>
+              <a:t/>
+            </a:r>
             <a:endParaRPr/>
           </a:p>
         </p:txBody>
@@ -6074,12 +3431,12 @@
           </a:ln>
         </p:spPr>
         <p:txBody>
-          <a:bodyPr spcFirstLastPara="1" wrap="square" lIns="91425" tIns="91425" rIns="91425" bIns="91425" anchor="ctr" anchorCtr="0">
+          <a:bodyPr anchorCtr="0" anchor="ctr" bIns="91425" lIns="91425" spcFirstLastPara="1" rIns="91425" wrap="square" tIns="91425">
             <a:noAutofit/>
           </a:bodyPr>
           <a:lstStyle/>
           <a:p>
-            <a:pPr marL="0" lvl="0" indent="0" algn="l" rtl="0">
+            <a:pPr indent="0" lvl="0" marL="0" rtl="0" algn="l">
               <a:spcBef>
                 <a:spcPts val="0"/>
               </a:spcBef>
@@ -6088,6 +3445,9 @@
               </a:spcAft>
               <a:buNone/>
             </a:pPr>
+            <a:r>
+              <a:t/>
+            </a:r>
             <a:endParaRPr/>
           </a:p>
         </p:txBody>
@@ -6112,12 +3472,12 @@
           </a:ln>
         </p:spPr>
         <p:txBody>
-          <a:bodyPr spcFirstLastPara="1" wrap="square" lIns="91425" tIns="91425" rIns="91425" bIns="91425" anchor="t" anchorCtr="0">
-            <a:noAutofit/>
+          <a:bodyPr anchorCtr="0" anchor="t" bIns="91425" lIns="91425" spcFirstLastPara="1" rIns="91425" wrap="square" tIns="91425">
+            <a:normAutofit lnSpcReduction="10000"/>
           </a:bodyPr>
           <a:lstStyle/>
           <a:p>
-            <a:pPr marL="0" lvl="0" indent="0" algn="l" rtl="0">
+            <a:pPr indent="0" lvl="0" marL="0" rtl="0" algn="l">
               <a:spcBef>
                 <a:spcPts val="0"/>
               </a:spcBef>
@@ -6133,7 +3493,7 @@
                 <a:cs typeface="Bungee"/>
                 <a:sym typeface="Bungee"/>
               </a:rPr>
-              <a:t>Introduction to Counter-Strike and its Importance in Esports</a:t>
+              <a:t>Step 1: Gather Ingredients &amp; Tools</a:t>
             </a:r>
             <a:endParaRPr sz="2800">
               <a:solidFill>
@@ -6156,7 +3516,7 @@
         <p:spPr>
           <a:xfrm>
             <a:off x="311700" y="1152475"/>
-            <a:ext cx="7422525" cy="3416400"/>
+            <a:ext cx="8520600" cy="3416400"/>
           </a:xfrm>
           <a:prstGeom prst="rect">
             <a:avLst/>
@@ -6167,12 +3527,12 @@
           </a:ln>
         </p:spPr>
         <p:txBody>
-          <a:bodyPr spcFirstLastPara="1" wrap="square" lIns="91425" tIns="91425" rIns="91425" bIns="91425" anchor="t" anchorCtr="0">
+          <a:bodyPr anchorCtr="0" anchor="t" bIns="91425" lIns="91425" spcFirstLastPara="1" rIns="91425" wrap="square" tIns="91425">
             <a:noAutofit/>
           </a:bodyPr>
           <a:lstStyle/>
           <a:p>
-            <a:pPr marL="0" lvl="0" indent="0" algn="l" rtl="0">
+            <a:pPr indent="0" lvl="0" marL="0" rtl="0" algn="l">
               <a:lnSpc>
                 <a:spcPct val="115000"/>
               </a:lnSpc>
@@ -6194,7 +3554,7 @@
                 <a:cs typeface="Oswald"/>
                 <a:sym typeface="Oswald"/>
               </a:rPr>
-              <a:t>Discover the world of Counter-Strike, a pioneering first-person shooter that redefined competitive gaming and paved the way for a new era of esports.</a:t>
+              <a:t>Begin your egg-cellent adventure by getting fresh eggs and the necessary kitchen tools. You'll need a non-stick frying pan, a spatula, and some oil or butter. Choose the freshest eggs for the best taste and appearance.</a:t>
             </a:r>
             <a:endParaRPr sz="1800">
               <a:solidFill>
@@ -6230,12 +3590,12 @@
           </a:ln>
         </p:spPr>
         <p:txBody>
-          <a:bodyPr spcFirstLastPara="1" wrap="square" lIns="91425" tIns="91425" rIns="91425" bIns="91425" anchor="ctr" anchorCtr="0">
+          <a:bodyPr anchorCtr="0" anchor="ctr" bIns="91425" lIns="91425" spcFirstLastPara="1" rIns="91425" wrap="square" tIns="91425">
             <a:noAutofit/>
           </a:bodyPr>
           <a:lstStyle/>
           <a:p>
-            <a:pPr marL="0" lvl="0" indent="0" algn="l" rtl="0">
+            <a:pPr indent="0" lvl="0" marL="0" rtl="0" algn="l">
               <a:spcBef>
                 <a:spcPts val="0"/>
               </a:spcBef>
@@ -6244,6 +3604,9 @@
               </a:spcAft>
               <a:buNone/>
             </a:pPr>
+            <a:r>
+              <a:t/>
+            </a:r>
             <a:endParaRPr/>
           </a:p>
         </p:txBody>
@@ -6270,12 +3633,12 @@
           </a:ln>
         </p:spPr>
         <p:txBody>
-          <a:bodyPr spcFirstLastPara="1" wrap="square" lIns="91425" tIns="91425" rIns="91425" bIns="91425" anchor="ctr" anchorCtr="0">
+          <a:bodyPr anchorCtr="0" anchor="ctr" bIns="91425" lIns="91425" spcFirstLastPara="1" rIns="91425" wrap="square" tIns="91425">
             <a:noAutofit/>
           </a:bodyPr>
           <a:lstStyle/>
           <a:p>
-            <a:pPr marL="0" lvl="0" indent="0" algn="l" rtl="0">
+            <a:pPr indent="0" lvl="0" marL="0" rtl="0" algn="l">
               <a:spcBef>
                 <a:spcPts val="0"/>
               </a:spcBef>
@@ -6284,6 +3647,9 @@
               </a:spcAft>
               <a:buNone/>
             </a:pPr>
+            <a:r>
+              <a:t/>
+            </a:r>
             <a:endParaRPr/>
           </a:p>
         </p:txBody>
@@ -6328,12 +3694,12 @@
           </a:ln>
         </p:spPr>
         <p:txBody>
-          <a:bodyPr spcFirstLastPara="1" wrap="square" lIns="91425" tIns="91425" rIns="91425" bIns="91425" anchor="ctr" anchorCtr="0">
+          <a:bodyPr anchorCtr="0" anchor="ctr" bIns="91425" lIns="91425" spcFirstLastPara="1" rIns="91425" wrap="square" tIns="91425">
             <a:noAutofit/>
           </a:bodyPr>
           <a:lstStyle/>
           <a:p>
-            <a:pPr marL="0" lvl="0" indent="0" algn="l" rtl="0">
+            <a:pPr indent="0" lvl="0" marL="0" rtl="0" algn="l">
               <a:spcBef>
                 <a:spcPts val="0"/>
               </a:spcBef>
@@ -6342,6 +3708,9 @@
               </a:spcAft>
               <a:buNone/>
             </a:pPr>
+            <a:r>
+              <a:t/>
+            </a:r>
             <a:endParaRPr/>
           </a:p>
         </p:txBody>
@@ -6368,12 +3737,12 @@
           </a:ln>
         </p:spPr>
         <p:txBody>
-          <a:bodyPr spcFirstLastPara="1" wrap="square" lIns="91425" tIns="91425" rIns="91425" bIns="91425" anchor="ctr" anchorCtr="0">
+          <a:bodyPr anchorCtr="0" anchor="ctr" bIns="91425" lIns="91425" spcFirstLastPara="1" rIns="91425" wrap="square" tIns="91425">
             <a:noAutofit/>
           </a:bodyPr>
           <a:lstStyle/>
           <a:p>
-            <a:pPr marL="0" lvl="0" indent="0" algn="l" rtl="0">
+            <a:pPr indent="0" lvl="0" marL="0" rtl="0" algn="l">
               <a:spcBef>
                 <a:spcPts val="0"/>
               </a:spcBef>
@@ -6382,6 +3751,9 @@
               </a:spcAft>
               <a:buNone/>
             </a:pPr>
+            <a:r>
+              <a:t/>
+            </a:r>
             <a:endParaRPr/>
           </a:p>
         </p:txBody>
@@ -6406,12 +3778,12 @@
           </a:ln>
         </p:spPr>
         <p:txBody>
-          <a:bodyPr spcFirstLastPara="1" wrap="square" lIns="91425" tIns="91425" rIns="91425" bIns="91425" anchor="t" anchorCtr="0">
-            <a:noAutofit/>
+          <a:bodyPr anchorCtr="0" anchor="t" bIns="91425" lIns="91425" spcFirstLastPara="1" rIns="91425" wrap="square" tIns="91425">
+            <a:normAutofit lnSpcReduction="10000"/>
           </a:bodyPr>
           <a:lstStyle/>
           <a:p>
-            <a:pPr marL="0" lvl="0" indent="0" algn="l" rtl="0">
+            <a:pPr indent="0" lvl="0" marL="0" rtl="0" algn="l">
               <a:spcBef>
                 <a:spcPts val="0"/>
               </a:spcBef>
@@ -6427,7 +3799,7 @@
                 <a:cs typeface="Bungee"/>
                 <a:sym typeface="Bungee"/>
               </a:rPr>
-              <a:t>Introduction to the de_nuke Map</a:t>
+              <a:t>Step 2: Preheat the Pan</a:t>
             </a:r>
             <a:endParaRPr sz="2800">
               <a:solidFill>
@@ -6450,7 +3822,7 @@
         <p:spPr>
           <a:xfrm>
             <a:off x="311700" y="1152475"/>
-            <a:ext cx="7422525" cy="3416400"/>
+            <a:ext cx="8520600" cy="3416400"/>
           </a:xfrm>
           <a:prstGeom prst="rect">
             <a:avLst/>
@@ -6461,12 +3833,12 @@
           </a:ln>
         </p:spPr>
         <p:txBody>
-          <a:bodyPr spcFirstLastPara="1" wrap="square" lIns="91425" tIns="91425" rIns="91425" bIns="91425" anchor="t" anchorCtr="0">
+          <a:bodyPr anchorCtr="0" anchor="t" bIns="91425" lIns="91425" spcFirstLastPara="1" rIns="91425" wrap="square" tIns="91425">
             <a:noAutofit/>
           </a:bodyPr>
           <a:lstStyle/>
           <a:p>
-            <a:pPr marL="0" lvl="0" indent="0" algn="l" rtl="0">
+            <a:pPr indent="0" lvl="0" marL="0" rtl="0" algn="l">
               <a:lnSpc>
                 <a:spcPct val="115000"/>
               </a:lnSpc>
@@ -6488,7 +3860,7 @@
                 <a:cs typeface="Oswald"/>
                 <a:sym typeface="Oswald"/>
               </a:rPr>
-              <a:t>An inside look at de_nuke, an iconic map beloved by players for its complex design and strategic depth.</a:t>
+              <a:t>Place your non-stick frying pan on the stove over medium heat. Allow it to warm up for a minute or two. A properly preheated pan ensures your egg will cook evenly without burning.</a:t>
             </a:r>
             <a:endParaRPr sz="1800">
               <a:solidFill>
@@ -6524,12 +3896,12 @@
           </a:ln>
         </p:spPr>
         <p:txBody>
-          <a:bodyPr spcFirstLastPara="1" wrap="square" lIns="91425" tIns="91425" rIns="91425" bIns="91425" anchor="ctr" anchorCtr="0">
+          <a:bodyPr anchorCtr="0" anchor="ctr" bIns="91425" lIns="91425" spcFirstLastPara="1" rIns="91425" wrap="square" tIns="91425">
             <a:noAutofit/>
           </a:bodyPr>
           <a:lstStyle/>
           <a:p>
-            <a:pPr marL="0" lvl="0" indent="0" algn="l" rtl="0">
+            <a:pPr indent="0" lvl="0" marL="0" rtl="0" algn="l">
               <a:spcBef>
                 <a:spcPts val="0"/>
               </a:spcBef>
@@ -6538,6 +3910,9 @@
               </a:spcAft>
               <a:buNone/>
             </a:pPr>
+            <a:r>
+              <a:t/>
+            </a:r>
             <a:endParaRPr/>
           </a:p>
         </p:txBody>
@@ -6564,12 +3939,12 @@
           </a:ln>
         </p:spPr>
         <p:txBody>
-          <a:bodyPr spcFirstLastPara="1" wrap="square" lIns="91425" tIns="91425" rIns="91425" bIns="91425" anchor="ctr" anchorCtr="0">
+          <a:bodyPr anchorCtr="0" anchor="ctr" bIns="91425" lIns="91425" spcFirstLastPara="1" rIns="91425" wrap="square" tIns="91425">
             <a:noAutofit/>
           </a:bodyPr>
           <a:lstStyle/>
           <a:p>
-            <a:pPr marL="0" lvl="0" indent="0" algn="l" rtl="0">
+            <a:pPr indent="0" lvl="0" marL="0" rtl="0" algn="l">
               <a:spcBef>
                 <a:spcPts val="0"/>
               </a:spcBef>
@@ -6578,6 +3953,9 @@
               </a:spcAft>
               <a:buNone/>
             </a:pPr>
+            <a:r>
+              <a:t/>
+            </a:r>
             <a:endParaRPr/>
           </a:p>
         </p:txBody>
@@ -6622,12 +4000,12 @@
           </a:ln>
         </p:spPr>
         <p:txBody>
-          <a:bodyPr spcFirstLastPara="1" wrap="square" lIns="91425" tIns="91425" rIns="91425" bIns="91425" anchor="ctr" anchorCtr="0">
+          <a:bodyPr anchorCtr="0" anchor="ctr" bIns="91425" lIns="91425" spcFirstLastPara="1" rIns="91425" wrap="square" tIns="91425">
             <a:noAutofit/>
           </a:bodyPr>
           <a:lstStyle/>
           <a:p>
-            <a:pPr marL="0" lvl="0" indent="0" algn="l" rtl="0">
+            <a:pPr indent="0" lvl="0" marL="0" rtl="0" algn="l">
               <a:spcBef>
                 <a:spcPts val="0"/>
               </a:spcBef>
@@ -6636,6 +4014,9 @@
               </a:spcAft>
               <a:buNone/>
             </a:pPr>
+            <a:r>
+              <a:t/>
+            </a:r>
             <a:endParaRPr/>
           </a:p>
         </p:txBody>
@@ -6662,12 +4043,12 @@
           </a:ln>
         </p:spPr>
         <p:txBody>
-          <a:bodyPr spcFirstLastPara="1" wrap="square" lIns="91425" tIns="91425" rIns="91425" bIns="91425" anchor="ctr" anchorCtr="0">
+          <a:bodyPr anchorCtr="0" anchor="ctr" bIns="91425" lIns="91425" spcFirstLastPara="1" rIns="91425" wrap="square" tIns="91425">
             <a:noAutofit/>
           </a:bodyPr>
           <a:lstStyle/>
           <a:p>
-            <a:pPr marL="0" lvl="0" indent="0" algn="l" rtl="0">
+            <a:pPr indent="0" lvl="0" marL="0" rtl="0" algn="l">
               <a:spcBef>
                 <a:spcPts val="0"/>
               </a:spcBef>
@@ -6676,6 +4057,9 @@
               </a:spcAft>
               <a:buNone/>
             </a:pPr>
+            <a:r>
+              <a:t/>
+            </a:r>
             <a:endParaRPr/>
           </a:p>
         </p:txBody>
@@ -6700,12 +4084,12 @@
           </a:ln>
         </p:spPr>
         <p:txBody>
-          <a:bodyPr spcFirstLastPara="1" wrap="square" lIns="91425" tIns="91425" rIns="91425" bIns="91425" anchor="t" anchorCtr="0">
-            <a:noAutofit/>
+          <a:bodyPr anchorCtr="0" anchor="t" bIns="91425" lIns="91425" spcFirstLastPara="1" rIns="91425" wrap="square" tIns="91425">
+            <a:normAutofit lnSpcReduction="10000"/>
           </a:bodyPr>
           <a:lstStyle/>
           <a:p>
-            <a:pPr marL="0" lvl="0" indent="0" algn="l" rtl="0">
+            <a:pPr indent="0" lvl="0" marL="0" rtl="0" algn="l">
               <a:spcBef>
                 <a:spcPts val="0"/>
               </a:spcBef>
@@ -6721,7 +4105,7 @@
                 <a:cs typeface="Bungee"/>
                 <a:sym typeface="Bungee"/>
               </a:rPr>
-              <a:t>Design Philosophy: Conceptualizing de_nuke</a:t>
+              <a:t>Step 3: Add Oil or Butter</a:t>
             </a:r>
             <a:endParaRPr sz="2800">
               <a:solidFill>
@@ -6744,7 +4128,7 @@
         <p:spPr>
           <a:xfrm>
             <a:off x="311700" y="1152475"/>
-            <a:ext cx="7422525" cy="3416400"/>
+            <a:ext cx="8520600" cy="3416400"/>
           </a:xfrm>
           <a:prstGeom prst="rect">
             <a:avLst/>
@@ -6755,12 +4139,12 @@
           </a:ln>
         </p:spPr>
         <p:txBody>
-          <a:bodyPr spcFirstLastPara="1" wrap="square" lIns="91425" tIns="91425" rIns="91425" bIns="91425" anchor="t" anchorCtr="0">
+          <a:bodyPr anchorCtr="0" anchor="t" bIns="91425" lIns="91425" spcFirstLastPara="1" rIns="91425" wrap="square" tIns="91425">
             <a:noAutofit/>
           </a:bodyPr>
           <a:lstStyle/>
           <a:p>
-            <a:pPr marL="0" lvl="0" indent="0" algn="l" rtl="0">
+            <a:pPr indent="0" lvl="0" marL="0" rtl="0" algn="l">
               <a:lnSpc>
                 <a:spcPct val="115000"/>
               </a:lnSpc>
@@ -6782,7 +4166,7 @@
                 <a:cs typeface="Oswald"/>
                 <a:sym typeface="Oswald"/>
               </a:rPr>
-              <a:t>Uncover the creative process behind de_nuke, from initial sketches to its integration into the Counter-Strike universe.</a:t>
+              <a:t>Once the pan is heated, add a small amount of oil or butter. Swirl it around to coat the bottom of the pan. This prevents sticking and adds flavor to your sunny side up eggs.</a:t>
             </a:r>
             <a:endParaRPr sz="1800">
               <a:solidFill>
@@ -6818,12 +4202,12 @@
           </a:ln>
         </p:spPr>
         <p:txBody>
-          <a:bodyPr spcFirstLastPara="1" wrap="square" lIns="91425" tIns="91425" rIns="91425" bIns="91425" anchor="ctr" anchorCtr="0">
+          <a:bodyPr anchorCtr="0" anchor="ctr" bIns="91425" lIns="91425" spcFirstLastPara="1" rIns="91425" wrap="square" tIns="91425">
             <a:noAutofit/>
           </a:bodyPr>
           <a:lstStyle/>
           <a:p>
-            <a:pPr marL="0" lvl="0" indent="0" algn="l" rtl="0">
+            <a:pPr indent="0" lvl="0" marL="0" rtl="0" algn="l">
               <a:spcBef>
                 <a:spcPts val="0"/>
               </a:spcBef>
@@ -6832,6 +4216,9 @@
               </a:spcAft>
               <a:buNone/>
             </a:pPr>
+            <a:r>
+              <a:t/>
+            </a:r>
             <a:endParaRPr/>
           </a:p>
         </p:txBody>
@@ -6858,12 +4245,12 @@
           </a:ln>
         </p:spPr>
         <p:txBody>
-          <a:bodyPr spcFirstLastPara="1" wrap="square" lIns="91425" tIns="91425" rIns="91425" bIns="91425" anchor="ctr" anchorCtr="0">
+          <a:bodyPr anchorCtr="0" anchor="ctr" bIns="91425" lIns="91425" spcFirstLastPara="1" rIns="91425" wrap="square" tIns="91425">
             <a:noAutofit/>
           </a:bodyPr>
           <a:lstStyle/>
           <a:p>
-            <a:pPr marL="0" lvl="0" indent="0" algn="l" rtl="0">
+            <a:pPr indent="0" lvl="0" marL="0" rtl="0" algn="l">
               <a:spcBef>
                 <a:spcPts val="0"/>
               </a:spcBef>
@@ -6872,6 +4259,9 @@
               </a:spcAft>
               <a:buNone/>
             </a:pPr>
+            <a:r>
+              <a:t/>
+            </a:r>
             <a:endParaRPr/>
           </a:p>
         </p:txBody>
@@ -6916,12 +4306,12 @@
           </a:ln>
         </p:spPr>
         <p:txBody>
-          <a:bodyPr spcFirstLastPara="1" wrap="square" lIns="91425" tIns="91425" rIns="91425" bIns="91425" anchor="ctr" anchorCtr="0">
+          <a:bodyPr anchorCtr="0" anchor="ctr" bIns="91425" lIns="91425" spcFirstLastPara="1" rIns="91425" wrap="square" tIns="91425">
             <a:noAutofit/>
           </a:bodyPr>
           <a:lstStyle/>
           <a:p>
-            <a:pPr marL="0" lvl="0" indent="0" algn="l" rtl="0">
+            <a:pPr indent="0" lvl="0" marL="0" rtl="0" algn="l">
               <a:spcBef>
                 <a:spcPts val="0"/>
               </a:spcBef>
@@ -6930,6 +4320,9 @@
               </a:spcAft>
               <a:buNone/>
             </a:pPr>
+            <a:r>
+              <a:t/>
+            </a:r>
             <a:endParaRPr/>
           </a:p>
         </p:txBody>
@@ -6956,12 +4349,12 @@
           </a:ln>
         </p:spPr>
         <p:txBody>
-          <a:bodyPr spcFirstLastPara="1" wrap="square" lIns="91425" tIns="91425" rIns="91425" bIns="91425" anchor="ctr" anchorCtr="0">
+          <a:bodyPr anchorCtr="0" anchor="ctr" bIns="91425" lIns="91425" spcFirstLastPara="1" rIns="91425" wrap="square" tIns="91425">
             <a:noAutofit/>
           </a:bodyPr>
           <a:lstStyle/>
           <a:p>
-            <a:pPr marL="0" lvl="0" indent="0" algn="l" rtl="0">
+            <a:pPr indent="0" lvl="0" marL="0" rtl="0" algn="l">
               <a:spcBef>
                 <a:spcPts val="0"/>
               </a:spcBef>
@@ -6970,6 +4363,9 @@
               </a:spcAft>
               <a:buNone/>
             </a:pPr>
+            <a:r>
+              <a:t/>
+            </a:r>
             <a:endParaRPr/>
           </a:p>
         </p:txBody>
@@ -6994,12 +4390,12 @@
           </a:ln>
         </p:spPr>
         <p:txBody>
-          <a:bodyPr spcFirstLastPara="1" wrap="square" lIns="91425" tIns="91425" rIns="91425" bIns="91425" anchor="t" anchorCtr="0">
-            <a:noAutofit/>
+          <a:bodyPr anchorCtr="0" anchor="t" bIns="91425" lIns="91425" spcFirstLastPara="1" rIns="91425" wrap="square" tIns="91425">
+            <a:normAutofit lnSpcReduction="10000"/>
           </a:bodyPr>
           <a:lstStyle/>
           <a:p>
-            <a:pPr marL="0" lvl="0" indent="0" algn="l" rtl="0">
+            <a:pPr indent="0" lvl="0" marL="0" rtl="0" algn="l">
               <a:spcBef>
                 <a:spcPts val="0"/>
               </a:spcBef>
@@ -7015,7 +4411,7 @@
                 <a:cs typeface="Bungee"/>
                 <a:sym typeface="Bungee"/>
               </a:rPr>
-              <a:t>The Original de_nuke: Features and Gameplay</a:t>
+              <a:t>Step 4: Crack the Egg</a:t>
             </a:r>
             <a:endParaRPr sz="2800">
               <a:solidFill>
@@ -7038,7 +4434,7 @@
         <p:spPr>
           <a:xfrm>
             <a:off x="311700" y="1152475"/>
-            <a:ext cx="7422525" cy="3416400"/>
+            <a:ext cx="8520600" cy="3416400"/>
           </a:xfrm>
           <a:prstGeom prst="rect">
             <a:avLst/>
@@ -7049,12 +4445,12 @@
           </a:ln>
         </p:spPr>
         <p:txBody>
-          <a:bodyPr spcFirstLastPara="1" wrap="square" lIns="91425" tIns="91425" rIns="91425" bIns="91425" anchor="t" anchorCtr="0">
+          <a:bodyPr anchorCtr="0" anchor="t" bIns="91425" lIns="91425" spcFirstLastPara="1" rIns="91425" wrap="square" tIns="91425">
             <a:noAutofit/>
           </a:bodyPr>
           <a:lstStyle/>
           <a:p>
-            <a:pPr marL="0" lvl="0" indent="0" algn="l" rtl="0">
+            <a:pPr indent="0" lvl="0" marL="0" rtl="0" algn="l">
               <a:lnSpc>
                 <a:spcPct val="115000"/>
               </a:lnSpc>
@@ -7076,7 +4472,7 @@
                 <a:cs typeface="Oswald"/>
                 <a:sym typeface="Oswald"/>
               </a:rPr>
-              <a:t>Step back in time to the release of the original de_nuke, examining its features and how it shaped the gameplay experience.</a:t>
+              <a:t>Carefully crack the egg into a small bowl to avoid shell fragments. Then gently slide the egg from the bowl into the pan. This helps keep the yolk intact for that perfect sunny side up appearance.</a:t>
             </a:r>
             <a:endParaRPr sz="1800">
               <a:solidFill>
@@ -7112,12 +4508,12 @@
           </a:ln>
         </p:spPr>
         <p:txBody>
-          <a:bodyPr spcFirstLastPara="1" wrap="square" lIns="91425" tIns="91425" rIns="91425" bIns="91425" anchor="ctr" anchorCtr="0">
+          <a:bodyPr anchorCtr="0" anchor="ctr" bIns="91425" lIns="91425" spcFirstLastPara="1" rIns="91425" wrap="square" tIns="91425">
             <a:noAutofit/>
           </a:bodyPr>
           <a:lstStyle/>
           <a:p>
-            <a:pPr marL="0" lvl="0" indent="0" algn="l" rtl="0">
+            <a:pPr indent="0" lvl="0" marL="0" rtl="0" algn="l">
               <a:spcBef>
                 <a:spcPts val="0"/>
               </a:spcBef>
@@ -7126,6 +4522,9 @@
               </a:spcAft>
               <a:buNone/>
             </a:pPr>
+            <a:r>
+              <a:t/>
+            </a:r>
             <a:endParaRPr/>
           </a:p>
         </p:txBody>
@@ -7152,12 +4551,12 @@
           </a:ln>
         </p:spPr>
         <p:txBody>
-          <a:bodyPr spcFirstLastPara="1" wrap="square" lIns="91425" tIns="91425" rIns="91425" bIns="91425" anchor="ctr" anchorCtr="0">
+          <a:bodyPr anchorCtr="0" anchor="ctr" bIns="91425" lIns="91425" spcFirstLastPara="1" rIns="91425" wrap="square" tIns="91425">
             <a:noAutofit/>
           </a:bodyPr>
           <a:lstStyle/>
           <a:p>
-            <a:pPr marL="0" lvl="0" indent="0" algn="l" rtl="0">
+            <a:pPr indent="0" lvl="0" marL="0" rtl="0" algn="l">
               <a:spcBef>
                 <a:spcPts val="0"/>
               </a:spcBef>
@@ -7166,6 +4565,9 @@
               </a:spcAft>
               <a:buNone/>
             </a:pPr>
+            <a:r>
+              <a:t/>
+            </a:r>
             <a:endParaRPr/>
           </a:p>
         </p:txBody>
@@ -7210,12 +4612,12 @@
           </a:ln>
         </p:spPr>
         <p:txBody>
-          <a:bodyPr spcFirstLastPara="1" wrap="square" lIns="91425" tIns="91425" rIns="91425" bIns="91425" anchor="ctr" anchorCtr="0">
+          <a:bodyPr anchorCtr="0" anchor="ctr" bIns="91425" lIns="91425" spcFirstLastPara="1" rIns="91425" wrap="square" tIns="91425">
             <a:noAutofit/>
           </a:bodyPr>
           <a:lstStyle/>
           <a:p>
-            <a:pPr marL="0" lvl="0" indent="0" algn="l" rtl="0">
+            <a:pPr indent="0" lvl="0" marL="0" rtl="0" algn="l">
               <a:spcBef>
                 <a:spcPts val="0"/>
               </a:spcBef>
@@ -7224,6 +4626,9 @@
               </a:spcAft>
               <a:buNone/>
             </a:pPr>
+            <a:r>
+              <a:t/>
+            </a:r>
             <a:endParaRPr/>
           </a:p>
         </p:txBody>
@@ -7250,12 +4655,12 @@
           </a:ln>
         </p:spPr>
         <p:txBody>
-          <a:bodyPr spcFirstLastPara="1" wrap="square" lIns="91425" tIns="91425" rIns="91425" bIns="91425" anchor="ctr" anchorCtr="0">
+          <a:bodyPr anchorCtr="0" anchor="ctr" bIns="91425" lIns="91425" spcFirstLastPara="1" rIns="91425" wrap="square" tIns="91425">
             <a:noAutofit/>
           </a:bodyPr>
           <a:lstStyle/>
           <a:p>
-            <a:pPr marL="0" lvl="0" indent="0" algn="l" rtl="0">
+            <a:pPr indent="0" lvl="0" marL="0" rtl="0" algn="l">
               <a:spcBef>
                 <a:spcPts val="0"/>
               </a:spcBef>
@@ -7264,6 +4669,9 @@
               </a:spcAft>
               <a:buNone/>
             </a:pPr>
+            <a:r>
+              <a:t/>
+            </a:r>
             <a:endParaRPr/>
           </a:p>
         </p:txBody>
@@ -7288,12 +4696,12 @@
           </a:ln>
         </p:spPr>
         <p:txBody>
-          <a:bodyPr spcFirstLastPara="1" wrap="square" lIns="91425" tIns="91425" rIns="91425" bIns="91425" anchor="t" anchorCtr="0">
-            <a:noAutofit/>
+          <a:bodyPr anchorCtr="0" anchor="t" bIns="91425" lIns="91425" spcFirstLastPara="1" rIns="91425" wrap="square" tIns="91425">
+            <a:normAutofit lnSpcReduction="10000"/>
           </a:bodyPr>
           <a:lstStyle/>
           <a:p>
-            <a:pPr marL="0" lvl="0" indent="0" algn="l" rtl="0">
+            <a:pPr indent="0" lvl="0" marL="0" rtl="0" algn="l">
               <a:spcBef>
                 <a:spcPts val="0"/>
               </a:spcBef>
@@ -7309,7 +4717,7 @@
                 <a:cs typeface="Bungee"/>
                 <a:sym typeface="Bungee"/>
               </a:rPr>
-              <a:t>Early Changes and Revisions to de_nuke</a:t>
+              <a:t>Step 5: Cook on Low Heat</a:t>
             </a:r>
             <a:endParaRPr sz="2800">
               <a:solidFill>
@@ -7332,7 +4740,7 @@
         <p:spPr>
           <a:xfrm>
             <a:off x="311700" y="1152475"/>
-            <a:ext cx="7422525" cy="3416400"/>
+            <a:ext cx="8520600" cy="3416400"/>
           </a:xfrm>
           <a:prstGeom prst="rect">
             <a:avLst/>
@@ -7343,12 +4751,12 @@
           </a:ln>
         </p:spPr>
         <p:txBody>
-          <a:bodyPr spcFirstLastPara="1" wrap="square" lIns="91425" tIns="91425" rIns="91425" bIns="91425" anchor="t" anchorCtr="0">
+          <a:bodyPr anchorCtr="0" anchor="t" bIns="91425" lIns="91425" spcFirstLastPara="1" rIns="91425" wrap="square" tIns="91425">
             <a:noAutofit/>
           </a:bodyPr>
           <a:lstStyle/>
           <a:p>
-            <a:pPr marL="0" lvl="0" indent="0" algn="l" rtl="0">
+            <a:pPr indent="0" lvl="0" marL="0" rtl="0" algn="l">
               <a:lnSpc>
                 <a:spcPct val="115000"/>
               </a:lnSpc>
@@ -7370,7 +4778,7 @@
                 <a:cs typeface="Oswald"/>
                 <a:sym typeface="Oswald"/>
               </a:rPr>
-              <a:t>Trace the early evolution of de_nuke, highlighting key changes that addressed initial player feedback and gameplay balance.</a:t>
+              <a:t>Reduce the heat to low immediately after adding the egg. This allows the egg white to slowly firm up without overcooking the yolk, keeping it runny and warm.</a:t>
             </a:r>
             <a:endParaRPr sz="1800">
               <a:solidFill>
@@ -7406,12 +4814,12 @@
           </a:ln>
         </p:spPr>
         <p:txBody>
-          <a:bodyPr spcFirstLastPara="1" wrap="square" lIns="91425" tIns="91425" rIns="91425" bIns="91425" anchor="ctr" anchorCtr="0">
+          <a:bodyPr anchorCtr="0" anchor="ctr" bIns="91425" lIns="91425" spcFirstLastPara="1" rIns="91425" wrap="square" tIns="91425">
             <a:noAutofit/>
           </a:bodyPr>
           <a:lstStyle/>
           <a:p>
-            <a:pPr marL="0" lvl="0" indent="0" algn="l" rtl="0">
+            <a:pPr indent="0" lvl="0" marL="0" rtl="0" algn="l">
               <a:spcBef>
                 <a:spcPts val="0"/>
               </a:spcBef>
@@ -7420,6 +4828,9 @@
               </a:spcAft>
               <a:buNone/>
             </a:pPr>
+            <a:r>
+              <a:t/>
+            </a:r>
             <a:endParaRPr/>
           </a:p>
         </p:txBody>
@@ -7446,12 +4857,12 @@
           </a:ln>
         </p:spPr>
         <p:txBody>
-          <a:bodyPr spcFirstLastPara="1" wrap="square" lIns="91425" tIns="91425" rIns="91425" bIns="91425" anchor="ctr" anchorCtr="0">
+          <a:bodyPr anchorCtr="0" anchor="ctr" bIns="91425" lIns="91425" spcFirstLastPara="1" rIns="91425" wrap="square" tIns="91425">
             <a:noAutofit/>
           </a:bodyPr>
           <a:lstStyle/>
           <a:p>
-            <a:pPr marL="0" lvl="0" indent="0" algn="l" rtl="0">
+            <a:pPr indent="0" lvl="0" marL="0" rtl="0" algn="l">
               <a:spcBef>
                 <a:spcPts val="0"/>
               </a:spcBef>
@@ -7460,6 +4871,9 @@
               </a:spcAft>
               <a:buNone/>
             </a:pPr>
+            <a:r>
+              <a:t/>
+            </a:r>
             <a:endParaRPr/>
           </a:p>
         </p:txBody>
@@ -7504,12 +4918,12 @@
           </a:ln>
         </p:spPr>
         <p:txBody>
-          <a:bodyPr spcFirstLastPara="1" wrap="square" lIns="91425" tIns="91425" rIns="91425" bIns="91425" anchor="ctr" anchorCtr="0">
+          <a:bodyPr anchorCtr="0" anchor="ctr" bIns="91425" lIns="91425" spcFirstLastPara="1" rIns="91425" wrap="square" tIns="91425">
             <a:noAutofit/>
           </a:bodyPr>
           <a:lstStyle/>
           <a:p>
-            <a:pPr marL="0" lvl="0" indent="0" algn="l" rtl="0">
+            <a:pPr indent="0" lvl="0" marL="0" rtl="0" algn="l">
               <a:spcBef>
                 <a:spcPts val="0"/>
               </a:spcBef>
@@ -7518,6 +4932,9 @@
               </a:spcAft>
               <a:buNone/>
             </a:pPr>
+            <a:r>
+              <a:t/>
+            </a:r>
             <a:endParaRPr/>
           </a:p>
         </p:txBody>
@@ -7544,12 +4961,12 @@
           </a:ln>
         </p:spPr>
         <p:txBody>
-          <a:bodyPr spcFirstLastPara="1" wrap="square" lIns="91425" tIns="91425" rIns="91425" bIns="91425" anchor="ctr" anchorCtr="0">
+          <a:bodyPr anchorCtr="0" anchor="ctr" bIns="91425" lIns="91425" spcFirstLastPara="1" rIns="91425" wrap="square" tIns="91425">
             <a:noAutofit/>
           </a:bodyPr>
           <a:lstStyle/>
           <a:p>
-            <a:pPr marL="0" lvl="0" indent="0" algn="l" rtl="0">
+            <a:pPr indent="0" lvl="0" marL="0" rtl="0" algn="l">
               <a:spcBef>
                 <a:spcPts val="0"/>
               </a:spcBef>
@@ -7558,6 +4975,9 @@
               </a:spcAft>
               <a:buNone/>
             </a:pPr>
+            <a:r>
+              <a:t/>
+            </a:r>
             <a:endParaRPr/>
           </a:p>
         </p:txBody>
@@ -7582,12 +5002,12 @@
           </a:ln>
         </p:spPr>
         <p:txBody>
-          <a:bodyPr spcFirstLastPara="1" wrap="square" lIns="91425" tIns="91425" rIns="91425" bIns="91425" anchor="t" anchorCtr="0">
-            <a:noAutofit/>
+          <a:bodyPr anchorCtr="0" anchor="t" bIns="91425" lIns="91425" spcFirstLastPara="1" rIns="91425" wrap="square" tIns="91425">
+            <a:normAutofit lnSpcReduction="10000"/>
           </a:bodyPr>
           <a:lstStyle/>
           <a:p>
-            <a:pPr marL="0" lvl="0" indent="0" algn="l" rtl="0">
+            <a:pPr indent="0" lvl="0" marL="0" rtl="0" algn="l">
               <a:spcBef>
                 <a:spcPts val="0"/>
               </a:spcBef>
@@ -7603,7 +5023,7 @@
                 <a:cs typeface="Bungee"/>
                 <a:sym typeface="Bungee"/>
               </a:rPr>
-              <a:t>Competitive Play: de_nuke's Role in Early Tournaments</a:t>
+              <a:t>Step 6: Cover with a Lid (Optional)</a:t>
             </a:r>
             <a:endParaRPr sz="2800">
               <a:solidFill>
@@ -7626,7 +5046,7 @@
         <p:spPr>
           <a:xfrm>
             <a:off x="311700" y="1152475"/>
-            <a:ext cx="7422525" cy="3416400"/>
+            <a:ext cx="8520600" cy="3416400"/>
           </a:xfrm>
           <a:prstGeom prst="rect">
             <a:avLst/>
@@ -7637,12 +5057,12 @@
           </a:ln>
         </p:spPr>
         <p:txBody>
-          <a:bodyPr spcFirstLastPara="1" wrap="square" lIns="91425" tIns="91425" rIns="91425" bIns="91425" anchor="t" anchorCtr="0">
+          <a:bodyPr anchorCtr="0" anchor="t" bIns="91425" lIns="91425" spcFirstLastPara="1" rIns="91425" wrap="square" tIns="91425">
             <a:noAutofit/>
           </a:bodyPr>
           <a:lstStyle/>
           <a:p>
-            <a:pPr marL="0" lvl="0" indent="0" algn="l" rtl="0">
+            <a:pPr indent="0" lvl="0" marL="0" rtl="0" algn="l">
               <a:lnSpc>
                 <a:spcPct val="115000"/>
               </a:lnSpc>
@@ -7664,7 +5084,7 @@
                 <a:cs typeface="Oswald"/>
                 <a:sym typeface="Oswald"/>
               </a:rPr>
-              <a:t>Explore how de_nuke became a staple in competitive play, featuring in some of the most pivotal early tournaments.</a:t>
+              <a:t>Covering the pan with a lid creates steam that helps cook the top of the egg. This step is optional but can result in more evenly cooked egg whites while keeping the yolk runny.</a:t>
             </a:r>
             <a:endParaRPr sz="1800">
               <a:solidFill>
@@ -7700,12 +5120,12 @@
           </a:ln>
         </p:spPr>
         <p:txBody>
-          <a:bodyPr spcFirstLastPara="1" wrap="square" lIns="91425" tIns="91425" rIns="91425" bIns="91425" anchor="ctr" anchorCtr="0">
+          <a:bodyPr anchorCtr="0" anchor="ctr" bIns="91425" lIns="91425" spcFirstLastPara="1" rIns="91425" wrap="square" tIns="91425">
             <a:noAutofit/>
           </a:bodyPr>
           <a:lstStyle/>
           <a:p>
-            <a:pPr marL="0" lvl="0" indent="0" algn="l" rtl="0">
+            <a:pPr indent="0" lvl="0" marL="0" rtl="0" algn="l">
               <a:spcBef>
                 <a:spcPts val="0"/>
               </a:spcBef>
@@ -7714,6 +5134,9 @@
               </a:spcAft>
               <a:buNone/>
             </a:pPr>
+            <a:r>
+              <a:t/>
+            </a:r>
             <a:endParaRPr/>
           </a:p>
         </p:txBody>
@@ -7740,12 +5163,12 @@
           </a:ln>
         </p:spPr>
         <p:txBody>
-          <a:bodyPr spcFirstLastPara="1" wrap="square" lIns="91425" tIns="91425" rIns="91425" bIns="91425" anchor="ctr" anchorCtr="0">
+          <a:bodyPr anchorCtr="0" anchor="ctr" bIns="91425" lIns="91425" spcFirstLastPara="1" rIns="91425" wrap="square" tIns="91425">
             <a:noAutofit/>
           </a:bodyPr>
           <a:lstStyle/>
           <a:p>
-            <a:pPr marL="0" lvl="0" indent="0" algn="l" rtl="0">
+            <a:pPr indent="0" lvl="0" marL="0" rtl="0" algn="l">
               <a:spcBef>
                 <a:spcPts val="0"/>
               </a:spcBef>
@@ -7754,6 +5177,9 @@
               </a:spcAft>
               <a:buNone/>
             </a:pPr>
+            <a:r>
+              <a:t/>
+            </a:r>
             <a:endParaRPr/>
           </a:p>
         </p:txBody>
@@ -7798,12 +5224,12 @@
           </a:ln>
         </p:spPr>
         <p:txBody>
-          <a:bodyPr spcFirstLastPara="1" wrap="square" lIns="91425" tIns="91425" rIns="91425" bIns="91425" anchor="ctr" anchorCtr="0">
+          <a:bodyPr anchorCtr="0" anchor="ctr" bIns="91425" lIns="91425" spcFirstLastPara="1" rIns="91425" wrap="square" tIns="91425">
             <a:noAutofit/>
           </a:bodyPr>
           <a:lstStyle/>
           <a:p>
-            <a:pPr marL="0" lvl="0" indent="0" algn="l" rtl="0">
+            <a:pPr indent="0" lvl="0" marL="0" rtl="0" algn="l">
               <a:spcBef>
                 <a:spcPts val="0"/>
               </a:spcBef>
@@ -7812,6 +5238,9 @@
               </a:spcAft>
               <a:buNone/>
             </a:pPr>
+            <a:r>
+              <a:t/>
+            </a:r>
             <a:endParaRPr/>
           </a:p>
         </p:txBody>
@@ -7838,12 +5267,12 @@
           </a:ln>
         </p:spPr>
         <p:txBody>
-          <a:bodyPr spcFirstLastPara="1" wrap="square" lIns="91425" tIns="91425" rIns="91425" bIns="91425" anchor="ctr" anchorCtr="0">
+          <a:bodyPr anchorCtr="0" anchor="ctr" bIns="91425" lIns="91425" spcFirstLastPara="1" rIns="91425" wrap="square" tIns="91425">
             <a:noAutofit/>
           </a:bodyPr>
           <a:lstStyle/>
           <a:p>
-            <a:pPr marL="0" lvl="0" indent="0" algn="l" rtl="0">
+            <a:pPr indent="0" lvl="0" marL="0" rtl="0" algn="l">
               <a:spcBef>
                 <a:spcPts val="0"/>
               </a:spcBef>
@@ -7852,6 +5281,9 @@
               </a:spcAft>
               <a:buNone/>
             </a:pPr>
+            <a:r>
+              <a:t/>
+            </a:r>
             <a:endParaRPr/>
           </a:p>
         </p:txBody>
@@ -7876,12 +5308,12 @@
           </a:ln>
         </p:spPr>
         <p:txBody>
-          <a:bodyPr spcFirstLastPara="1" wrap="square" lIns="91425" tIns="91425" rIns="91425" bIns="91425" anchor="t" anchorCtr="0">
-            <a:noAutofit/>
+          <a:bodyPr anchorCtr="0" anchor="t" bIns="91425" lIns="91425" spcFirstLastPara="1" rIns="91425" wrap="square" tIns="91425">
+            <a:normAutofit lnSpcReduction="10000"/>
           </a:bodyPr>
           <a:lstStyle/>
           <a:p>
-            <a:pPr marL="0" lvl="0" indent="0" algn="l" rtl="0">
+            <a:pPr indent="0" lvl="0" marL="0" rtl="0" algn="l">
               <a:spcBef>
                 <a:spcPts val="0"/>
               </a:spcBef>
@@ -7897,7 +5329,7 @@
                 <a:cs typeface="Bungee"/>
                 <a:sym typeface="Bungee"/>
               </a:rPr>
-              <a:t>The Evolution of de_nuke: Version Updates and Overhauls</a:t>
+              <a:t>Step 7: Check the Whites</a:t>
             </a:r>
             <a:endParaRPr sz="2800">
               <a:solidFill>
@@ -7920,7 +5352,7 @@
         <p:spPr>
           <a:xfrm>
             <a:off x="311700" y="1152475"/>
-            <a:ext cx="7422525" cy="3416400"/>
+            <a:ext cx="8520600" cy="3416400"/>
           </a:xfrm>
           <a:prstGeom prst="rect">
             <a:avLst/>
@@ -7931,12 +5363,12 @@
           </a:ln>
         </p:spPr>
         <p:txBody>
-          <a:bodyPr spcFirstLastPara="1" wrap="square" lIns="91425" tIns="91425" rIns="91425" bIns="91425" anchor="t" anchorCtr="0">
+          <a:bodyPr anchorCtr="0" anchor="t" bIns="91425" lIns="91425" spcFirstLastPara="1" rIns="91425" wrap="square" tIns="91425">
             <a:noAutofit/>
           </a:bodyPr>
           <a:lstStyle/>
           <a:p>
-            <a:pPr marL="0" lvl="0" indent="0" algn="l" rtl="0">
+            <a:pPr indent="0" lvl="0" marL="0" rtl="0" algn="l">
               <a:lnSpc>
                 <a:spcPct val="115000"/>
               </a:lnSpc>
@@ -7958,7 +5390,7 @@
                 <a:cs typeface="Oswald"/>
                 <a:sym typeface="Oswald"/>
               </a:rPr>
-              <a:t>Follow the timeline of de_nuke's major version updates and overhauls that have kept it relevant in the evolving landscape of Counter-Strike.</a:t>
+              <a:t>Cook until the whites are fully set but the yolk remains runny. Peek under the lid periodically to avoid overcooking. The egg is ready when the edges are slightly crispy and the whites are no longer translucent.</a:t>
             </a:r>
             <a:endParaRPr sz="1800">
               <a:solidFill>
@@ -7994,12 +5426,12 @@
           </a:ln>
         </p:spPr>
         <p:txBody>
-          <a:bodyPr spcFirstLastPara="1" wrap="square" lIns="91425" tIns="91425" rIns="91425" bIns="91425" anchor="ctr" anchorCtr="0">
+          <a:bodyPr anchorCtr="0" anchor="ctr" bIns="91425" lIns="91425" spcFirstLastPara="1" rIns="91425" wrap="square" tIns="91425">
             <a:noAutofit/>
           </a:bodyPr>
           <a:lstStyle/>
           <a:p>
-            <a:pPr marL="0" lvl="0" indent="0" algn="l" rtl="0">
+            <a:pPr indent="0" lvl="0" marL="0" rtl="0" algn="l">
               <a:spcBef>
                 <a:spcPts val="0"/>
               </a:spcBef>
@@ -8008,6 +5440,9 @@
               </a:spcAft>
               <a:buNone/>
             </a:pPr>
+            <a:r>
+              <a:t/>
+            </a:r>
             <a:endParaRPr/>
           </a:p>
         </p:txBody>
@@ -8034,12 +5469,12 @@
           </a:ln>
         </p:spPr>
         <p:txBody>
-          <a:bodyPr spcFirstLastPara="1" wrap="square" lIns="91425" tIns="91425" rIns="91425" bIns="91425" anchor="ctr" anchorCtr="0">
+          <a:bodyPr anchorCtr="0" anchor="ctr" bIns="91425" lIns="91425" spcFirstLastPara="1" rIns="91425" wrap="square" tIns="91425">
             <a:noAutofit/>
           </a:bodyPr>
           <a:lstStyle/>
           <a:p>
-            <a:pPr marL="0" lvl="0" indent="0" algn="l" rtl="0">
+            <a:pPr indent="0" lvl="0" marL="0" rtl="0" algn="l">
               <a:spcBef>
                 <a:spcPts val="0"/>
               </a:spcBef>
@@ -8048,6 +5483,9 @@
               </a:spcAft>
               <a:buNone/>
             </a:pPr>
+            <a:r>
+              <a:t/>
+            </a:r>
             <a:endParaRPr/>
           </a:p>
         </p:txBody>
@@ -8092,12 +5530,12 @@
           </a:ln>
         </p:spPr>
         <p:txBody>
-          <a:bodyPr spcFirstLastPara="1" wrap="square" lIns="91425" tIns="91425" rIns="91425" bIns="91425" anchor="ctr" anchorCtr="0">
+          <a:bodyPr anchorCtr="0" anchor="ctr" bIns="91425" lIns="91425" spcFirstLastPara="1" rIns="91425" wrap="square" tIns="91425">
             <a:noAutofit/>
           </a:bodyPr>
           <a:lstStyle/>
           <a:p>
-            <a:pPr marL="0" lvl="0" indent="0" algn="l" rtl="0">
+            <a:pPr indent="0" lvl="0" marL="0" rtl="0" algn="l">
               <a:spcBef>
                 <a:spcPts val="0"/>
               </a:spcBef>
@@ -8106,6 +5544,9 @@
               </a:spcAft>
               <a:buNone/>
             </a:pPr>
+            <a:r>
+              <a:t/>
+            </a:r>
             <a:endParaRPr/>
           </a:p>
         </p:txBody>
@@ -8132,12 +5573,12 @@
           </a:ln>
         </p:spPr>
         <p:txBody>
-          <a:bodyPr spcFirstLastPara="1" wrap="square" lIns="91425" tIns="91425" rIns="91425" bIns="91425" anchor="ctr" anchorCtr="0">
+          <a:bodyPr anchorCtr="0" anchor="ctr" bIns="91425" lIns="91425" spcFirstLastPara="1" rIns="91425" wrap="square" tIns="91425">
             <a:noAutofit/>
           </a:bodyPr>
           <a:lstStyle/>
           <a:p>
-            <a:pPr marL="0" lvl="0" indent="0" algn="l" rtl="0">
+            <a:pPr indent="0" lvl="0" marL="0" rtl="0" algn="l">
               <a:spcBef>
                 <a:spcPts val="0"/>
               </a:spcBef>
@@ -8146,6 +5587,9 @@
               </a:spcAft>
               <a:buNone/>
             </a:pPr>
+            <a:r>
+              <a:t/>
+            </a:r>
             <a:endParaRPr/>
           </a:p>
         </p:txBody>
@@ -8170,12 +5614,12 @@
           </a:ln>
         </p:spPr>
         <p:txBody>
-          <a:bodyPr spcFirstLastPara="1" wrap="square" lIns="91425" tIns="91425" rIns="91425" bIns="91425" anchor="t" anchorCtr="0">
-            <a:noAutofit/>
+          <a:bodyPr anchorCtr="0" anchor="t" bIns="91425" lIns="91425" spcFirstLastPara="1" rIns="91425" wrap="square" tIns="91425">
+            <a:normAutofit lnSpcReduction="10000"/>
           </a:bodyPr>
           <a:lstStyle/>
           <a:p>
-            <a:pPr marL="0" lvl="0" indent="0" algn="l" rtl="0">
+            <a:pPr indent="0" lvl="0" marL="0" rtl="0" algn="l">
               <a:spcBef>
                 <a:spcPts val="0"/>
               </a:spcBef>
@@ -8191,7 +5635,7 @@
                 <a:cs typeface="Bungee"/>
                 <a:sym typeface="Bungee"/>
               </a:rPr>
-              <a:t>Gameplay Mechanics: How de_nuke's Design Influences Strategies</a:t>
+              <a:t>Step 8: Serve and Enjoy</a:t>
             </a:r>
             <a:endParaRPr sz="2800">
               <a:solidFill>
@@ -8214,7 +5658,7 @@
         <p:spPr>
           <a:xfrm>
             <a:off x="311700" y="1152475"/>
-            <a:ext cx="7422525" cy="3416400"/>
+            <a:ext cx="8520600" cy="3416400"/>
           </a:xfrm>
           <a:prstGeom prst="rect">
             <a:avLst/>
@@ -8225,12 +5669,12 @@
           </a:ln>
         </p:spPr>
         <p:txBody>
-          <a:bodyPr spcFirstLastPara="1" wrap="square" lIns="91425" tIns="91425" rIns="91425" bIns="91425" anchor="t" anchorCtr="0">
+          <a:bodyPr anchorCtr="0" anchor="t" bIns="91425" lIns="91425" spcFirstLastPara="1" rIns="91425" wrap="square" tIns="91425">
             <a:noAutofit/>
           </a:bodyPr>
           <a:lstStyle/>
           <a:p>
-            <a:pPr marL="0" lvl="0" indent="0" algn="l" rtl="0">
+            <a:pPr indent="0" lvl="0" marL="0" rtl="0" algn="l">
               <a:lnSpc>
                 <a:spcPct val="115000"/>
               </a:lnSpc>
@@ -8252,7 +5696,7 @@
                 <a:cs typeface="Oswald"/>
                 <a:sym typeface="Oswald"/>
               </a:rPr>
-              <a:t>Delve into the unique gameplay mechanics of de_nuke and analyze how its design has influenced team strategies and playstyles.</a:t>
+              <a:t>Once the egg is cooked to your liking, use the spatula to gently slide it onto a plate. Season with salt and pepper as desired, and enjoy your delicious sunny side up egg!</a:t>
             </a:r>
             <a:endParaRPr sz="1800">
               <a:solidFill>
@@ -8288,12 +5732,12 @@
           </a:ln>
         </p:spPr>
         <p:txBody>
-          <a:bodyPr spcFirstLastPara="1" wrap="square" lIns="91425" tIns="91425" rIns="91425" bIns="91425" anchor="ctr" anchorCtr="0">
+          <a:bodyPr anchorCtr="0" anchor="ctr" bIns="91425" lIns="91425" spcFirstLastPara="1" rIns="91425" wrap="square" tIns="91425">
             <a:noAutofit/>
           </a:bodyPr>
           <a:lstStyle/>
           <a:p>
-            <a:pPr marL="0" lvl="0" indent="0" algn="l" rtl="0">
+            <a:pPr indent="0" lvl="0" marL="0" rtl="0" algn="l">
               <a:spcBef>
                 <a:spcPts val="0"/>
               </a:spcBef>
@@ -8302,6 +5746,9 @@
               </a:spcAft>
               <a:buNone/>
             </a:pPr>
+            <a:r>
+              <a:t/>
+            </a:r>
             <a:endParaRPr/>
           </a:p>
         </p:txBody>
@@ -8328,12 +5775,12 @@
           </a:ln>
         </p:spPr>
         <p:txBody>
-          <a:bodyPr spcFirstLastPara="1" wrap="square" lIns="91425" tIns="91425" rIns="91425" bIns="91425" anchor="ctr" anchorCtr="0">
+          <a:bodyPr anchorCtr="0" anchor="ctr" bIns="91425" lIns="91425" spcFirstLastPara="1" rIns="91425" wrap="square" tIns="91425">
             <a:noAutofit/>
           </a:bodyPr>
           <a:lstStyle/>
           <a:p>
-            <a:pPr marL="0" lvl="0" indent="0" algn="l" rtl="0">
+            <a:pPr indent="0" lvl="0" marL="0" rtl="0" algn="l">
               <a:spcBef>
                 <a:spcPts val="0"/>
               </a:spcBef>
@@ -8342,6 +5789,9 @@
               </a:spcAft>
               <a:buNone/>
             </a:pPr>
+            <a:r>
+              <a:t/>
+            </a:r>
             <a:endParaRPr/>
           </a:p>
         </p:txBody>

</xml_diff>